<commit_message>
agregando una version beta de la presentacion de la clase 2
</commit_message>
<xml_diff>
--- a/presentaciones/Clase 2-Introduccion a Ruby.pptx
+++ b/presentaciones/Clase 2-Introduccion a Ruby.pptx
@@ -5,7 +5,7 @@
     <p:sldMasterId id="2147483648" r:id="rId1"/>
   </p:sldMasterIdLst>
   <p:notesMasterIdLst>
-    <p:notesMasterId r:id="rId40"/>
+    <p:notesMasterId r:id="rId43"/>
   </p:notesMasterIdLst>
   <p:sldIdLst>
     <p:sldId id="256" r:id="rId2"/>
@@ -30,22 +30,25 @@
     <p:sldId id="332" r:id="rId21"/>
     <p:sldId id="333" r:id="rId22"/>
     <p:sldId id="334" r:id="rId23"/>
-    <p:sldId id="336" r:id="rId24"/>
+    <p:sldId id="346" r:id="rId24"/>
     <p:sldId id="301" r:id="rId25"/>
-    <p:sldId id="340" r:id="rId26"/>
-    <p:sldId id="341" r:id="rId27"/>
-    <p:sldId id="335" r:id="rId28"/>
-    <p:sldId id="315" r:id="rId29"/>
-    <p:sldId id="338" r:id="rId30"/>
-    <p:sldId id="339" r:id="rId31"/>
-    <p:sldId id="314" r:id="rId32"/>
-    <p:sldId id="337" r:id="rId33"/>
-    <p:sldId id="343" r:id="rId34"/>
-    <p:sldId id="344" r:id="rId35"/>
-    <p:sldId id="316" r:id="rId36"/>
-    <p:sldId id="342" r:id="rId37"/>
-    <p:sldId id="318" r:id="rId38"/>
-    <p:sldId id="298" r:id="rId39"/>
+    <p:sldId id="345" r:id="rId26"/>
+    <p:sldId id="340" r:id="rId27"/>
+    <p:sldId id="341" r:id="rId28"/>
+    <p:sldId id="348" r:id="rId29"/>
+    <p:sldId id="349" r:id="rId30"/>
+    <p:sldId id="335" r:id="rId31"/>
+    <p:sldId id="315" r:id="rId32"/>
+    <p:sldId id="338" r:id="rId33"/>
+    <p:sldId id="339" r:id="rId34"/>
+    <p:sldId id="314" r:id="rId35"/>
+    <p:sldId id="337" r:id="rId36"/>
+    <p:sldId id="343" r:id="rId37"/>
+    <p:sldId id="344" r:id="rId38"/>
+    <p:sldId id="316" r:id="rId39"/>
+    <p:sldId id="342" r:id="rId40"/>
+    <p:sldId id="318" r:id="rId41"/>
+    <p:sldId id="298" r:id="rId42"/>
   </p:sldIdLst>
   <p:sldSz cx="9144000" cy="6858000" type="screen4x3"/>
   <p:notesSz cx="6858000" cy="9144000"/>
@@ -270,7 +273,7 @@
             <a:fld id="{4267BE09-23C4-EA44-B3BC-248C48E87497}" type="datetimeFigureOut">
               <a:rPr lang="es-CR"/>
               <a:pPr/>
-              <a:t>4/8/15</a:t>
+              <a:t>4/11/15</a:t>
             </a:fld>
             <a:endParaRPr lang="es-CR"/>
           </a:p>
@@ -771,7 +774,7 @@
             <a:fld id="{70B90A40-B659-224A-80B0-5653A15AE0DA}" type="datetimeFigureOut">
               <a:rPr lang="en-US"/>
               <a:pPr/>
-              <a:t>4/8/15</a:t>
+              <a:t>4/11/15</a:t>
             </a:fld>
             <a:endParaRPr lang="en-US"/>
           </a:p>
@@ -958,7 +961,7 @@
             <a:fld id="{0D6C1D08-8629-9741-B74D-B129FFF6F82A}" type="datetimeFigureOut">
               <a:rPr lang="en-US"/>
               <a:pPr/>
-              <a:t>4/8/15</a:t>
+              <a:t>4/11/15</a:t>
             </a:fld>
             <a:endParaRPr lang="en-US"/>
           </a:p>
@@ -1155,7 +1158,7 @@
             <a:fld id="{BBD13895-6440-1846-867C-988EA1454632}" type="datetimeFigureOut">
               <a:rPr lang="en-US"/>
               <a:pPr/>
-              <a:t>4/8/15</a:t>
+              <a:t>4/11/15</a:t>
             </a:fld>
             <a:endParaRPr lang="en-US"/>
           </a:p>
@@ -1342,7 +1345,7 @@
             <a:fld id="{EFF7C72E-B1EA-224E-9FC7-96B80B148742}" type="datetimeFigureOut">
               <a:rPr lang="en-US"/>
               <a:pPr/>
-              <a:t>4/8/15</a:t>
+              <a:t>4/11/15</a:t>
             </a:fld>
             <a:endParaRPr lang="en-US"/>
           </a:p>
@@ -1605,7 +1608,7 @@
             <a:fld id="{290325A9-9FD2-BD42-A3AC-A784F47E1A9A}" type="datetimeFigureOut">
               <a:rPr lang="en-US"/>
               <a:pPr/>
-              <a:t>4/8/15</a:t>
+              <a:t>4/11/15</a:t>
             </a:fld>
             <a:endParaRPr lang="en-US"/>
           </a:p>
@@ -1910,7 +1913,7 @@
             <a:fld id="{5E882BC8-BB8B-6F43-A8B0-149CD86CC90B}" type="datetimeFigureOut">
               <a:rPr lang="en-US"/>
               <a:pPr/>
-              <a:t>4/8/15</a:t>
+              <a:t>4/11/15</a:t>
             </a:fld>
             <a:endParaRPr lang="en-US"/>
           </a:p>
@@ -2349,7 +2352,7 @@
             <a:fld id="{17862DB7-C18D-6E41-85D4-A46D04DDF788}" type="datetimeFigureOut">
               <a:rPr lang="en-US"/>
               <a:pPr/>
-              <a:t>4/8/15</a:t>
+              <a:t>4/11/15</a:t>
             </a:fld>
             <a:endParaRPr lang="en-US"/>
           </a:p>
@@ -2484,7 +2487,7 @@
             <a:fld id="{0ED5B260-A184-4E45-81B3-A707ABDAF358}" type="datetimeFigureOut">
               <a:rPr lang="en-US"/>
               <a:pPr/>
-              <a:t>4/8/15</a:t>
+              <a:t>4/11/15</a:t>
             </a:fld>
             <a:endParaRPr lang="en-US"/>
           </a:p>
@@ -2596,7 +2599,7 @@
             <a:fld id="{C39689B0-A911-D441-984C-17C806F4A6D2}" type="datetimeFigureOut">
               <a:rPr lang="en-US"/>
               <a:pPr/>
-              <a:t>4/8/15</a:t>
+              <a:t>4/11/15</a:t>
             </a:fld>
             <a:endParaRPr lang="en-US"/>
           </a:p>
@@ -2890,7 +2893,7 @@
             <a:fld id="{40C7C9B2-AF00-FE4B-9411-ABF43A20885D}" type="datetimeFigureOut">
               <a:rPr lang="en-US"/>
               <a:pPr/>
-              <a:t>4/8/15</a:t>
+              <a:t>4/11/15</a:t>
             </a:fld>
             <a:endParaRPr lang="en-US"/>
           </a:p>
@@ -3167,7 +3170,7 @@
             <a:fld id="{C929C2AB-758A-4D4B-B49A-AD6EEF4EFFF7}" type="datetimeFigureOut">
               <a:rPr lang="en-US"/>
               <a:pPr/>
-              <a:t>4/8/15</a:t>
+              <a:t>4/11/15</a:t>
             </a:fld>
             <a:endParaRPr lang="en-US"/>
           </a:p>
@@ -3462,7 +3465,7 @@
             <a:fld id="{D6B74E06-241F-9C44-93A8-AB6BF52B6421}" type="datetimeFigureOut">
               <a:rPr lang="en-US"/>
               <a:pPr/>
-              <a:t>4/8/15</a:t>
+              <a:t>4/11/15</a:t>
             </a:fld>
             <a:endParaRPr lang="en-US"/>
           </a:p>
@@ -6239,19 +6242,7 @@
               <a:rPr lang="es-ES" dirty="0" smtClean="0">
                 <a:latin typeface="Calibri" charset="0"/>
               </a:rPr>
-              <a:t>Trabajo </a:t>
-            </a:r>
-            <a:r>
-              <a:rPr lang="es-ES" dirty="0" smtClean="0">
-                <a:latin typeface="Calibri" charset="0"/>
-              </a:rPr>
-              <a:t>2: </a:t>
-            </a:r>
-            <a:r>
-              <a:rPr lang="es-ES" dirty="0" smtClean="0">
-                <a:latin typeface="Calibri" charset="0"/>
-              </a:rPr>
-              <a:t>Clases</a:t>
+              <a:t>Trabajo 2: Clases</a:t>
             </a:r>
             <a:endParaRPr lang="en-US" dirty="0">
               <a:latin typeface="Calibri" charset="0"/>
@@ -6796,19 +6787,7 @@
               <a:rPr lang="es-ES" dirty="0" smtClean="0">
                 <a:latin typeface="Calibri" charset="0"/>
               </a:rPr>
-              <a:t>Trabajo </a:t>
-            </a:r>
-            <a:r>
-              <a:rPr lang="es-ES" dirty="0" smtClean="0">
-                <a:latin typeface="Calibri" charset="0"/>
-              </a:rPr>
-              <a:t>2: </a:t>
-            </a:r>
-            <a:r>
-              <a:rPr lang="es-ES" dirty="0" smtClean="0">
-                <a:latin typeface="Calibri" charset="0"/>
-              </a:rPr>
-              <a:t>Clases</a:t>
+              <a:t>Trabajo 2: Clases</a:t>
             </a:r>
             <a:endParaRPr lang="en-US" dirty="0">
               <a:latin typeface="Calibri" charset="0"/>
@@ -8097,19 +8076,7 @@
               <a:rPr lang="es-ES" dirty="0" smtClean="0">
                 <a:latin typeface="Calibri" charset="0"/>
               </a:rPr>
-              <a:t>Trabajo </a:t>
-            </a:r>
-            <a:r>
-              <a:rPr lang="es-ES" dirty="0" smtClean="0">
-                <a:latin typeface="Calibri" charset="0"/>
-              </a:rPr>
-              <a:t>2: </a:t>
-            </a:r>
-            <a:r>
-              <a:rPr lang="es-ES" dirty="0" smtClean="0">
-                <a:latin typeface="Calibri" charset="0"/>
-              </a:rPr>
-              <a:t>Clases</a:t>
+              <a:t>Trabajo 2: Clases</a:t>
             </a:r>
             <a:endParaRPr lang="en-US" dirty="0">
               <a:latin typeface="Calibri" charset="0"/>
@@ -9344,26 +9311,464 @@
         <p:spPr>
           <a:xfrm>
             <a:off x="467544" y="1124744"/>
-            <a:ext cx="8229600" cy="4525963"/>
+            <a:ext cx="8208912" cy="4525963"/>
           </a:xfrm>
         </p:spPr>
         <p:txBody>
           <a:bodyPr/>
           <a:lstStyle/>
           <a:p>
+            <a:pPr marL="514350" lvl="1" indent="-514350">
+              <a:buFont typeface="+mj-lt"/>
+              <a:buAutoNum type="arabicPeriod"/>
+            </a:pPr>
+            <a:r>
+              <a:rPr lang="en-US" sz="2800" dirty="0" err="1" smtClean="0">
+                <a:latin typeface="Calibri" charset="0"/>
+              </a:rPr>
+              <a:t>Asumiendo</a:t>
+            </a:r>
+            <a:r>
+              <a:rPr lang="en-US" sz="2800" dirty="0" smtClean="0">
+                <a:latin typeface="Calibri" charset="0"/>
+              </a:rPr>
+              <a:t> </a:t>
+            </a:r>
+            <a:r>
+              <a:rPr lang="en-US" sz="2800" dirty="0" err="1" smtClean="0">
+                <a:latin typeface="Calibri" charset="0"/>
+              </a:rPr>
+              <a:t>que</a:t>
+            </a:r>
+            <a:r>
+              <a:rPr lang="en-US" sz="2800" dirty="0" smtClean="0">
+                <a:latin typeface="Calibri" charset="0"/>
+              </a:rPr>
+              <a:t> </a:t>
+            </a:r>
+            <a:r>
+              <a:rPr lang="en-US" sz="2800" dirty="0" err="1" smtClean="0">
+                <a:latin typeface="Calibri" charset="0"/>
+              </a:rPr>
+              <a:t>tenemos</a:t>
+            </a:r>
+            <a:r>
+              <a:rPr lang="en-US" sz="2800" dirty="0" smtClean="0">
+                <a:latin typeface="Calibri" charset="0"/>
+              </a:rPr>
+              <a:t> un </a:t>
+            </a:r>
+            <a:r>
+              <a:rPr lang="en-US" sz="2800" dirty="0" err="1" smtClean="0">
+                <a:latin typeface="Calibri" charset="0"/>
+              </a:rPr>
+              <a:t>arreglo</a:t>
+            </a:r>
+            <a:r>
+              <a:rPr lang="en-US" sz="2800" dirty="0" smtClean="0">
+                <a:latin typeface="Calibri" charset="0"/>
+              </a:rPr>
+              <a:t> con </a:t>
+            </a:r>
+            <a:r>
+              <a:rPr lang="en-US" sz="2800" dirty="0" err="1" smtClean="0">
+                <a:latin typeface="Calibri" charset="0"/>
+              </a:rPr>
+              <a:t>textos</a:t>
+            </a:r>
+            <a:r>
+              <a:rPr lang="en-US" sz="2800" dirty="0" smtClean="0">
+                <a:latin typeface="Calibri" charset="0"/>
+              </a:rPr>
+              <a:t> </a:t>
+            </a:r>
+            <a:r>
+              <a:rPr lang="en-US" sz="2800" dirty="0" err="1" smtClean="0">
+                <a:latin typeface="Calibri" charset="0"/>
+              </a:rPr>
+              <a:t>semejantes</a:t>
+            </a:r>
+            <a:r>
+              <a:rPr lang="en-US" sz="2800" dirty="0" smtClean="0">
+                <a:latin typeface="Calibri" charset="0"/>
+              </a:rPr>
+              <a:t> a </a:t>
+            </a:r>
+            <a:r>
+              <a:rPr lang="en-US" sz="2800" dirty="0" err="1" smtClean="0">
+                <a:latin typeface="Calibri" charset="0"/>
+              </a:rPr>
+              <a:t>este</a:t>
+            </a:r>
+            <a:r>
+              <a:rPr lang="en-US" sz="2800" dirty="0" smtClean="0">
+                <a:latin typeface="Calibri" charset="0"/>
+              </a:rPr>
+              <a:t>, </a:t>
+            </a:r>
+            <a:r>
+              <a:rPr lang="en-US" dirty="0" err="1" smtClean="0">
+                <a:latin typeface="Calibri" charset="0"/>
+              </a:rPr>
+              <a:t>separar</a:t>
+            </a:r>
+            <a:r>
+              <a:rPr lang="en-US" dirty="0" smtClean="0">
+                <a:latin typeface="Calibri" charset="0"/>
+              </a:rPr>
+              <a:t> </a:t>
+            </a:r>
+            <a:r>
+              <a:rPr lang="en-US" dirty="0" err="1">
+                <a:latin typeface="Calibri" charset="0"/>
+              </a:rPr>
+              <a:t>cada</a:t>
+            </a:r>
+            <a:r>
+              <a:rPr lang="en-US" dirty="0">
+                <a:latin typeface="Calibri" charset="0"/>
+              </a:rPr>
+              <a:t> </a:t>
+            </a:r>
+            <a:r>
+              <a:rPr lang="en-US" dirty="0" err="1">
+                <a:latin typeface="Calibri" charset="0"/>
+              </a:rPr>
+              <a:t>uno</a:t>
+            </a:r>
+            <a:r>
+              <a:rPr lang="en-US" dirty="0">
+                <a:latin typeface="Calibri" charset="0"/>
+              </a:rPr>
+              <a:t> de los </a:t>
+            </a:r>
+            <a:r>
+              <a:rPr lang="en-US" dirty="0" err="1">
+                <a:latin typeface="Calibri" charset="0"/>
+              </a:rPr>
+              <a:t>elementos</a:t>
+            </a:r>
+            <a:r>
+              <a:rPr lang="en-US" dirty="0">
+                <a:latin typeface="Calibri" charset="0"/>
+              </a:rPr>
+              <a:t> (</a:t>
+            </a:r>
+            <a:r>
+              <a:rPr lang="en-US" dirty="0" err="1">
+                <a:latin typeface="Calibri" charset="0"/>
+              </a:rPr>
+              <a:t>cédula</a:t>
+            </a:r>
+            <a:r>
+              <a:rPr lang="en-US" dirty="0">
+                <a:latin typeface="Calibri" charset="0"/>
+              </a:rPr>
+              <a:t>, </a:t>
+            </a:r>
+            <a:r>
+              <a:rPr lang="en-US" dirty="0" err="1">
+                <a:latin typeface="Calibri" charset="0"/>
+              </a:rPr>
+              <a:t>nombre</a:t>
+            </a:r>
+            <a:r>
+              <a:rPr lang="en-US" dirty="0">
+                <a:latin typeface="Calibri" charset="0"/>
+              </a:rPr>
+              <a:t> y </a:t>
+            </a:r>
+            <a:r>
+              <a:rPr lang="en-US" dirty="0" err="1">
+                <a:latin typeface="Calibri" charset="0"/>
+              </a:rPr>
+              <a:t>fecha</a:t>
+            </a:r>
+            <a:r>
+              <a:rPr lang="en-US" dirty="0">
+                <a:latin typeface="Calibri" charset="0"/>
+              </a:rPr>
+              <a:t> de </a:t>
+            </a:r>
+            <a:r>
+              <a:rPr lang="en-US" dirty="0" err="1">
+                <a:latin typeface="Calibri" charset="0"/>
+              </a:rPr>
+              <a:t>nacimiento</a:t>
+            </a:r>
+            <a:r>
+              <a:rPr lang="en-US" dirty="0">
+                <a:latin typeface="Calibri" charset="0"/>
+              </a:rPr>
+              <a:t>)</a:t>
+            </a:r>
+          </a:p>
+          <a:p>
+            <a:pPr marL="914400" lvl="1" indent="-514350"/>
+            <a:r>
+              <a:rPr lang="en-US" sz="2400" dirty="0" smtClean="0">
+                <a:latin typeface="Calibri" charset="0"/>
+              </a:rPr>
+              <a:t>0-0000-0000Juan Perez Osorio27/06/1973</a:t>
+            </a:r>
+          </a:p>
+          <a:p>
             <a:pPr marL="0" indent="0">
               <a:buNone/>
             </a:pPr>
+            <a:r>
+              <a:rPr lang="en-US" sz="2800" dirty="0" smtClean="0">
+                <a:latin typeface="Calibri" charset="0"/>
+              </a:rPr>
+              <a:t>2</a:t>
+            </a:r>
+            <a:r>
+              <a:rPr lang="en-US" sz="2800" dirty="0">
+                <a:latin typeface="Calibri" charset="0"/>
+              </a:rPr>
+              <a:t>. </a:t>
+            </a:r>
+            <a:r>
+              <a:rPr lang="en-US" sz="2800" dirty="0" err="1" smtClean="0">
+                <a:latin typeface="Calibri" charset="0"/>
+              </a:rPr>
+              <a:t>Considerando</a:t>
+            </a:r>
+            <a:r>
+              <a:rPr lang="en-US" sz="2800" dirty="0" smtClean="0">
+                <a:latin typeface="Calibri" charset="0"/>
+              </a:rPr>
+              <a:t> el </a:t>
+            </a:r>
+            <a:r>
+              <a:rPr lang="en-US" sz="2800" dirty="0" err="1" smtClean="0">
+                <a:latin typeface="Calibri" charset="0"/>
+              </a:rPr>
+              <a:t>siguiente</a:t>
+            </a:r>
+            <a:r>
+              <a:rPr lang="en-US" sz="2800" dirty="0" smtClean="0">
+                <a:latin typeface="Calibri" charset="0"/>
+              </a:rPr>
+              <a:t> HTML, </a:t>
+            </a:r>
+            <a:r>
+              <a:rPr lang="en-US" sz="2800" dirty="0" err="1" smtClean="0">
+                <a:latin typeface="Calibri" charset="0"/>
+              </a:rPr>
+              <a:t>mostrar</a:t>
+            </a:r>
+            <a:r>
+              <a:rPr lang="en-US" sz="2800" dirty="0" smtClean="0">
+                <a:latin typeface="Calibri" charset="0"/>
+              </a:rPr>
+              <a:t> en </a:t>
+            </a:r>
+            <a:r>
+              <a:rPr lang="en-US" sz="2800" dirty="0" err="1" smtClean="0">
+                <a:latin typeface="Calibri" charset="0"/>
+              </a:rPr>
+              <a:t>pantalla</a:t>
+            </a:r>
+            <a:r>
+              <a:rPr lang="en-US" sz="2800" dirty="0" smtClean="0">
+                <a:latin typeface="Calibri" charset="0"/>
+              </a:rPr>
+              <a:t> </a:t>
+            </a:r>
+            <a:r>
+              <a:rPr lang="en-US" sz="2800" dirty="0" err="1" smtClean="0">
+                <a:latin typeface="Calibri" charset="0"/>
+              </a:rPr>
+              <a:t>únicamente</a:t>
+            </a:r>
+            <a:r>
+              <a:rPr lang="en-US" sz="2800" dirty="0" smtClean="0">
+                <a:latin typeface="Calibri" charset="0"/>
+              </a:rPr>
+              <a:t> el </a:t>
+            </a:r>
+            <a:r>
+              <a:rPr lang="en-US" sz="2800" dirty="0" err="1" smtClean="0">
+                <a:latin typeface="Calibri" charset="0"/>
+              </a:rPr>
+              <a:t>texto</a:t>
+            </a:r>
+            <a:r>
+              <a:rPr lang="en-US" sz="2800" dirty="0">
+                <a:latin typeface="Calibri" charset="0"/>
+              </a:rPr>
+              <a:t> </a:t>
+            </a:r>
+            <a:r>
+              <a:rPr lang="en-US" sz="2800" dirty="0" err="1" smtClean="0">
+                <a:latin typeface="Calibri" charset="0"/>
+              </a:rPr>
+              <a:t>usando</a:t>
+            </a:r>
+            <a:r>
+              <a:rPr lang="en-US" sz="2800" dirty="0" smtClean="0">
+                <a:latin typeface="Calibri" charset="0"/>
+              </a:rPr>
+              <a:t> REGEX</a:t>
+            </a:r>
+          </a:p>
+          <a:p>
+            <a:r>
+              <a:rPr lang="en-US" sz="2800" dirty="0" smtClean="0">
+                <a:latin typeface="Calibri" charset="0"/>
+              </a:rPr>
+              <a:t>&lt;</a:t>
+            </a:r>
+            <a:r>
+              <a:rPr lang="en-US" sz="2800" dirty="0">
+                <a:latin typeface="Calibri" charset="0"/>
+              </a:rPr>
+              <a:t>div&gt;Hello &lt;span&gt;world&lt;/span</a:t>
+            </a:r>
+            <a:r>
+              <a:rPr lang="en-US" sz="2800" dirty="0" smtClean="0">
+                <a:latin typeface="Calibri" charset="0"/>
+              </a:rPr>
+              <a:t>&gt;&lt;a </a:t>
+            </a:r>
+            <a:r>
+              <a:rPr lang="en-US" sz="2800" dirty="0" err="1" smtClean="0">
+                <a:latin typeface="Calibri" charset="0"/>
+              </a:rPr>
+              <a:t>href</a:t>
+            </a:r>
+            <a:r>
+              <a:rPr lang="en-US" sz="2800" dirty="0" smtClean="0">
+                <a:latin typeface="Calibri" charset="0"/>
+              </a:rPr>
+              <a:t>=‘</a:t>
+            </a:r>
+            <a:r>
+              <a:rPr lang="en-US" sz="2800" dirty="0" err="1" smtClean="0">
+                <a:latin typeface="Calibri" charset="0"/>
+              </a:rPr>
+              <a:t>mailto:name@host.com</a:t>
+            </a:r>
+            <a:r>
+              <a:rPr lang="en-US" sz="2800" dirty="0" smtClean="0">
+                <a:latin typeface="Calibri" charset="0"/>
+              </a:rPr>
+              <a:t>’&gt;name’s email&lt;/a&gt;&lt;</a:t>
+            </a:r>
+            <a:r>
+              <a:rPr lang="en-US" sz="2800" dirty="0">
+                <a:latin typeface="Calibri" charset="0"/>
+              </a:rPr>
+              <a:t>/div</a:t>
+            </a:r>
+            <a:r>
+              <a:rPr lang="en-US" sz="2800" dirty="0" smtClean="0">
+                <a:latin typeface="Calibri" charset="0"/>
+              </a:rPr>
+              <a:t>&gt;</a:t>
+            </a:r>
+          </a:p>
+          <a:p>
             <a:endParaRPr lang="en-US" sz="2800" dirty="0">
               <a:latin typeface="Calibri" charset="0"/>
             </a:endParaRPr>
+          </a:p>
+          <a:p>
+            <a:pPr marL="0" indent="0">
+              <a:buNone/>
+            </a:pPr>
+            <a:r>
+              <a:rPr lang="en-US" sz="2800" b="1" dirty="0" err="1" smtClean="0">
+                <a:latin typeface="Calibri" charset="0"/>
+              </a:rPr>
+              <a:t>Pista</a:t>
+            </a:r>
+            <a:r>
+              <a:rPr lang="en-US" sz="2800" b="1" dirty="0" smtClean="0">
+                <a:latin typeface="Calibri" charset="0"/>
+              </a:rPr>
+              <a:t>: </a:t>
+            </a:r>
+            <a:r>
+              <a:rPr lang="en-US" sz="2800" dirty="0" err="1" smtClean="0">
+                <a:latin typeface="Calibri" charset="0"/>
+              </a:rPr>
+              <a:t>Pueden</a:t>
+            </a:r>
+            <a:r>
+              <a:rPr lang="en-US" sz="2800" dirty="0" smtClean="0">
+                <a:latin typeface="Calibri" charset="0"/>
+              </a:rPr>
+              <a:t> </a:t>
+            </a:r>
+            <a:r>
+              <a:rPr lang="en-US" sz="2800" dirty="0" err="1" smtClean="0">
+                <a:latin typeface="Calibri" charset="0"/>
+              </a:rPr>
+              <a:t>usar</a:t>
+            </a:r>
+            <a:r>
+              <a:rPr lang="en-US" sz="2800" dirty="0" smtClean="0">
+                <a:latin typeface="Calibri" charset="0"/>
+              </a:rPr>
+              <a:t> </a:t>
+            </a:r>
+            <a:r>
+              <a:rPr lang="en-US" sz="2800" dirty="0" err="1" smtClean="0">
+                <a:latin typeface="Calibri" charset="0"/>
+              </a:rPr>
+              <a:t>rubular.com</a:t>
+            </a:r>
+            <a:r>
+              <a:rPr lang="en-US" sz="2800" dirty="0" smtClean="0">
+                <a:latin typeface="Calibri" charset="0"/>
+              </a:rPr>
+              <a:t> </a:t>
+            </a:r>
+            <a:r>
+              <a:rPr lang="en-US" sz="2800" dirty="0" err="1" smtClean="0">
+                <a:latin typeface="Calibri" charset="0"/>
+              </a:rPr>
+              <a:t>para</a:t>
+            </a:r>
+            <a:r>
+              <a:rPr lang="en-US" sz="2800" dirty="0" smtClean="0">
+                <a:latin typeface="Calibri" charset="0"/>
+              </a:rPr>
+              <a:t> </a:t>
+            </a:r>
+            <a:r>
+              <a:rPr lang="en-US" sz="2800" dirty="0" err="1" smtClean="0">
+                <a:latin typeface="Calibri" charset="0"/>
+              </a:rPr>
+              <a:t>probar</a:t>
+            </a:r>
+            <a:r>
+              <a:rPr lang="en-US" sz="2800" dirty="0" smtClean="0">
+                <a:latin typeface="Calibri" charset="0"/>
+              </a:rPr>
+              <a:t> </a:t>
+            </a:r>
+            <a:r>
+              <a:rPr lang="en-US" sz="2800" dirty="0" err="1" smtClean="0">
+                <a:latin typeface="Calibri" charset="0"/>
+              </a:rPr>
+              <a:t>su</a:t>
+            </a:r>
+            <a:r>
+              <a:rPr lang="en-US" sz="2800" dirty="0" smtClean="0">
+                <a:latin typeface="Calibri" charset="0"/>
+              </a:rPr>
+              <a:t> REGEX</a:t>
+            </a:r>
           </a:p>
         </p:txBody>
       </p:sp>
     </p:spTree>
     <p:extLst>
       <p:ext uri="{BB962C8B-B14F-4D97-AF65-F5344CB8AC3E}">
-        <p14:creationId xmlns:p14="http://schemas.microsoft.com/office/powerpoint/2010/main" val="3321075625"/>
+        <p14:creationId xmlns:p14="http://schemas.microsoft.com/office/powerpoint/2010/main" val="1199704613"/>
       </p:ext>
     </p:extLst>
   </p:cSld>
@@ -9420,7 +9825,13 @@
               <a:rPr lang="es-CR" sz="2000" dirty="0" smtClean="0">
                 <a:latin typeface="Calibri" charset="0"/>
               </a:rPr>
-              <a:t>(1/3)</a:t>
+              <a:t>(1</a:t>
+            </a:r>
+            <a:r>
+              <a:rPr lang="es-CR" sz="2000" dirty="0" smtClean="0">
+                <a:latin typeface="Calibri" charset="0"/>
+              </a:rPr>
+              <a:t>/6)</a:t>
             </a:r>
             <a:endParaRPr lang="es-CR" dirty="0">
               <a:latin typeface="Calibri" charset="0"/>
@@ -9568,13 +9979,13 @@
               <a:rPr lang="es-CR" sz="2000" dirty="0" smtClean="0">
                 <a:latin typeface="Calibri" charset="0"/>
               </a:rPr>
-              <a:t>(2/</a:t>
+              <a:t>(2</a:t>
             </a:r>
             <a:r>
               <a:rPr lang="es-CR" sz="2000" dirty="0" smtClean="0">
                 <a:latin typeface="Calibri" charset="0"/>
               </a:rPr>
-              <a:t>3)</a:t>
+              <a:t>/6)</a:t>
             </a:r>
             <a:endParaRPr lang="es-CR" dirty="0">
               <a:latin typeface="Calibri" charset="0"/>
@@ -9592,10 +10003,140 @@
             <p:ph idx="1"/>
           </p:nvPr>
         </p:nvSpPr>
-        <p:spPr/>
+        <p:spPr>
+          <a:xfrm>
+            <a:off x="467544" y="1484784"/>
+            <a:ext cx="8229600" cy="4525963"/>
+          </a:xfrm>
+        </p:spPr>
         <p:txBody>
           <a:bodyPr/>
           <a:lstStyle/>
+          <a:p>
+            <a:r>
+              <a:rPr lang="es-CR" dirty="0" smtClean="0">
+                <a:latin typeface="Calibri" charset="0"/>
+              </a:rPr>
+              <a:t>Un ejemplo que ya vimos fue con el “delete_if” </a:t>
+            </a:r>
+            <a:r>
+              <a:rPr lang="es-CR" dirty="0">
+                <a:latin typeface="Calibri" charset="0"/>
+              </a:rPr>
+              <a:t>y </a:t>
+            </a:r>
+            <a:r>
+              <a:rPr lang="es-CR" dirty="0" smtClean="0">
+                <a:latin typeface="Calibri" charset="0"/>
+              </a:rPr>
+              <a:t>“select”, a los cuales se les pasa un parámetro con las condiciones de selección</a:t>
+            </a:r>
+          </a:p>
+          <a:p>
+            <a:r>
+              <a:rPr lang="es-CR" dirty="0" smtClean="0">
+                <a:latin typeface="Calibri" charset="0"/>
+              </a:rPr>
+              <a:t>Otro ejemplo de bloques simples sería:</a:t>
+            </a:r>
+          </a:p>
+          <a:p>
+            <a:pPr marL="457200" lvl="1" indent="0">
+              <a:buNone/>
+            </a:pPr>
+            <a:r>
+              <a:rPr lang="es-CR" dirty="0">
+                <a:latin typeface="Calibri" charset="0"/>
+              </a:rPr>
+              <a:t>d</a:t>
+            </a:r>
+            <a:r>
+              <a:rPr lang="es-CR" dirty="0" smtClean="0">
+                <a:latin typeface="Calibri" charset="0"/>
+              </a:rPr>
+              <a:t>ef greet2(texto)</a:t>
+            </a:r>
+          </a:p>
+          <a:p>
+            <a:pPr marL="457200" lvl="1" indent="0">
+              <a:buNone/>
+            </a:pPr>
+            <a:r>
+              <a:rPr lang="es-CR" dirty="0">
+                <a:latin typeface="Calibri" charset="0"/>
+              </a:rPr>
+              <a:t> </a:t>
+            </a:r>
+            <a:r>
+              <a:rPr lang="es-CR" dirty="0" smtClean="0">
+                <a:latin typeface="Calibri" charset="0"/>
+              </a:rPr>
+              <a:t> puts “mi parametro es #{texto}”</a:t>
+            </a:r>
+          </a:p>
+          <a:p>
+            <a:pPr marL="457200" lvl="1" indent="0">
+              <a:buNone/>
+            </a:pPr>
+            <a:r>
+              <a:rPr lang="es-CR" dirty="0">
+                <a:latin typeface="Calibri" charset="0"/>
+              </a:rPr>
+              <a:t> </a:t>
+            </a:r>
+            <a:r>
+              <a:rPr lang="es-CR" dirty="0" smtClean="0">
+                <a:latin typeface="Calibri" charset="0"/>
+              </a:rPr>
+              <a:t> yield</a:t>
+            </a:r>
+          </a:p>
+          <a:p>
+            <a:pPr marL="457200" lvl="1" indent="0">
+              <a:buNone/>
+            </a:pPr>
+            <a:r>
+              <a:rPr lang="es-CR" dirty="0">
+                <a:latin typeface="Calibri" charset="0"/>
+              </a:rPr>
+              <a:t>e</a:t>
+            </a:r>
+            <a:r>
+              <a:rPr lang="es-CR" dirty="0" smtClean="0">
+                <a:latin typeface="Calibri" charset="0"/>
+              </a:rPr>
+              <a:t>nd</a:t>
+            </a:r>
+            <a:endParaRPr lang="es-CR" dirty="0">
+              <a:latin typeface="Calibri" charset="0"/>
+            </a:endParaRPr>
+          </a:p>
+          <a:p>
+            <a:pPr marL="457200" lvl="1" indent="0">
+              <a:buNone/>
+            </a:pPr>
+            <a:r>
+              <a:rPr lang="es-CR" dirty="0" smtClean="0">
+                <a:latin typeface="Calibri" charset="0"/>
+              </a:rPr>
+              <a:t>greet2 (“argumento”) </a:t>
+            </a:r>
+            <a:r>
+              <a:rPr lang="es-CR" dirty="0">
+                <a:latin typeface="Calibri" charset="0"/>
+              </a:rPr>
+              <a:t>{puts </a:t>
+            </a:r>
+            <a:r>
+              <a:rPr lang="es-CR" dirty="0" smtClean="0">
+                <a:latin typeface="Calibri" charset="0"/>
+              </a:rPr>
+              <a:t>“Hola #{argumento}”}</a:t>
+            </a:r>
+            <a:endParaRPr lang="es-CR" dirty="0">
+              <a:latin typeface="Calibri" charset="0"/>
+            </a:endParaRPr>
+          </a:p>
           <a:p>
             <a:endParaRPr lang="es-CR" dirty="0">
               <a:latin typeface="Calibri" charset="0"/>
@@ -9606,7 +10147,7 @@
     </p:spTree>
     <p:extLst>
       <p:ext uri="{BB962C8B-B14F-4D97-AF65-F5344CB8AC3E}">
-        <p14:creationId xmlns:p14="http://schemas.microsoft.com/office/powerpoint/2010/main" val="4057227463"/>
+        <p14:creationId xmlns:p14="http://schemas.microsoft.com/office/powerpoint/2010/main" val="4127059051"/>
       </p:ext>
     </p:extLst>
   </p:cSld>
@@ -9673,10 +10214,16 @@
               <a:t>(3/</a:t>
             </a:r>
             <a:r>
+              <a:rPr lang="es-CR" sz="2000" dirty="0">
+                <a:latin typeface="Calibri" charset="0"/>
+              </a:rPr>
+              <a:t>6</a:t>
+            </a:r>
+            <a:r>
               <a:rPr lang="es-CR" sz="2000" dirty="0" smtClean="0">
                 <a:latin typeface="Calibri" charset="0"/>
               </a:rPr>
-              <a:t>3)</a:t>
+              <a:t>)</a:t>
             </a:r>
             <a:endParaRPr lang="es-CR" dirty="0">
               <a:latin typeface="Calibri" charset="0"/>
@@ -9694,12 +10241,90 @@
             <p:ph idx="1"/>
           </p:nvPr>
         </p:nvSpPr>
-        <p:spPr/>
+        <p:spPr>
+          <a:xfrm>
+            <a:off x="467544" y="1340768"/>
+            <a:ext cx="8229600" cy="4525963"/>
+          </a:xfrm>
+        </p:spPr>
         <p:txBody>
           <a:bodyPr/>
           <a:lstStyle/>
           <a:p>
-            <a:endParaRPr lang="es-CR" dirty="0">
+            <a:r>
+              <a:rPr lang="es-CR" dirty="0">
+                <a:latin typeface="Calibri" charset="0"/>
+              </a:rPr>
+              <a:t>y</a:t>
+            </a:r>
+            <a:r>
+              <a:rPr lang="es-CR" dirty="0" smtClean="0">
+                <a:latin typeface="Calibri" charset="0"/>
+              </a:rPr>
+              <a:t>ield:</a:t>
+            </a:r>
+          </a:p>
+          <a:p>
+            <a:pPr lvl="1"/>
+            <a:r>
+              <a:rPr lang="es-CR" dirty="0" smtClean="0">
+                <a:latin typeface="Calibri" charset="0"/>
+              </a:rPr>
+              <a:t>Le dice al m</a:t>
+            </a:r>
+            <a:r>
+              <a:rPr lang="es-CR" dirty="0" smtClean="0">
+                <a:latin typeface="Calibri" charset="0"/>
+              </a:rPr>
+              <a:t>étodo que ejecute el bloque de código que se le provee al método (puede pasar parámetros)</a:t>
+            </a:r>
+          </a:p>
+          <a:p>
+            <a:r>
+              <a:rPr lang="es-CR" dirty="0">
+                <a:latin typeface="Calibri" charset="0"/>
+              </a:rPr>
+              <a:t>b</a:t>
+            </a:r>
+            <a:r>
+              <a:rPr lang="es-CR" dirty="0" smtClean="0">
+                <a:latin typeface="Calibri" charset="0"/>
+              </a:rPr>
+              <a:t>lock_given?</a:t>
+            </a:r>
+          </a:p>
+          <a:p>
+            <a:pPr lvl="1"/>
+            <a:r>
+              <a:rPr lang="es-CR" dirty="0" smtClean="0">
+                <a:latin typeface="Calibri" charset="0"/>
+              </a:rPr>
+              <a:t>Verifica si se le provee un bloque a la funci</a:t>
+            </a:r>
+            <a:r>
+              <a:rPr lang="es-CR" dirty="0" smtClean="0">
+                <a:latin typeface="Calibri" charset="0"/>
+              </a:rPr>
+              <a:t>ón o no</a:t>
+            </a:r>
+          </a:p>
+          <a:p>
+            <a:r>
+              <a:rPr lang="es-CR" dirty="0" smtClean="0">
+                <a:latin typeface="Calibri" charset="0"/>
+              </a:rPr>
+              <a:t>Parámetros:</a:t>
+            </a:r>
+          </a:p>
+          <a:p>
+            <a:pPr lvl="1"/>
+            <a:r>
+              <a:rPr lang="es-CR" dirty="0" smtClean="0">
+                <a:latin typeface="Calibri" charset="0"/>
+              </a:rPr>
+              <a:t>Un bloque puede recibir parámetros de ejecución, para ello se ocupamos enviarlos a la hora de ejecutar el yield</a:t>
+            </a:r>
+            <a:endParaRPr lang="es-CR" dirty="0" smtClean="0">
               <a:latin typeface="Calibri" charset="0"/>
             </a:endParaRPr>
           </a:p>
@@ -9744,7 +10369,7 @@
       </p:grpSpPr>
       <p:sp>
         <p:nvSpPr>
-          <p:cNvPr id="2" name="Título 1"/>
+          <p:cNvPr id="3074" name="1 Título"/>
           <p:cNvSpPr>
             <a:spLocks noGrp="1"/>
           </p:cNvSpPr>
@@ -9754,8 +10379,8 @@
         </p:nvSpPr>
         <p:spPr>
           <a:xfrm>
-            <a:off x="395536" y="-171400"/>
-            <a:ext cx="8229600" cy="1143000"/>
+            <a:off x="457200" y="-100013"/>
+            <a:ext cx="8229600" cy="1143001"/>
           </a:xfrm>
         </p:spPr>
         <p:txBody>
@@ -9763,16 +10388,38 @@
           <a:lstStyle/>
           <a:p>
             <a:r>
-              <a:rPr lang="es-ES_tradnl" dirty="0" smtClean="0"/>
-              <a:t>Trabajo 4: Bloques</a:t>
-            </a:r>
-            <a:endParaRPr lang="es-ES_tradnl" dirty="0"/>
+              <a:rPr lang="es-CR" dirty="0" smtClean="0">
+                <a:latin typeface="Calibri" charset="0"/>
+              </a:rPr>
+              <a:t>Bloques de código </a:t>
+            </a:r>
+            <a:r>
+              <a:rPr lang="es-CR" sz="2000" dirty="0" smtClean="0">
+                <a:latin typeface="Calibri" charset="0"/>
+              </a:rPr>
+              <a:t>(4/</a:t>
+            </a:r>
+            <a:r>
+              <a:rPr lang="es-CR" sz="2000" dirty="0">
+                <a:latin typeface="Calibri" charset="0"/>
+              </a:rPr>
+              <a:t>6</a:t>
+            </a:r>
+            <a:r>
+              <a:rPr lang="es-CR" sz="2000" dirty="0" smtClean="0">
+                <a:latin typeface="Calibri" charset="0"/>
+              </a:rPr>
+              <a:t>)</a:t>
+            </a:r>
+            <a:endParaRPr lang="es-CR" dirty="0">
+              <a:latin typeface="Calibri" charset="0"/>
+            </a:endParaRPr>
           </a:p>
         </p:txBody>
       </p:sp>
       <p:sp>
         <p:nvSpPr>
-          <p:cNvPr id="3" name="Marcador de contenido 2"/>
+          <p:cNvPr id="3075" name="2 Marcador de contenido"/>
           <p:cNvSpPr>
             <a:spLocks noGrp="1"/>
           </p:cNvSpPr>
@@ -9780,25 +10427,447 @@
             <p:ph idx="1"/>
           </p:nvPr>
         </p:nvSpPr>
-        <p:spPr/>
+        <p:spPr>
+          <a:xfrm>
+            <a:off x="179512" y="980728"/>
+            <a:ext cx="5688632" cy="2808312"/>
+          </a:xfrm>
+        </p:spPr>
+        <p:style>
+          <a:lnRef idx="2">
+            <a:schemeClr val="dk1"/>
+          </a:lnRef>
+          <a:fillRef idx="1">
+            <a:schemeClr val="lt1"/>
+          </a:fillRef>
+          <a:effectRef idx="0">
+            <a:schemeClr val="dk1"/>
+          </a:effectRef>
+          <a:fontRef idx="minor">
+            <a:schemeClr val="dk1"/>
+          </a:fontRef>
+        </p:style>
         <p:txBody>
           <a:bodyPr/>
           <a:lstStyle/>
           <a:p>
-            <a:endParaRPr lang="es-ES_tradnl"/>
+            <a:pPr marL="0" lvl="1" indent="0">
+              <a:buNone/>
+            </a:pPr>
+            <a:r>
+              <a:rPr lang="es-CR" sz="2400" dirty="0">
+                <a:latin typeface="Calibri" charset="0"/>
+              </a:rPr>
+              <a:t>def greet2(texto</a:t>
+            </a:r>
+            <a:r>
+              <a:rPr lang="es-CR" sz="2400" dirty="0" smtClean="0">
+                <a:latin typeface="Calibri" charset="0"/>
+              </a:rPr>
+              <a:t>)</a:t>
+            </a:r>
+          </a:p>
+          <a:p>
+            <a:pPr marL="0" lvl="1" indent="0">
+              <a:buNone/>
+            </a:pPr>
+            <a:r>
+              <a:rPr lang="es-CR" sz="2400" dirty="0" smtClean="0">
+                <a:latin typeface="Calibri" charset="0"/>
+              </a:rPr>
+              <a:t>  puts “el saludo para mi gente es: #{texto}”</a:t>
+            </a:r>
+            <a:endParaRPr lang="es-CR" sz="2400" dirty="0">
+              <a:latin typeface="Calibri" charset="0"/>
+            </a:endParaRPr>
+          </a:p>
+          <a:p>
+            <a:pPr marL="0" lvl="1" indent="0">
+              <a:buNone/>
+            </a:pPr>
+            <a:r>
+              <a:rPr lang="es-CR" sz="2400" dirty="0" smtClean="0">
+                <a:latin typeface="Calibri" charset="0"/>
+              </a:rPr>
+              <a:t> </a:t>
+            </a:r>
+            <a:r>
+              <a:rPr lang="es-CR" sz="2400" dirty="0">
+                <a:latin typeface="Calibri" charset="0"/>
+              </a:rPr>
+              <a:t> yield rand(10), rand(50</a:t>
+            </a:r>
+            <a:r>
+              <a:rPr lang="es-CR" sz="2400" dirty="0" smtClean="0">
+                <a:latin typeface="Calibri" charset="0"/>
+              </a:rPr>
+              <a:t>) if block_given?</a:t>
+            </a:r>
+          </a:p>
+          <a:p>
+            <a:pPr marL="0" lvl="1" indent="0">
+              <a:buNone/>
+            </a:pPr>
+            <a:r>
+              <a:rPr lang="es-CR" sz="2400" dirty="0">
+                <a:latin typeface="Calibri" charset="0"/>
+              </a:rPr>
+              <a:t> </a:t>
+            </a:r>
+            <a:r>
+              <a:rPr lang="es-CR" sz="2400" dirty="0" smtClean="0">
+                <a:latin typeface="Calibri" charset="0"/>
+              </a:rPr>
+              <a:t> puts “un placer haberlo visto”</a:t>
+            </a:r>
+            <a:endParaRPr lang="es-CR" sz="2400" dirty="0">
+              <a:latin typeface="Calibri" charset="0"/>
+            </a:endParaRPr>
+          </a:p>
+          <a:p>
+            <a:pPr marL="0" lvl="1" indent="0">
+              <a:buNone/>
+            </a:pPr>
+            <a:r>
+              <a:rPr lang="es-CR" sz="2400" dirty="0">
+                <a:latin typeface="Calibri" charset="0"/>
+              </a:rPr>
+              <a:t>end</a:t>
+            </a:r>
+          </a:p>
+          <a:p>
+            <a:pPr marL="0" lvl="1" indent="0">
+              <a:buNone/>
+            </a:pPr>
+            <a:r>
+              <a:rPr lang="es-CR" sz="2400" dirty="0">
+                <a:latin typeface="Calibri" charset="0"/>
+              </a:rPr>
+              <a:t>greet2 (</a:t>
+            </a:r>
+            <a:r>
+              <a:rPr lang="es-CR" sz="2400" dirty="0" smtClean="0">
+                <a:latin typeface="Calibri" charset="0"/>
+              </a:rPr>
+              <a:t>“hola!!!”</a:t>
+            </a:r>
+            <a:r>
+              <a:rPr lang="es-CR" sz="2400" dirty="0">
+                <a:latin typeface="Calibri" charset="0"/>
+              </a:rPr>
+              <a:t>) </a:t>
+            </a:r>
+            <a:r>
+              <a:rPr lang="ro-RO" sz="2400" dirty="0">
+                <a:latin typeface="Calibri" charset="0"/>
+              </a:rPr>
+              <a:t>{ |x,y| puts "#{x}, #{y}" }</a:t>
+            </a:r>
+            <a:endParaRPr lang="es-CR" sz="2400" dirty="0">
+              <a:latin typeface="Calibri" charset="0"/>
+            </a:endParaRPr>
+          </a:p>
+        </p:txBody>
+      </p:sp>
+      <p:sp>
+        <p:nvSpPr>
+          <p:cNvPr id="4" name="2 Marcador de contenido"/>
+          <p:cNvSpPr txBox="1">
+            <a:spLocks/>
+          </p:cNvSpPr>
+          <p:nvPr/>
+        </p:nvSpPr>
+        <p:spPr bwMode="auto">
+          <a:xfrm>
+            <a:off x="2987824" y="3861049"/>
+            <a:ext cx="5976664" cy="2736304"/>
+          </a:xfrm>
+          <a:prstGeom prst="rect">
+            <a:avLst/>
+          </a:prstGeom>
+          <a:ln/>
+          <a:extLst>
+            <a:ext uri="{FAA26D3D-D897-4be2-8F04-BA451C77F1D7}">
+              <ma14:placeholderFlag xmlns:ma14="http://schemas.microsoft.com/office/mac/drawingml/2011/main" val="1"/>
+            </a:ext>
+          </a:extLst>
+        </p:spPr>
+        <p:style>
+          <a:lnRef idx="2">
+            <a:schemeClr val="accent1"/>
+          </a:lnRef>
+          <a:fillRef idx="1">
+            <a:schemeClr val="lt1"/>
+          </a:fillRef>
+          <a:effectRef idx="0">
+            <a:schemeClr val="accent1"/>
+          </a:effectRef>
+          <a:fontRef idx="minor">
+            <a:schemeClr val="dk1"/>
+          </a:fontRef>
+        </p:style>
+        <p:txBody>
+          <a:bodyPr vert="horz" wrap="square" lIns="91440" tIns="45720" rIns="91440" bIns="45720" numCol="1" anchor="t" anchorCtr="0" compatLnSpc="1">
+            <a:prstTxWarp prst="textNoShape">
+              <a:avLst/>
+            </a:prstTxWarp>
+          </a:bodyPr>
+          <a:lstStyle>
+            <a:lvl1pPr marL="342900" indent="-342900" algn="l" rtl="0" fontAlgn="base">
+              <a:spcBef>
+                <a:spcPct val="20000"/>
+              </a:spcBef>
+              <a:spcAft>
+                <a:spcPct val="0"/>
+              </a:spcAft>
+              <a:buFont typeface="Arial" charset="0"/>
+              <a:buChar char="•"/>
+              <a:defRPr sz="3200" kern="1200">
+                <a:solidFill>
+                  <a:schemeClr val="tx1"/>
+                </a:solidFill>
+                <a:latin typeface="+mn-lt"/>
+                <a:ea typeface="ＭＳ Ｐゴシック" charset="0"/>
+                <a:cs typeface="+mn-cs"/>
+              </a:defRPr>
+            </a:lvl1pPr>
+            <a:lvl2pPr marL="742950" indent="-285750" algn="l" rtl="0" fontAlgn="base">
+              <a:spcBef>
+                <a:spcPct val="20000"/>
+              </a:spcBef>
+              <a:spcAft>
+                <a:spcPct val="0"/>
+              </a:spcAft>
+              <a:buFont typeface="Arial" charset="0"/>
+              <a:buChar char="–"/>
+              <a:defRPr sz="2800" kern="1200">
+                <a:solidFill>
+                  <a:schemeClr val="tx1"/>
+                </a:solidFill>
+                <a:latin typeface="+mn-lt"/>
+                <a:ea typeface="ＭＳ Ｐゴシック" charset="0"/>
+                <a:cs typeface="+mn-cs"/>
+              </a:defRPr>
+            </a:lvl2pPr>
+            <a:lvl3pPr marL="1143000" indent="-228600" algn="l" rtl="0" fontAlgn="base">
+              <a:spcBef>
+                <a:spcPct val="20000"/>
+              </a:spcBef>
+              <a:spcAft>
+                <a:spcPct val="0"/>
+              </a:spcAft>
+              <a:buFont typeface="Arial" charset="0"/>
+              <a:buChar char="•"/>
+              <a:defRPr sz="2400" kern="1200">
+                <a:solidFill>
+                  <a:schemeClr val="tx1"/>
+                </a:solidFill>
+                <a:latin typeface="+mn-lt"/>
+                <a:ea typeface="ＭＳ Ｐゴシック" charset="0"/>
+                <a:cs typeface="+mn-cs"/>
+              </a:defRPr>
+            </a:lvl3pPr>
+            <a:lvl4pPr marL="1600200" indent="-228600" algn="l" rtl="0" fontAlgn="base">
+              <a:spcBef>
+                <a:spcPct val="20000"/>
+              </a:spcBef>
+              <a:spcAft>
+                <a:spcPct val="0"/>
+              </a:spcAft>
+              <a:buFont typeface="Arial" charset="0"/>
+              <a:buChar char="–"/>
+              <a:defRPr sz="2000" kern="1200">
+                <a:solidFill>
+                  <a:schemeClr val="tx1"/>
+                </a:solidFill>
+                <a:latin typeface="+mn-lt"/>
+                <a:ea typeface="ＭＳ Ｐゴシック" charset="0"/>
+                <a:cs typeface="+mn-cs"/>
+              </a:defRPr>
+            </a:lvl4pPr>
+            <a:lvl5pPr marL="2057400" indent="-228600" algn="l" rtl="0" fontAlgn="base">
+              <a:spcBef>
+                <a:spcPct val="20000"/>
+              </a:spcBef>
+              <a:spcAft>
+                <a:spcPct val="0"/>
+              </a:spcAft>
+              <a:buFont typeface="Arial" charset="0"/>
+              <a:buChar char="»"/>
+              <a:defRPr sz="2000" kern="1200">
+                <a:solidFill>
+                  <a:schemeClr val="tx1"/>
+                </a:solidFill>
+                <a:latin typeface="+mn-lt"/>
+                <a:ea typeface="ＭＳ Ｐゴシック" charset="0"/>
+                <a:cs typeface="+mn-cs"/>
+              </a:defRPr>
+            </a:lvl5pPr>
+            <a:lvl6pPr marL="2514600" indent="-228600" algn="l" defTabSz="914400" rtl="0" eaLnBrk="1" latinLnBrk="0" hangingPunct="1">
+              <a:spcBef>
+                <a:spcPct val="20000"/>
+              </a:spcBef>
+              <a:buFont typeface="Arial" pitchFamily="34" charset="0"/>
+              <a:buChar char="•"/>
+              <a:defRPr sz="2000" kern="1200">
+                <a:solidFill>
+                  <a:schemeClr val="tx1"/>
+                </a:solidFill>
+                <a:latin typeface="+mn-lt"/>
+                <a:ea typeface="+mn-ea"/>
+                <a:cs typeface="+mn-cs"/>
+              </a:defRPr>
+            </a:lvl6pPr>
+            <a:lvl7pPr marL="2971800" indent="-228600" algn="l" defTabSz="914400" rtl="0" eaLnBrk="1" latinLnBrk="0" hangingPunct="1">
+              <a:spcBef>
+                <a:spcPct val="20000"/>
+              </a:spcBef>
+              <a:buFont typeface="Arial" pitchFamily="34" charset="0"/>
+              <a:buChar char="•"/>
+              <a:defRPr sz="2000" kern="1200">
+                <a:solidFill>
+                  <a:schemeClr val="tx1"/>
+                </a:solidFill>
+                <a:latin typeface="+mn-lt"/>
+                <a:ea typeface="+mn-ea"/>
+                <a:cs typeface="+mn-cs"/>
+              </a:defRPr>
+            </a:lvl7pPr>
+            <a:lvl8pPr marL="3429000" indent="-228600" algn="l" defTabSz="914400" rtl="0" eaLnBrk="1" latinLnBrk="0" hangingPunct="1">
+              <a:spcBef>
+                <a:spcPct val="20000"/>
+              </a:spcBef>
+              <a:buFont typeface="Arial" pitchFamily="34" charset="0"/>
+              <a:buChar char="•"/>
+              <a:defRPr sz="2000" kern="1200">
+                <a:solidFill>
+                  <a:schemeClr val="tx1"/>
+                </a:solidFill>
+                <a:latin typeface="+mn-lt"/>
+                <a:ea typeface="+mn-ea"/>
+                <a:cs typeface="+mn-cs"/>
+              </a:defRPr>
+            </a:lvl8pPr>
+            <a:lvl9pPr marL="3886200" indent="-228600" algn="l" defTabSz="914400" rtl="0" eaLnBrk="1" latinLnBrk="0" hangingPunct="1">
+              <a:spcBef>
+                <a:spcPct val="20000"/>
+              </a:spcBef>
+              <a:buFont typeface="Arial" pitchFamily="34" charset="0"/>
+              <a:buChar char="•"/>
+              <a:defRPr sz="2000" kern="1200">
+                <a:solidFill>
+                  <a:schemeClr val="tx1"/>
+                </a:solidFill>
+                <a:latin typeface="+mn-lt"/>
+                <a:ea typeface="+mn-ea"/>
+                <a:cs typeface="+mn-cs"/>
+              </a:defRPr>
+            </a:lvl9pPr>
+          </a:lstStyle>
+          <a:p>
+            <a:pPr marL="0" lvl="1" indent="0">
+              <a:buFont typeface="Arial" charset="0"/>
+              <a:buNone/>
+            </a:pPr>
+            <a:r>
+              <a:rPr lang="es-CR" sz="2400" dirty="0" smtClean="0">
+                <a:latin typeface="Calibri" charset="0"/>
+              </a:rPr>
+              <a:t>def greet2(texto, &amp;my_block)</a:t>
+            </a:r>
+          </a:p>
+          <a:p>
+            <a:pPr marL="0" lvl="1" indent="0">
+              <a:buFont typeface="Arial" charset="0"/>
+              <a:buNone/>
+            </a:pPr>
+            <a:r>
+              <a:rPr lang="es-CR" sz="2400" dirty="0" smtClean="0">
+                <a:latin typeface="Calibri" charset="0"/>
+              </a:rPr>
+              <a:t>  puts “el saludo para mi gente es: #{texto}”</a:t>
+            </a:r>
+          </a:p>
+          <a:p>
+            <a:pPr marL="0" lvl="1" indent="0">
+              <a:buNone/>
+            </a:pPr>
+            <a:r>
+              <a:rPr lang="es-CR" sz="2400" dirty="0" smtClean="0">
+                <a:latin typeface="Calibri" charset="0"/>
+              </a:rPr>
+              <a:t>  puts my_block.call(rand(10), rand(50))</a:t>
+            </a:r>
+          </a:p>
+          <a:p>
+            <a:pPr marL="0" lvl="1" indent="0">
+              <a:buNone/>
+            </a:pPr>
+            <a:r>
+              <a:rPr lang="es-CR" sz="2400" dirty="0">
+                <a:latin typeface="Calibri" charset="0"/>
+              </a:rPr>
+              <a:t> </a:t>
+            </a:r>
+            <a:r>
+              <a:rPr lang="es-CR" sz="2400" dirty="0" smtClean="0">
+                <a:latin typeface="Calibri" charset="0"/>
+              </a:rPr>
+              <a:t> puts “un placer haberlo visto”</a:t>
+            </a:r>
+          </a:p>
+          <a:p>
+            <a:pPr marL="0" lvl="1" indent="0">
+              <a:buFont typeface="Arial" charset="0"/>
+              <a:buNone/>
+            </a:pPr>
+            <a:r>
+              <a:rPr lang="es-CR" sz="2400" dirty="0" smtClean="0">
+                <a:latin typeface="Calibri" charset="0"/>
+              </a:rPr>
+              <a:t>end</a:t>
+            </a:r>
+          </a:p>
+          <a:p>
+            <a:pPr marL="0" lvl="1" indent="0">
+              <a:buFont typeface="Arial" charset="0"/>
+              <a:buNone/>
+            </a:pPr>
+            <a:r>
+              <a:rPr lang="es-CR" sz="2400" dirty="0" smtClean="0">
+                <a:latin typeface="Calibri" charset="0"/>
+              </a:rPr>
+              <a:t>greet2 (“hola!!!!”) </a:t>
+            </a:r>
+            <a:r>
+              <a:rPr lang="ro-RO" sz="2400" dirty="0" smtClean="0">
+                <a:latin typeface="Calibri" charset="0"/>
+              </a:rPr>
+              <a:t>{ |x,y| "#{x}, #{y}" }</a:t>
+            </a:r>
+            <a:endParaRPr lang="es-CR" sz="2400" dirty="0">
+              <a:latin typeface="Calibri" charset="0"/>
+            </a:endParaRPr>
           </a:p>
         </p:txBody>
       </p:sp>
     </p:spTree>
     <p:extLst>
       <p:ext uri="{BB962C8B-B14F-4D97-AF65-F5344CB8AC3E}">
-        <p14:creationId xmlns:p14="http://schemas.microsoft.com/office/powerpoint/2010/main" val="997147293"/>
+        <p14:creationId xmlns:p14="http://schemas.microsoft.com/office/powerpoint/2010/main" val="4057227463"/>
       </p:ext>
     </p:extLst>
   </p:cSld>
   <p:clrMapOvr>
     <a:masterClrMapping/>
   </p:clrMapOvr>
+  <p:timing>
+    <p:tnLst>
+      <p:par>
+        <p:cTn xmlns:p14="http://schemas.microsoft.com/office/powerpoint/2010/main" id="1" dur="indefinite" restart="never" nodeType="tmRoot"/>
+      </p:par>
+    </p:tnLst>
+  </p:timing>
 </p:sld>
 </file>
 
@@ -9821,7 +10890,7 @@
       </p:grpSpPr>
       <p:sp>
         <p:nvSpPr>
-          <p:cNvPr id="17410" name="1 Título"/>
+          <p:cNvPr id="3074" name="1 Título"/>
           <p:cNvSpPr>
             <a:spLocks noGrp="1"/>
           </p:cNvSpPr>
@@ -9831,8 +10900,8 @@
         </p:nvSpPr>
         <p:spPr>
           <a:xfrm>
-            <a:off x="457200" y="-171450"/>
-            <a:ext cx="8229600" cy="1143000"/>
+            <a:off x="457200" y="-100013"/>
+            <a:ext cx="8229600" cy="1143001"/>
           </a:xfrm>
         </p:spPr>
         <p:txBody>
@@ -9843,13 +10912,25 @@
               <a:rPr lang="es-CR" dirty="0" smtClean="0">
                 <a:latin typeface="Calibri" charset="0"/>
               </a:rPr>
-              <a:t>Modulos </a:t>
+              <a:t>Bloques de código </a:t>
             </a:r>
             <a:r>
               <a:rPr lang="es-CR" sz="2000" dirty="0" smtClean="0">
                 <a:latin typeface="Calibri" charset="0"/>
               </a:rPr>
-              <a:t>(1/3)</a:t>
+              <a:t>(5/</a:t>
+            </a:r>
+            <a:r>
+              <a:rPr lang="es-CR" sz="2000" dirty="0">
+                <a:latin typeface="Calibri" charset="0"/>
+              </a:rPr>
+              <a:t>6</a:t>
+            </a:r>
+            <a:r>
+              <a:rPr lang="es-CR" sz="2000" dirty="0" smtClean="0">
+                <a:latin typeface="Calibri" charset="0"/>
+              </a:rPr>
+              <a:t>)</a:t>
             </a:r>
             <a:endParaRPr lang="es-CR" dirty="0">
               <a:latin typeface="Calibri" charset="0"/>
@@ -9859,7 +10940,7 @@
       </p:sp>
       <p:sp>
         <p:nvSpPr>
-          <p:cNvPr id="17411" name="2 Marcador de contenido"/>
+          <p:cNvPr id="3075" name="2 Marcador de contenido"/>
           <p:cNvSpPr>
             <a:spLocks noGrp="1"/>
           </p:cNvSpPr>
@@ -9869,8 +10950,8 @@
         </p:nvSpPr>
         <p:spPr>
           <a:xfrm>
-            <a:off x="467544" y="1196752"/>
-            <a:ext cx="8229600" cy="4525963"/>
+            <a:off x="467544" y="1340769"/>
+            <a:ext cx="8229600" cy="3312368"/>
           </a:xfrm>
         </p:spPr>
         <p:txBody>
@@ -9878,16 +10959,44 @@
           <a:lstStyle/>
           <a:p>
             <a:r>
+              <a:rPr lang="es-CR" dirty="0">
+                <a:latin typeface="Calibri" charset="0"/>
+              </a:rPr>
+              <a:t>Los bloques no son objetos, pero pueden convertirse en ellos gracias a la clase Proc. </a:t>
+            </a:r>
+            <a:endParaRPr lang="es-CR" dirty="0" smtClean="0">
+              <a:latin typeface="Calibri" charset="0"/>
+            </a:endParaRPr>
+          </a:p>
+          <a:p>
+            <a:r>
               <a:rPr lang="es-CR" dirty="0" smtClean="0">
                 <a:latin typeface="Calibri" charset="0"/>
               </a:rPr>
-              <a:t>Son similares a las clases (con ciertas diferencias), pueden contener m</a:t>
-            </a:r>
+              <a:t>Los </a:t>
+            </a:r>
+            <a:r>
+              <a:rPr lang="es-CR" dirty="0">
+                <a:latin typeface="Calibri" charset="0"/>
+              </a:rPr>
+              <a:t>objetos tipo proc son bloques que se han unido a un conjuto de variables locales. </a:t>
+            </a:r>
+            <a:endParaRPr lang="es-CR" dirty="0" smtClean="0">
+              <a:latin typeface="Calibri" charset="0"/>
+            </a:endParaRPr>
+          </a:p>
+          <a:p>
             <a:r>
               <a:rPr lang="es-CR" dirty="0" smtClean="0">
                 <a:latin typeface="Calibri" charset="0"/>
               </a:rPr>
-              <a:t>étodos, variables, constantes, Clases y otros elementos</a:t>
+              <a:t>Esto </a:t>
+            </a:r>
+            <a:r>
+              <a:rPr lang="es-CR" dirty="0">
+                <a:latin typeface="Calibri" charset="0"/>
+              </a:rPr>
+              <a:t>se hace gracias al método lambda del módulo Kernel</a:t>
             </a:r>
             <a:r>
               <a:rPr lang="es-CR" dirty="0" smtClean="0">
@@ -9899,46 +11008,70 @@
               <a:latin typeface="Calibri" charset="0"/>
             </a:endParaRPr>
           </a:p>
-          <a:p>
-            <a:r>
-              <a:rPr lang="es-CR" dirty="0" smtClean="0">
-                <a:latin typeface="Calibri" charset="0"/>
-              </a:rPr>
-              <a:t>Sin embargo, no es posible crear clases que hereden de los m</a:t>
-            </a:r>
-            <a:r>
-              <a:rPr lang="es-CR" dirty="0" smtClean="0">
-                <a:latin typeface="Calibri" charset="0"/>
-              </a:rPr>
-              <a:t>ódulos, pero cualquier clase/módulo puede incluir funcionalidad de otros módulos.</a:t>
-            </a:r>
-            <a:endParaRPr lang="es-CR" dirty="0">
-              <a:latin typeface="Calibri" charset="0"/>
-            </a:endParaRPr>
-          </a:p>
-          <a:p>
-            <a:r>
-              <a:rPr lang="es-CR" dirty="0" smtClean="0">
-                <a:latin typeface="Calibri" charset="0"/>
-              </a:rPr>
-              <a:t>Los m</a:t>
-            </a:r>
-            <a:r>
-              <a:rPr lang="es-CR" dirty="0" smtClean="0">
-                <a:latin typeface="Calibri" charset="0"/>
-              </a:rPr>
-              <a:t>ódulos se utilizan para añadir funcionalidades generalizables o librerías</a:t>
-            </a:r>
-            <a:endParaRPr lang="es-CR" dirty="0">
-              <a:latin typeface="Calibri" charset="0"/>
-            </a:endParaRPr>
+        </p:txBody>
+      </p:sp>
+      <p:sp>
+        <p:nvSpPr>
+          <p:cNvPr id="2" name="Rectángulo 1"/>
+          <p:cNvSpPr/>
+          <p:nvPr/>
+        </p:nvSpPr>
+        <p:spPr>
+          <a:xfrm>
+            <a:off x="1187624" y="4941168"/>
+            <a:ext cx="4572000" cy="1077218"/>
+          </a:xfrm>
+          <a:prstGeom prst="rect">
+            <a:avLst/>
+          </a:prstGeom>
+        </p:spPr>
+        <p:style>
+          <a:lnRef idx="2">
+            <a:schemeClr val="accent1"/>
+          </a:lnRef>
+          <a:fillRef idx="1">
+            <a:schemeClr val="lt1"/>
+          </a:fillRef>
+          <a:effectRef idx="0">
+            <a:schemeClr val="accent1"/>
+          </a:effectRef>
+          <a:fontRef idx="minor">
+            <a:schemeClr val="dk1"/>
+          </a:fontRef>
+        </p:style>
+        <p:txBody>
+          <a:bodyPr>
+            <a:spAutoFit/>
+          </a:bodyPr>
+          <a:lstStyle/>
+          <a:p>
+            <a:pPr marL="0" indent="0">
+              <a:buNone/>
+            </a:pPr>
+            <a:r>
+              <a:rPr lang="es-CR" sz="3200" dirty="0">
+                <a:latin typeface="Calibri" charset="0"/>
+              </a:rPr>
+              <a:t>prc = lambda{ "hola" }</a:t>
+            </a:r>
+          </a:p>
+          <a:p>
+            <a:pPr marL="0" indent="0">
+              <a:buNone/>
+            </a:pPr>
+            <a:r>
+              <a:rPr lang="es-CR" sz="3200" dirty="0">
+                <a:latin typeface="Calibri" charset="0"/>
+              </a:rPr>
+              <a:t>puts prc.call</a:t>
+            </a:r>
           </a:p>
         </p:txBody>
       </p:sp>
     </p:spTree>
     <p:extLst>
       <p:ext uri="{BB962C8B-B14F-4D97-AF65-F5344CB8AC3E}">
-        <p14:creationId xmlns:p14="http://schemas.microsoft.com/office/powerpoint/2010/main" val="3758000107"/>
+        <p14:creationId xmlns:p14="http://schemas.microsoft.com/office/powerpoint/2010/main" val="2004176984"/>
       </p:ext>
     </p:extLst>
   </p:cSld>
@@ -9974,7 +11107,7 @@
       </p:grpSpPr>
       <p:sp>
         <p:nvSpPr>
-          <p:cNvPr id="2" name="Título 1"/>
+          <p:cNvPr id="3074" name="1 Título"/>
           <p:cNvSpPr>
             <a:spLocks noGrp="1"/>
           </p:cNvSpPr>
@@ -9984,8 +11117,8 @@
         </p:nvSpPr>
         <p:spPr>
           <a:xfrm>
-            <a:off x="467544" y="-99392"/>
-            <a:ext cx="8229600" cy="1143000"/>
+            <a:off x="457200" y="-100013"/>
+            <a:ext cx="8229600" cy="1143001"/>
           </a:xfrm>
         </p:spPr>
         <p:txBody>
@@ -9993,28 +11126,38 @@
           <a:lstStyle/>
           <a:p>
             <a:r>
-              <a:rPr lang="es-ES_tradnl" dirty="0" smtClean="0"/>
-              <a:t>M</a:t>
-            </a:r>
-            <a:r>
-              <a:rPr lang="es-ES_tradnl" dirty="0" smtClean="0"/>
-              <a:t>ó</a:t>
-            </a:r>
-            <a:r>
-              <a:rPr lang="es-ES_tradnl" dirty="0" smtClean="0"/>
-              <a:t>dulos </a:t>
-            </a:r>
-            <a:r>
-              <a:rPr lang="es-ES_tradnl" sz="2000" dirty="0" smtClean="0"/>
-              <a:t>(2/3)</a:t>
-            </a:r>
-            <a:endParaRPr lang="es-ES_tradnl" dirty="0"/>
+              <a:rPr lang="es-CR" dirty="0" smtClean="0">
+                <a:latin typeface="Calibri" charset="0"/>
+              </a:rPr>
+              <a:t>Bloques de código </a:t>
+            </a:r>
+            <a:r>
+              <a:rPr lang="es-CR" sz="2000" dirty="0" smtClean="0">
+                <a:latin typeface="Calibri" charset="0"/>
+              </a:rPr>
+              <a:t>(</a:t>
+            </a:r>
+            <a:r>
+              <a:rPr lang="es-CR" sz="2000" dirty="0">
+                <a:latin typeface="Calibri" charset="0"/>
+              </a:rPr>
+              <a:t>6</a:t>
+            </a:r>
+            <a:r>
+              <a:rPr lang="es-CR" sz="2000" dirty="0" smtClean="0">
+                <a:latin typeface="Calibri" charset="0"/>
+              </a:rPr>
+              <a:t>/6)</a:t>
+            </a:r>
+            <a:endParaRPr lang="es-CR" dirty="0">
+              <a:latin typeface="Calibri" charset="0"/>
+            </a:endParaRPr>
           </a:p>
         </p:txBody>
       </p:sp>
       <p:sp>
         <p:nvSpPr>
-          <p:cNvPr id="3" name="Marcador de contenido 2"/>
+          <p:cNvPr id="3075" name="2 Marcador de contenido"/>
           <p:cNvSpPr>
             <a:spLocks noGrp="1"/>
           </p:cNvSpPr>
@@ -10022,25 +11165,149 @@
             <p:ph idx="1"/>
           </p:nvPr>
         </p:nvSpPr>
-        <p:spPr/>
+        <p:spPr>
+          <a:xfrm>
+            <a:off x="467544" y="1340768"/>
+            <a:ext cx="8229600" cy="4525963"/>
+          </a:xfrm>
+        </p:spPr>
         <p:txBody>
           <a:bodyPr/>
           <a:lstStyle/>
           <a:p>
-            <a:endParaRPr lang="es-ES_tradnl"/>
+            <a:pPr marL="0" indent="0">
+              <a:buNone/>
+            </a:pPr>
+            <a:r>
+              <a:rPr lang="es-CR" dirty="0">
+                <a:latin typeface="Calibri" charset="0"/>
+              </a:rPr>
+              <a:t>prc = lambda {puts 'Hola'}</a:t>
+            </a:r>
+          </a:p>
+          <a:p>
+            <a:pPr marL="0" indent="0">
+              <a:buNone/>
+            </a:pPr>
+            <a:r>
+              <a:rPr lang="es-CR" dirty="0" smtClean="0">
+                <a:latin typeface="Calibri" charset="0"/>
+              </a:rPr>
+              <a:t>prc.call </a:t>
+            </a:r>
+            <a:r>
+              <a:rPr lang="es-CR" dirty="0">
+                <a:latin typeface="Calibri" charset="0"/>
+              </a:rPr>
+              <a:t>#llamamos al bloque</a:t>
+            </a:r>
+          </a:p>
+          <a:p>
+            <a:pPr marL="0" indent="0">
+              <a:buNone/>
+            </a:pPr>
+            <a:r>
+              <a:rPr lang="es-CR" dirty="0">
+                <a:latin typeface="Calibri" charset="0"/>
+              </a:rPr>
+              <a:t> </a:t>
+            </a:r>
+          </a:p>
+          <a:p>
+            <a:pPr marL="0" indent="0">
+              <a:buNone/>
+            </a:pPr>
+            <a:r>
+              <a:rPr lang="es-CR" dirty="0">
+                <a:latin typeface="Calibri" charset="0"/>
+              </a:rPr>
+              <a:t>#otro ejemplo</a:t>
+            </a:r>
+          </a:p>
+          <a:p>
+            <a:pPr marL="0" indent="0">
+              <a:buNone/>
+            </a:pPr>
+            <a:r>
+              <a:rPr lang="es-CR" dirty="0" smtClean="0">
+                <a:latin typeface="Calibri" charset="0"/>
+              </a:rPr>
+              <a:t>toast </a:t>
+            </a:r>
+            <a:r>
+              <a:rPr lang="es-CR" dirty="0">
+                <a:latin typeface="Calibri" charset="0"/>
+              </a:rPr>
+              <a:t>= lambda do</a:t>
+            </a:r>
+          </a:p>
+          <a:p>
+            <a:pPr marL="0" indent="0">
+              <a:buNone/>
+            </a:pPr>
+            <a:r>
+              <a:rPr lang="es-CR" dirty="0">
+                <a:latin typeface="Calibri" charset="0"/>
+              </a:rPr>
+              <a:t> </a:t>
+            </a:r>
+            <a:r>
+              <a:rPr lang="es-CR" dirty="0" smtClean="0">
+                <a:latin typeface="Calibri" charset="0"/>
+              </a:rPr>
+              <a:t> puts </a:t>
+            </a:r>
+            <a:r>
+              <a:rPr lang="es-CR" dirty="0">
+                <a:latin typeface="Calibri" charset="0"/>
+              </a:rPr>
+              <a:t>'Gracias'</a:t>
+            </a:r>
+          </a:p>
+          <a:p>
+            <a:pPr marL="0" indent="0">
+              <a:buNone/>
+            </a:pPr>
+            <a:r>
+              <a:rPr lang="es-CR" dirty="0">
+                <a:latin typeface="Calibri" charset="0"/>
+              </a:rPr>
+              <a:t>end</a:t>
+            </a:r>
+          </a:p>
+          <a:p>
+            <a:pPr marL="0" indent="0">
+              <a:buNone/>
+            </a:pPr>
+            <a:r>
+              <a:rPr lang="es-CR" dirty="0">
+                <a:latin typeface="Calibri" charset="0"/>
+              </a:rPr>
+              <a:t>toast.call</a:t>
+            </a:r>
+            <a:endParaRPr lang="es-CR" dirty="0" smtClean="0">
+              <a:latin typeface="Calibri" charset="0"/>
+            </a:endParaRPr>
           </a:p>
         </p:txBody>
       </p:sp>
     </p:spTree>
     <p:extLst>
       <p:ext uri="{BB962C8B-B14F-4D97-AF65-F5344CB8AC3E}">
-        <p14:creationId xmlns:p14="http://schemas.microsoft.com/office/powerpoint/2010/main" val="1214352194"/>
+        <p14:creationId xmlns:p14="http://schemas.microsoft.com/office/powerpoint/2010/main" val="1687461442"/>
       </p:ext>
     </p:extLst>
   </p:cSld>
   <p:clrMapOvr>
     <a:masterClrMapping/>
   </p:clrMapOvr>
+  <p:timing>
+    <p:tnLst>
+      <p:par>
+        <p:cTn xmlns:p14="http://schemas.microsoft.com/office/powerpoint/2010/main" id="1" dur="indefinite" restart="never" nodeType="tmRoot"/>
+      </p:par>
+    </p:tnLst>
+  </p:timing>
 </p:sld>
 </file>
 
@@ -10407,7 +11674,7 @@
         </p:nvSpPr>
         <p:spPr>
           <a:xfrm>
-            <a:off x="467544" y="-99392"/>
+            <a:off x="395536" y="-171400"/>
             <a:ext cx="8229600" cy="1143000"/>
           </a:xfrm>
         </p:spPr>
@@ -10417,19 +11684,7 @@
           <a:p>
             <a:r>
               <a:rPr lang="es-ES_tradnl" dirty="0" smtClean="0"/>
-              <a:t>M</a:t>
-            </a:r>
-            <a:r>
-              <a:rPr lang="es-ES_tradnl" dirty="0" smtClean="0"/>
-              <a:t>ó</a:t>
-            </a:r>
-            <a:r>
-              <a:rPr lang="es-ES_tradnl" dirty="0" smtClean="0"/>
-              <a:t>dulos </a:t>
-            </a:r>
-            <a:r>
-              <a:rPr lang="es-ES_tradnl" sz="2000" dirty="0" smtClean="0"/>
-              <a:t>(3/3)</a:t>
+              <a:t>Trabajo 4: Bloques</a:t>
             </a:r>
             <a:endParaRPr lang="es-ES_tradnl" dirty="0"/>
           </a:p>
@@ -10450,7 +11705,1029 @@
           <a:bodyPr/>
           <a:lstStyle/>
           <a:p>
-            <a:endParaRPr lang="es-ES_tradnl"/>
+            <a:r>
+              <a:rPr lang="es-ES_tradnl" dirty="0" smtClean="0"/>
+              <a:t>Hacer un m</a:t>
+            </a:r>
+            <a:r>
+              <a:rPr lang="es-ES_tradnl" dirty="0" smtClean="0"/>
+              <a:t>étodo “suma” que reciba de parámetro un arreglo de números y un bloque</a:t>
+            </a:r>
+          </a:p>
+          <a:p>
+            <a:pPr lvl="1"/>
+            <a:r>
+              <a:rPr lang="es-ES_tradnl" dirty="0" smtClean="0"/>
+              <a:t>Arreglo de prueba: [7,6,5,4,3,2,1]</a:t>
+            </a:r>
+          </a:p>
+          <a:p>
+            <a:pPr lvl="1"/>
+            <a:r>
+              <a:rPr lang="es-ES_tradnl" dirty="0" smtClean="0"/>
+              <a:t>Bloque: {|total, valor| total + valor }</a:t>
+            </a:r>
+          </a:p>
+          <a:p>
+            <a:pPr lvl="1"/>
+            <a:endParaRPr lang="es-ES_tradnl" dirty="0"/>
+          </a:p>
+          <a:p>
+            <a:r>
+              <a:rPr lang="es-ES_tradnl" dirty="0" smtClean="0"/>
+              <a:t>La clase </a:t>
+            </a:r>
+            <a:r>
+              <a:rPr lang="es-ES_tradnl" dirty="0" err="1" smtClean="0"/>
+              <a:t>Array</a:t>
+            </a:r>
+            <a:r>
+              <a:rPr lang="es-ES_tradnl" dirty="0" smtClean="0"/>
+              <a:t> tiene un método llamado “</a:t>
+            </a:r>
+            <a:r>
+              <a:rPr lang="es-ES_tradnl" dirty="0" err="1" smtClean="0"/>
+              <a:t>map</a:t>
+            </a:r>
+            <a:r>
+              <a:rPr lang="es-ES_tradnl" dirty="0" smtClean="0"/>
+              <a:t>” o “</a:t>
+            </a:r>
+            <a:r>
+              <a:rPr lang="es-ES_tradnl" dirty="0" err="1" smtClean="0"/>
+              <a:t>collect</a:t>
+            </a:r>
+            <a:r>
+              <a:rPr lang="es-ES_tradnl" dirty="0" smtClean="0"/>
+              <a:t>”, utilizar ese método para convertir:</a:t>
+            </a:r>
+          </a:p>
+          <a:p>
+            <a:pPr lvl="1"/>
+            <a:r>
+              <a:rPr lang="es-ES_tradnl" dirty="0" smtClean="0"/>
+              <a:t>[‘agua’, ‘tierra’, ‘aire’, ‘fuego’] en: [{</a:t>
+            </a:r>
+            <a:r>
+              <a:rPr lang="es-ES_tradnl" dirty="0" err="1" smtClean="0"/>
+              <a:t>name</a:t>
+            </a:r>
+            <a:r>
+              <a:rPr lang="es-ES_tradnl" dirty="0" smtClean="0"/>
+              <a:t>: ‘agua’, id: 1},{</a:t>
+            </a:r>
+            <a:r>
+              <a:rPr lang="es-ES_tradnl" dirty="0" err="1" smtClean="0"/>
+              <a:t>name</a:t>
+            </a:r>
+            <a:r>
+              <a:rPr lang="es-ES_tradnl" dirty="0" smtClean="0"/>
+              <a:t>: ‘tierra’, id:2}, …]</a:t>
+            </a:r>
+            <a:endParaRPr lang="es-ES_tradnl" dirty="0"/>
+          </a:p>
+        </p:txBody>
+      </p:sp>
+    </p:spTree>
+    <p:extLst>
+      <p:ext uri="{BB962C8B-B14F-4D97-AF65-F5344CB8AC3E}">
+        <p14:creationId xmlns:p14="http://schemas.microsoft.com/office/powerpoint/2010/main" val="997147293"/>
+      </p:ext>
+    </p:extLst>
+  </p:cSld>
+  <p:clrMapOvr>
+    <a:masterClrMapping/>
+  </p:clrMapOvr>
+</p:sld>
+</file>
+
+<file path=ppt/slides/slide31.xml><?xml version="1.0" encoding="utf-8"?>
+<p:sld xmlns:a="http://schemas.openxmlformats.org/drawingml/2006/main" xmlns:r="http://schemas.openxmlformats.org/officeDocument/2006/relationships" xmlns:p="http://schemas.openxmlformats.org/presentationml/2006/main">
+  <p:cSld>
+    <p:spTree>
+      <p:nvGrpSpPr>
+        <p:cNvPr id="1" name=""/>
+        <p:cNvGrpSpPr/>
+        <p:nvPr/>
+      </p:nvGrpSpPr>
+      <p:grpSpPr>
+        <a:xfrm>
+          <a:off x="0" y="0"/>
+          <a:ext cx="0" cy="0"/>
+          <a:chOff x="0" y="0"/>
+          <a:chExt cx="0" cy="0"/>
+        </a:xfrm>
+      </p:grpSpPr>
+      <p:sp>
+        <p:nvSpPr>
+          <p:cNvPr id="17410" name="1 Título"/>
+          <p:cNvSpPr>
+            <a:spLocks noGrp="1"/>
+          </p:cNvSpPr>
+          <p:nvPr>
+            <p:ph type="title"/>
+          </p:nvPr>
+        </p:nvSpPr>
+        <p:spPr>
+          <a:xfrm>
+            <a:off x="457200" y="-171450"/>
+            <a:ext cx="8229600" cy="1143000"/>
+          </a:xfrm>
+        </p:spPr>
+        <p:txBody>
+          <a:bodyPr/>
+          <a:lstStyle/>
+          <a:p>
+            <a:r>
+              <a:rPr lang="es-CR" dirty="0" smtClean="0">
+                <a:latin typeface="Calibri" charset="0"/>
+              </a:rPr>
+              <a:t>Modulos </a:t>
+            </a:r>
+            <a:r>
+              <a:rPr lang="es-CR" sz="2000" dirty="0" smtClean="0">
+                <a:latin typeface="Calibri" charset="0"/>
+              </a:rPr>
+              <a:t>(1/3)</a:t>
+            </a:r>
+            <a:endParaRPr lang="es-CR" dirty="0">
+              <a:latin typeface="Calibri" charset="0"/>
+            </a:endParaRPr>
+          </a:p>
+        </p:txBody>
+      </p:sp>
+      <p:sp>
+        <p:nvSpPr>
+          <p:cNvPr id="17411" name="2 Marcador de contenido"/>
+          <p:cNvSpPr>
+            <a:spLocks noGrp="1"/>
+          </p:cNvSpPr>
+          <p:nvPr>
+            <p:ph idx="1"/>
+          </p:nvPr>
+        </p:nvSpPr>
+        <p:spPr>
+          <a:xfrm>
+            <a:off x="467544" y="1196752"/>
+            <a:ext cx="8229600" cy="4525963"/>
+          </a:xfrm>
+        </p:spPr>
+        <p:txBody>
+          <a:bodyPr/>
+          <a:lstStyle/>
+          <a:p>
+            <a:r>
+              <a:rPr lang="es-CR" dirty="0" smtClean="0">
+                <a:latin typeface="Calibri" charset="0"/>
+              </a:rPr>
+              <a:t>Son similares a las clases (con ciertas diferencias), pueden contener métodos, variables, constantes, Clases y otros elementos.</a:t>
+            </a:r>
+            <a:endParaRPr lang="es-CR" dirty="0">
+              <a:latin typeface="Calibri" charset="0"/>
+            </a:endParaRPr>
+          </a:p>
+          <a:p>
+            <a:r>
+              <a:rPr lang="es-CR" dirty="0" smtClean="0">
+                <a:latin typeface="Calibri" charset="0"/>
+              </a:rPr>
+              <a:t>No </a:t>
+            </a:r>
+            <a:r>
+              <a:rPr lang="es-CR" dirty="0" smtClean="0">
+                <a:latin typeface="Calibri" charset="0"/>
+              </a:rPr>
+              <a:t>es posible crear clases que hereden de los módulos, pero cualquier clase/módulo puede incluir funcionalidad de otros módulos.</a:t>
+            </a:r>
+            <a:endParaRPr lang="es-CR" dirty="0">
+              <a:latin typeface="Calibri" charset="0"/>
+            </a:endParaRPr>
+          </a:p>
+          <a:p>
+            <a:r>
+              <a:rPr lang="es-CR" dirty="0" smtClean="0">
+                <a:latin typeface="Calibri" charset="0"/>
+              </a:rPr>
+              <a:t>Los módulos se utilizan para añadir funcionalidades generalizables o librerías</a:t>
+            </a:r>
+            <a:endParaRPr lang="es-CR" dirty="0">
+              <a:latin typeface="Calibri" charset="0"/>
+            </a:endParaRPr>
+          </a:p>
+        </p:txBody>
+      </p:sp>
+    </p:spTree>
+    <p:extLst>
+      <p:ext uri="{BB962C8B-B14F-4D97-AF65-F5344CB8AC3E}">
+        <p14:creationId xmlns:p14="http://schemas.microsoft.com/office/powerpoint/2010/main" val="3758000107"/>
+      </p:ext>
+    </p:extLst>
+  </p:cSld>
+  <p:clrMapOvr>
+    <a:masterClrMapping/>
+  </p:clrMapOvr>
+  <p:timing>
+    <p:tnLst>
+      <p:par>
+        <p:cTn xmlns:p14="http://schemas.microsoft.com/office/powerpoint/2010/main" id="1" dur="indefinite" restart="never" nodeType="tmRoot"/>
+      </p:par>
+    </p:tnLst>
+  </p:timing>
+</p:sld>
+</file>
+
+<file path=ppt/slides/slide32.xml><?xml version="1.0" encoding="utf-8"?>
+<p:sld xmlns:a="http://schemas.openxmlformats.org/drawingml/2006/main" xmlns:r="http://schemas.openxmlformats.org/officeDocument/2006/relationships" xmlns:p="http://schemas.openxmlformats.org/presentationml/2006/main">
+  <p:cSld>
+    <p:spTree>
+      <p:nvGrpSpPr>
+        <p:cNvPr id="1" name=""/>
+        <p:cNvGrpSpPr/>
+        <p:nvPr/>
+      </p:nvGrpSpPr>
+      <p:grpSpPr>
+        <a:xfrm>
+          <a:off x="0" y="0"/>
+          <a:ext cx="0" cy="0"/>
+          <a:chOff x="0" y="0"/>
+          <a:chExt cx="0" cy="0"/>
+        </a:xfrm>
+      </p:grpSpPr>
+      <p:sp>
+        <p:nvSpPr>
+          <p:cNvPr id="2" name="Título 1"/>
+          <p:cNvSpPr>
+            <a:spLocks noGrp="1"/>
+          </p:cNvSpPr>
+          <p:nvPr>
+            <p:ph type="title"/>
+          </p:nvPr>
+        </p:nvSpPr>
+        <p:spPr>
+          <a:xfrm>
+            <a:off x="467544" y="-99392"/>
+            <a:ext cx="8229600" cy="1143000"/>
+          </a:xfrm>
+        </p:spPr>
+        <p:txBody>
+          <a:bodyPr/>
+          <a:lstStyle/>
+          <a:p>
+            <a:r>
+              <a:rPr lang="es-ES_tradnl" dirty="0" smtClean="0"/>
+              <a:t>Módulos </a:t>
+            </a:r>
+            <a:r>
+              <a:rPr lang="es-ES_tradnl" sz="2000" dirty="0" smtClean="0"/>
+              <a:t>(2/3)</a:t>
+            </a:r>
+            <a:endParaRPr lang="es-ES_tradnl" dirty="0"/>
+          </a:p>
+        </p:txBody>
+      </p:sp>
+      <p:sp>
+        <p:nvSpPr>
+          <p:cNvPr id="3" name="Marcador de contenido 2"/>
+          <p:cNvSpPr>
+            <a:spLocks noGrp="1"/>
+          </p:cNvSpPr>
+          <p:nvPr>
+            <p:ph idx="1"/>
+          </p:nvPr>
+        </p:nvSpPr>
+        <p:spPr>
+          <a:xfrm>
+            <a:off x="467544" y="1196752"/>
+            <a:ext cx="3168352" cy="4525963"/>
+          </a:xfrm>
+        </p:spPr>
+        <p:txBody>
+          <a:bodyPr/>
+          <a:lstStyle/>
+          <a:p>
+            <a:pPr marL="0" indent="0">
+              <a:buNone/>
+            </a:pPr>
+            <a:r>
+              <a:rPr lang="en-US" sz="2400" dirty="0" smtClean="0"/>
+              <a:t>module </a:t>
+            </a:r>
+            <a:r>
+              <a:rPr lang="en-US" sz="2400" dirty="0"/>
+              <a:t>Trig  </a:t>
+            </a:r>
+          </a:p>
+          <a:p>
+            <a:pPr marL="0" indent="0">
+              <a:buNone/>
+            </a:pPr>
+            <a:r>
+              <a:rPr lang="en-US" sz="2400" dirty="0"/>
+              <a:t>  PI = 3.1416  </a:t>
+            </a:r>
+          </a:p>
+          <a:p>
+            <a:pPr marL="0" indent="0">
+              <a:buNone/>
+            </a:pPr>
+            <a:r>
+              <a:rPr lang="en-US" sz="2400" dirty="0"/>
+              <a:t>  # </a:t>
+            </a:r>
+            <a:r>
+              <a:rPr lang="en-US" sz="2400" dirty="0" err="1"/>
+              <a:t>métodos</a:t>
+            </a:r>
+            <a:r>
+              <a:rPr lang="en-US" sz="2400" dirty="0"/>
+              <a:t> </a:t>
+            </a:r>
+          </a:p>
+          <a:p>
+            <a:pPr marL="0" indent="0">
+              <a:buNone/>
+            </a:pPr>
+            <a:r>
+              <a:rPr lang="en-US" sz="2400" dirty="0"/>
+              <a:t>  </a:t>
+            </a:r>
+            <a:r>
+              <a:rPr lang="en-US" sz="2400" dirty="0" err="1"/>
+              <a:t>def</a:t>
+            </a:r>
+            <a:r>
+              <a:rPr lang="en-US" sz="2400" dirty="0"/>
+              <a:t> </a:t>
+            </a:r>
+            <a:r>
+              <a:rPr lang="en-US" sz="2400" dirty="0" err="1"/>
+              <a:t>Trig.sin</a:t>
+            </a:r>
+            <a:r>
+              <a:rPr lang="en-US" sz="2400" dirty="0"/>
+              <a:t>(x)  </a:t>
+            </a:r>
+          </a:p>
+          <a:p>
+            <a:pPr marL="0" indent="0">
+              <a:buNone/>
+            </a:pPr>
+            <a:r>
+              <a:rPr lang="en-US" sz="2400" dirty="0"/>
+              <a:t>    # ...  </a:t>
+            </a:r>
+          </a:p>
+          <a:p>
+            <a:pPr marL="0" indent="0">
+              <a:buNone/>
+            </a:pPr>
+            <a:r>
+              <a:rPr lang="en-US" sz="2400" dirty="0"/>
+              <a:t>  end </a:t>
+            </a:r>
+            <a:endParaRPr lang="en-US" sz="2400" dirty="0" smtClean="0"/>
+          </a:p>
+          <a:p>
+            <a:pPr marL="0" indent="0">
+              <a:buNone/>
+            </a:pPr>
+            <a:r>
+              <a:rPr lang="en-US" sz="2400" dirty="0"/>
+              <a:t> </a:t>
+            </a:r>
+            <a:r>
+              <a:rPr lang="en-US" sz="2400" dirty="0" smtClean="0"/>
+              <a:t> </a:t>
+            </a:r>
+            <a:r>
+              <a:rPr lang="en-US" sz="2400" dirty="0" err="1" smtClean="0"/>
+              <a:t>def</a:t>
+            </a:r>
+            <a:r>
+              <a:rPr lang="en-US" sz="2400" dirty="0" smtClean="0"/>
+              <a:t> </a:t>
+            </a:r>
+            <a:r>
+              <a:rPr lang="en-US" sz="2400" dirty="0" err="1" smtClean="0"/>
+              <a:t>cos</a:t>
+            </a:r>
+            <a:r>
+              <a:rPr lang="en-US" sz="2400" dirty="0" smtClean="0"/>
+              <a:t>(x)</a:t>
+            </a:r>
+          </a:p>
+          <a:p>
+            <a:pPr marL="0" indent="0">
+              <a:buNone/>
+            </a:pPr>
+            <a:r>
+              <a:rPr lang="en-US" sz="2400" dirty="0"/>
+              <a:t> </a:t>
+            </a:r>
+            <a:r>
+              <a:rPr lang="en-US" sz="2400" dirty="0" smtClean="0"/>
+              <a:t>   # …</a:t>
+            </a:r>
+          </a:p>
+          <a:p>
+            <a:pPr marL="0" indent="0">
+              <a:buNone/>
+            </a:pPr>
+            <a:r>
+              <a:rPr lang="en-US" sz="2400" dirty="0" smtClean="0"/>
+              <a:t>  end </a:t>
+            </a:r>
+            <a:endParaRPr lang="en-US" sz="2400" dirty="0"/>
+          </a:p>
+          <a:p>
+            <a:pPr marL="0" indent="0">
+              <a:buNone/>
+            </a:pPr>
+            <a:r>
+              <a:rPr lang="en-US" sz="2400" dirty="0" smtClean="0"/>
+              <a:t>end  </a:t>
+            </a:r>
+            <a:endParaRPr lang="en-US" sz="2400" dirty="0"/>
+          </a:p>
+        </p:txBody>
+      </p:sp>
+      <p:sp>
+        <p:nvSpPr>
+          <p:cNvPr id="4" name="Rectángulo 3"/>
+          <p:cNvSpPr/>
+          <p:nvPr/>
+        </p:nvSpPr>
+        <p:spPr>
+          <a:xfrm>
+            <a:off x="467544" y="5733256"/>
+            <a:ext cx="2736304" cy="830997"/>
+          </a:xfrm>
+          <a:prstGeom prst="rect">
+            <a:avLst/>
+          </a:prstGeom>
+        </p:spPr>
+        <p:style>
+          <a:lnRef idx="2">
+            <a:schemeClr val="accent1"/>
+          </a:lnRef>
+          <a:fillRef idx="1">
+            <a:schemeClr val="lt1"/>
+          </a:fillRef>
+          <a:effectRef idx="0">
+            <a:schemeClr val="accent1"/>
+          </a:effectRef>
+          <a:fontRef idx="minor">
+            <a:schemeClr val="dk1"/>
+          </a:fontRef>
+        </p:style>
+        <p:txBody>
+          <a:bodyPr wrap="square">
+            <a:spAutoFit/>
+          </a:bodyPr>
+          <a:lstStyle/>
+          <a:p>
+            <a:pPr marL="0" indent="0">
+              <a:buNone/>
+            </a:pPr>
+            <a:r>
+              <a:rPr lang="en-US" sz="2400" dirty="0"/>
+              <a:t>require 'trig'  </a:t>
+            </a:r>
+          </a:p>
+          <a:p>
+            <a:pPr marL="0" indent="0">
+              <a:buNone/>
+            </a:pPr>
+            <a:r>
+              <a:rPr lang="en-US" sz="2400" dirty="0" err="1"/>
+              <a:t>Trig.sin</a:t>
+            </a:r>
+            <a:r>
+              <a:rPr lang="en-US" sz="2400" dirty="0"/>
+              <a:t>(Trig::PI/4)</a:t>
+            </a:r>
+            <a:endParaRPr lang="es-ES_tradnl" sz="2400" dirty="0"/>
+          </a:p>
+        </p:txBody>
+      </p:sp>
+      <p:sp>
+        <p:nvSpPr>
+          <p:cNvPr id="5" name="Rectángulo 4"/>
+          <p:cNvSpPr/>
+          <p:nvPr/>
+        </p:nvSpPr>
+        <p:spPr>
+          <a:xfrm>
+            <a:off x="3491880" y="980728"/>
+            <a:ext cx="5904656" cy="5355313"/>
+          </a:xfrm>
+          <a:prstGeom prst="rect">
+            <a:avLst/>
+          </a:prstGeom>
+        </p:spPr>
+        <p:txBody>
+          <a:bodyPr wrap="square">
+            <a:spAutoFit/>
+          </a:bodyPr>
+          <a:lstStyle/>
+          <a:p>
+            <a:r>
+              <a:rPr lang="es-ES_tradnl" dirty="0">
+                <a:latin typeface="+mn-lt"/>
+              </a:rPr>
+              <a:t>module D  </a:t>
+            </a:r>
+          </a:p>
+          <a:p>
+            <a:r>
+              <a:rPr lang="es-ES_tradnl" dirty="0">
+                <a:latin typeface="+mn-lt"/>
+              </a:rPr>
+              <a:t>  </a:t>
+            </a:r>
+            <a:r>
+              <a:rPr lang="es-ES_tradnl" dirty="0" err="1">
+                <a:latin typeface="+mn-lt"/>
+              </a:rPr>
+              <a:t>def</a:t>
+            </a:r>
+            <a:r>
+              <a:rPr lang="es-ES_tradnl" dirty="0">
+                <a:latin typeface="+mn-lt"/>
+              </a:rPr>
+              <a:t> </a:t>
+            </a:r>
+            <a:r>
+              <a:rPr lang="es-ES_tradnl" dirty="0" err="1">
+                <a:latin typeface="+mn-lt"/>
+              </a:rPr>
+              <a:t>initialize</a:t>
+            </a:r>
+            <a:r>
+              <a:rPr lang="es-ES_tradnl" dirty="0">
+                <a:latin typeface="+mn-lt"/>
+              </a:rPr>
+              <a:t>(nombre)  </a:t>
+            </a:r>
+          </a:p>
+          <a:p>
+            <a:r>
+              <a:rPr lang="es-ES_tradnl" dirty="0">
+                <a:latin typeface="+mn-lt"/>
+              </a:rPr>
+              <a:t>    @nombre =nombre  </a:t>
+            </a:r>
+          </a:p>
+          <a:p>
+            <a:r>
+              <a:rPr lang="es-ES_tradnl" dirty="0">
+                <a:latin typeface="+mn-lt"/>
+              </a:rPr>
+              <a:t>  </a:t>
+            </a:r>
+            <a:r>
+              <a:rPr lang="es-ES_tradnl" dirty="0" err="1">
+                <a:latin typeface="+mn-lt"/>
+              </a:rPr>
+              <a:t>end</a:t>
+            </a:r>
+            <a:r>
+              <a:rPr lang="es-ES_tradnl" dirty="0">
+                <a:latin typeface="+mn-lt"/>
+              </a:rPr>
+              <a:t>  </a:t>
+            </a:r>
+          </a:p>
+          <a:p>
+            <a:r>
+              <a:rPr lang="es-ES_tradnl" dirty="0">
+                <a:latin typeface="+mn-lt"/>
+              </a:rPr>
+              <a:t>  </a:t>
+            </a:r>
+            <a:r>
+              <a:rPr lang="es-ES_tradnl" dirty="0" err="1">
+                <a:latin typeface="+mn-lt"/>
+              </a:rPr>
+              <a:t>def</a:t>
+            </a:r>
+            <a:r>
+              <a:rPr lang="es-ES_tradnl" dirty="0">
+                <a:latin typeface="+mn-lt"/>
+              </a:rPr>
+              <a:t> </a:t>
+            </a:r>
+            <a:r>
+              <a:rPr lang="es-ES_tradnl" dirty="0" err="1">
+                <a:latin typeface="+mn-lt"/>
+              </a:rPr>
+              <a:t>to_s</a:t>
+            </a:r>
+            <a:r>
+              <a:rPr lang="es-ES_tradnl" dirty="0">
+                <a:latin typeface="+mn-lt"/>
+              </a:rPr>
+              <a:t>  </a:t>
+            </a:r>
+          </a:p>
+          <a:p>
+            <a:r>
+              <a:rPr lang="es-ES_tradnl" dirty="0">
+                <a:latin typeface="+mn-lt"/>
+              </a:rPr>
+              <a:t>    @nombre  </a:t>
+            </a:r>
+          </a:p>
+          <a:p>
+            <a:r>
+              <a:rPr lang="es-ES_tradnl" dirty="0">
+                <a:latin typeface="+mn-lt"/>
+              </a:rPr>
+              <a:t>  </a:t>
+            </a:r>
+            <a:r>
+              <a:rPr lang="es-ES_tradnl" dirty="0" err="1">
+                <a:latin typeface="+mn-lt"/>
+              </a:rPr>
+              <a:t>end</a:t>
+            </a:r>
+            <a:r>
+              <a:rPr lang="es-ES_tradnl" dirty="0">
+                <a:latin typeface="+mn-lt"/>
+              </a:rPr>
+              <a:t>  </a:t>
+            </a:r>
+          </a:p>
+          <a:p>
+            <a:r>
+              <a:rPr lang="es-ES_tradnl" dirty="0" err="1">
+                <a:latin typeface="+mn-lt"/>
+              </a:rPr>
+              <a:t>end</a:t>
+            </a:r>
+            <a:r>
+              <a:rPr lang="es-ES_tradnl" dirty="0">
+                <a:latin typeface="+mn-lt"/>
+              </a:rPr>
+              <a:t>  </a:t>
+            </a:r>
+          </a:p>
+          <a:p>
+            <a:r>
+              <a:rPr lang="es-ES_tradnl" dirty="0">
+                <a:latin typeface="+mn-lt"/>
+              </a:rPr>
+              <a:t> </a:t>
+            </a:r>
+          </a:p>
+          <a:p>
+            <a:r>
+              <a:rPr lang="es-ES_tradnl" dirty="0">
+                <a:latin typeface="+mn-lt"/>
+              </a:rPr>
+              <a:t>module </a:t>
+            </a:r>
+            <a:r>
+              <a:rPr lang="es-ES_tradnl" dirty="0" err="1">
+                <a:latin typeface="+mn-lt"/>
+              </a:rPr>
+              <a:t>Debug</a:t>
+            </a:r>
+            <a:r>
+              <a:rPr lang="es-ES_tradnl" dirty="0">
+                <a:latin typeface="+mn-lt"/>
+              </a:rPr>
+              <a:t>  </a:t>
+            </a:r>
+          </a:p>
+          <a:p>
+            <a:r>
+              <a:rPr lang="es-ES_tradnl" dirty="0">
+                <a:latin typeface="+mn-lt"/>
+              </a:rPr>
+              <a:t>  </a:t>
+            </a:r>
+            <a:r>
+              <a:rPr lang="es-ES_tradnl" dirty="0" err="1">
+                <a:latin typeface="+mn-lt"/>
+              </a:rPr>
+              <a:t>include</a:t>
+            </a:r>
+            <a:r>
+              <a:rPr lang="es-ES_tradnl" dirty="0">
+                <a:latin typeface="+mn-lt"/>
+              </a:rPr>
+              <a:t> D  </a:t>
+            </a:r>
+          </a:p>
+          <a:p>
+            <a:r>
+              <a:rPr lang="es-ES_tradnl" dirty="0">
+                <a:latin typeface="+mn-lt"/>
+              </a:rPr>
+              <a:t>  </a:t>
+            </a:r>
+            <a:r>
+              <a:rPr lang="es-ES_tradnl" dirty="0" err="1">
+                <a:latin typeface="+mn-lt"/>
+              </a:rPr>
+              <a:t>def</a:t>
+            </a:r>
+            <a:r>
+              <a:rPr lang="es-ES_tradnl" dirty="0">
+                <a:latin typeface="+mn-lt"/>
+              </a:rPr>
+              <a:t> </a:t>
+            </a:r>
+            <a:r>
+              <a:rPr lang="es-ES_tradnl" dirty="0" err="1">
+                <a:latin typeface="+mn-lt"/>
+              </a:rPr>
+              <a:t>quien_soy</a:t>
+            </a:r>
+            <a:r>
+              <a:rPr lang="es-ES_tradnl" dirty="0">
+                <a:latin typeface="+mn-lt"/>
+              </a:rPr>
+              <a:t>?</a:t>
+            </a:r>
+          </a:p>
+          <a:p>
+            <a:r>
+              <a:rPr lang="es-ES_tradnl" dirty="0">
+                <a:latin typeface="+mn-lt"/>
+              </a:rPr>
+              <a:t>    "#{</a:t>
+            </a:r>
+            <a:r>
+              <a:rPr lang="es-ES_tradnl" dirty="0" err="1">
+                <a:latin typeface="+mn-lt"/>
+              </a:rPr>
+              <a:t>self.class.name</a:t>
+            </a:r>
+            <a:r>
+              <a:rPr lang="es-ES_tradnl" dirty="0">
+                <a:latin typeface="+mn-lt"/>
+              </a:rPr>
+              <a:t>} (\##{</a:t>
+            </a:r>
+            <a:r>
+              <a:rPr lang="es-ES_tradnl" dirty="0" err="1">
+                <a:latin typeface="+mn-lt"/>
+              </a:rPr>
+              <a:t>self.object_id</a:t>
+            </a:r>
+            <a:r>
+              <a:rPr lang="es-ES_tradnl" dirty="0">
+                <a:latin typeface="+mn-lt"/>
+              </a:rPr>
+              <a:t>}): #{</a:t>
+            </a:r>
+            <a:r>
+              <a:rPr lang="es-ES_tradnl" dirty="0" err="1">
+                <a:latin typeface="+mn-lt"/>
+              </a:rPr>
+              <a:t>self.to_s</a:t>
+            </a:r>
+            <a:r>
+              <a:rPr lang="es-ES_tradnl" dirty="0">
+                <a:latin typeface="+mn-lt"/>
+              </a:rPr>
+              <a:t>}"</a:t>
+            </a:r>
+          </a:p>
+          <a:p>
+            <a:r>
+              <a:rPr lang="es-ES_tradnl" dirty="0">
+                <a:latin typeface="+mn-lt"/>
+              </a:rPr>
+              <a:t>  </a:t>
+            </a:r>
+            <a:r>
+              <a:rPr lang="es-ES_tradnl" dirty="0" err="1">
+                <a:latin typeface="+mn-lt"/>
+              </a:rPr>
+              <a:t>end</a:t>
+            </a:r>
+            <a:endParaRPr lang="es-ES_tradnl" dirty="0">
+              <a:latin typeface="+mn-lt"/>
+            </a:endParaRPr>
+          </a:p>
+          <a:p>
+            <a:r>
+              <a:rPr lang="es-ES_tradnl" dirty="0" err="1">
+                <a:latin typeface="+mn-lt"/>
+              </a:rPr>
+              <a:t>end</a:t>
+            </a:r>
+            <a:endParaRPr lang="es-ES_tradnl" dirty="0">
+              <a:latin typeface="+mn-lt"/>
+            </a:endParaRPr>
+          </a:p>
+          <a:p>
+            <a:r>
+              <a:rPr lang="es-ES_tradnl" dirty="0">
+                <a:latin typeface="+mn-lt"/>
+              </a:rPr>
+              <a:t>  </a:t>
+            </a:r>
+          </a:p>
+          <a:p>
+            <a:r>
+              <a:rPr lang="es-ES_tradnl" dirty="0" err="1">
+                <a:latin typeface="+mn-lt"/>
+              </a:rPr>
+              <a:t>class</a:t>
+            </a:r>
+            <a:r>
+              <a:rPr lang="es-ES_tradnl" dirty="0">
+                <a:latin typeface="+mn-lt"/>
+              </a:rPr>
+              <a:t> </a:t>
+            </a:r>
+            <a:r>
+              <a:rPr lang="es-ES_tradnl" dirty="0" err="1">
+                <a:latin typeface="+mn-lt"/>
+              </a:rPr>
+              <a:t>OchoPistas</a:t>
+            </a:r>
+            <a:r>
+              <a:rPr lang="es-ES_tradnl" dirty="0">
+                <a:latin typeface="+mn-lt"/>
+              </a:rPr>
+              <a:t> </a:t>
+            </a:r>
+          </a:p>
+          <a:p>
+            <a:r>
+              <a:rPr lang="es-ES_tradnl" dirty="0">
+                <a:latin typeface="+mn-lt"/>
+              </a:rPr>
+              <a:t>  </a:t>
+            </a:r>
+            <a:r>
+              <a:rPr lang="es-ES_tradnl" dirty="0" err="1">
+                <a:latin typeface="+mn-lt"/>
+              </a:rPr>
+              <a:t>include</a:t>
+            </a:r>
+            <a:r>
+              <a:rPr lang="es-ES_tradnl" dirty="0">
+                <a:latin typeface="+mn-lt"/>
+              </a:rPr>
+              <a:t> </a:t>
+            </a:r>
+            <a:r>
+              <a:rPr lang="es-ES_tradnl" dirty="0" err="1">
+                <a:latin typeface="+mn-lt"/>
+              </a:rPr>
+              <a:t>Debug</a:t>
+            </a:r>
+            <a:r>
+              <a:rPr lang="es-ES_tradnl" dirty="0">
+                <a:latin typeface="+mn-lt"/>
+              </a:rPr>
+              <a:t>  </a:t>
+            </a:r>
+            <a:endParaRPr lang="es-ES_tradnl" dirty="0" smtClean="0">
+              <a:latin typeface="+mn-lt"/>
+            </a:endParaRPr>
+          </a:p>
+          <a:p>
+            <a:r>
+              <a:rPr lang="es-ES_tradnl" dirty="0" err="1" smtClean="0">
+                <a:latin typeface="+mn-lt"/>
+              </a:rPr>
+              <a:t>end</a:t>
+            </a:r>
+            <a:r>
+              <a:rPr lang="es-ES_tradnl" dirty="0" smtClean="0">
+                <a:latin typeface="+mn-lt"/>
+              </a:rPr>
+              <a:t> </a:t>
+            </a:r>
+            <a:endParaRPr lang="es-ES_tradnl" dirty="0">
+              <a:latin typeface="+mn-lt"/>
+            </a:endParaRPr>
+          </a:p>
+        </p:txBody>
+      </p:sp>
+    </p:spTree>
+    <p:extLst>
+      <p:ext uri="{BB962C8B-B14F-4D97-AF65-F5344CB8AC3E}">
+        <p14:creationId xmlns:p14="http://schemas.microsoft.com/office/powerpoint/2010/main" val="1214352194"/>
+      </p:ext>
+    </p:extLst>
+  </p:cSld>
+  <p:clrMapOvr>
+    <a:masterClrMapping/>
+  </p:clrMapOvr>
+</p:sld>
+</file>
+
+<file path=ppt/slides/slide33.xml><?xml version="1.0" encoding="utf-8"?>
+<p:sld xmlns:a="http://schemas.openxmlformats.org/drawingml/2006/main" xmlns:r="http://schemas.openxmlformats.org/officeDocument/2006/relationships" xmlns:p="http://schemas.openxmlformats.org/presentationml/2006/main">
+  <p:cSld>
+    <p:spTree>
+      <p:nvGrpSpPr>
+        <p:cNvPr id="1" name=""/>
+        <p:cNvGrpSpPr/>
+        <p:nvPr/>
+      </p:nvGrpSpPr>
+      <p:grpSpPr>
+        <a:xfrm>
+          <a:off x="0" y="0"/>
+          <a:ext cx="0" cy="0"/>
+          <a:chOff x="0" y="0"/>
+          <a:chExt cx="0" cy="0"/>
+        </a:xfrm>
+      </p:grpSpPr>
+      <p:sp>
+        <p:nvSpPr>
+          <p:cNvPr id="2" name="Título 1"/>
+          <p:cNvSpPr>
+            <a:spLocks noGrp="1"/>
+          </p:cNvSpPr>
+          <p:nvPr>
+            <p:ph type="title"/>
+          </p:nvPr>
+        </p:nvSpPr>
+        <p:spPr>
+          <a:xfrm>
+            <a:off x="467544" y="-99392"/>
+            <a:ext cx="8229600" cy="1143000"/>
+          </a:xfrm>
+        </p:spPr>
+        <p:txBody>
+          <a:bodyPr/>
+          <a:lstStyle/>
+          <a:p>
+            <a:r>
+              <a:rPr lang="es-ES_tradnl" dirty="0" smtClean="0"/>
+              <a:t>Módulos </a:t>
+            </a:r>
+            <a:r>
+              <a:rPr lang="es-ES_tradnl" sz="2000" dirty="0" smtClean="0"/>
+              <a:t>(3/3)</a:t>
+            </a:r>
+            <a:endParaRPr lang="es-ES_tradnl" dirty="0"/>
+          </a:p>
+        </p:txBody>
+      </p:sp>
+      <p:sp>
+        <p:nvSpPr>
+          <p:cNvPr id="3" name="Marcador de contenido 2"/>
+          <p:cNvSpPr>
+            <a:spLocks noGrp="1"/>
+          </p:cNvSpPr>
+          <p:nvPr>
+            <p:ph idx="1"/>
+          </p:nvPr>
+        </p:nvSpPr>
+        <p:spPr/>
+        <p:txBody>
+          <a:bodyPr/>
+          <a:lstStyle/>
+          <a:p>
+            <a:r>
+              <a:rPr lang="es-ES_tradnl" dirty="0" smtClean="0"/>
+              <a:t>Existen 2 m</a:t>
+            </a:r>
+            <a:r>
+              <a:rPr lang="es-ES_tradnl" dirty="0" smtClean="0"/>
+              <a:t>étodos para incluir funcionalidad de un módulo en una clase:</a:t>
+            </a:r>
+          </a:p>
+          <a:p>
+            <a:pPr lvl="1"/>
+            <a:r>
+              <a:rPr lang="es-ES_tradnl" b="1" dirty="0" err="1" smtClean="0"/>
+              <a:t>Include</a:t>
+            </a:r>
+            <a:r>
+              <a:rPr lang="es-ES_tradnl" dirty="0" smtClean="0"/>
+              <a:t>: Incluye los métodos del módulo como si fueran métodos de instancia.</a:t>
+            </a:r>
+          </a:p>
+          <a:p>
+            <a:pPr lvl="1"/>
+            <a:r>
+              <a:rPr lang="es-ES_tradnl" b="1" dirty="0" err="1" smtClean="0"/>
+              <a:t>Extend</a:t>
+            </a:r>
+            <a:r>
+              <a:rPr lang="es-ES_tradnl" dirty="0" smtClean="0"/>
+              <a:t>: Incluye los métodos del módulo como si fuera métodos de clase (tienen q llamarse usando </a:t>
+            </a:r>
+            <a:r>
+              <a:rPr lang="es-ES_tradnl" dirty="0" err="1" smtClean="0"/>
+              <a:t>Clase.mi_metodo</a:t>
+            </a:r>
+            <a:r>
+              <a:rPr lang="es-ES_tradnl" dirty="0" smtClean="0"/>
+              <a:t>)</a:t>
+            </a:r>
+            <a:endParaRPr lang="es-ES_tradnl" dirty="0"/>
           </a:p>
         </p:txBody>
       </p:sp>
@@ -10467,7 +12744,7 @@
 </p:sld>
 </file>
 
-<file path=ppt/slides/slide31.xml><?xml version="1.0" encoding="utf-8"?>
+<file path=ppt/slides/slide34.xml><?xml version="1.0" encoding="utf-8"?>
 <p:sld xmlns:a="http://schemas.openxmlformats.org/drawingml/2006/main" xmlns:r="http://schemas.openxmlformats.org/officeDocument/2006/relationships" xmlns:p="http://schemas.openxmlformats.org/presentationml/2006/main">
   <p:cSld>
     <p:spTree>
@@ -10508,13 +12785,7 @@
               <a:rPr lang="es-CR" dirty="0" smtClean="0">
                 <a:latin typeface="Calibri" charset="0"/>
               </a:rPr>
-              <a:t>Usando librer</a:t>
-            </a:r>
-            <a:r>
-              <a:rPr lang="es-CR" dirty="0" smtClean="0">
-                <a:latin typeface="Calibri" charset="0"/>
-              </a:rPr>
-              <a:t>ías adicionales</a:t>
+              <a:t>Usando librerías adicionales</a:t>
             </a:r>
             <a:endParaRPr lang="es-CR" dirty="0">
               <a:latin typeface="Calibri" charset="0"/>
@@ -10541,57 +12812,45 @@
               <a:rPr lang="es-CR" dirty="0" smtClean="0">
                 <a:latin typeface="Calibri" charset="0"/>
               </a:rPr>
-              <a:t>Para cargar librer</a:t>
+              <a:t>Para cargar librerías en Ruby se utiliza </a:t>
+            </a:r>
+            <a:r>
+              <a:rPr lang="es-CR" b="1" dirty="0" smtClean="0">
+                <a:latin typeface="Calibri" charset="0"/>
+              </a:rPr>
+              <a:t>require</a:t>
             </a:r>
             <a:r>
               <a:rPr lang="es-CR" dirty="0" smtClean="0">
                 <a:latin typeface="Calibri" charset="0"/>
               </a:rPr>
-              <a:t>ías en Ruby se utiliza </a:t>
-            </a:r>
-            <a:r>
-              <a:rPr lang="es-CR" b="1" dirty="0" smtClean="0">
-                <a:latin typeface="Calibri" charset="0"/>
-              </a:rPr>
-              <a:t>require</a:t>
+              <a:t> o </a:t>
+            </a:r>
+            <a:r>
+              <a:rPr lang="es-CR" b="1" dirty="0">
+                <a:latin typeface="Calibri" charset="0"/>
+              </a:rPr>
+              <a:t>load</a:t>
+            </a:r>
+          </a:p>
+          <a:p>
+            <a:r>
+              <a:rPr lang="es-CR" b="1" dirty="0">
+                <a:latin typeface="Calibri" charset="0"/>
+              </a:rPr>
+              <a:t>Require</a:t>
+            </a:r>
+            <a:r>
+              <a:rPr lang="es-CR" dirty="0">
+                <a:latin typeface="Calibri" charset="0"/>
+              </a:rPr>
+              <a:t> </a:t>
             </a:r>
             <a:r>
               <a:rPr lang="es-CR" dirty="0" smtClean="0">
                 <a:latin typeface="Calibri" charset="0"/>
               </a:rPr>
-              <a:t> o </a:t>
-            </a:r>
-            <a:r>
-              <a:rPr lang="es-CR" b="1" dirty="0">
-                <a:latin typeface="Calibri" charset="0"/>
-              </a:rPr>
-              <a:t>load</a:t>
-            </a:r>
-          </a:p>
-          <a:p>
-            <a:r>
-              <a:rPr lang="es-CR" b="1" dirty="0">
-                <a:latin typeface="Calibri" charset="0"/>
-              </a:rPr>
-              <a:t>Require</a:t>
-            </a:r>
-            <a:r>
-              <a:rPr lang="es-CR" dirty="0">
-                <a:latin typeface="Calibri" charset="0"/>
-              </a:rPr>
-              <a:t> </a:t>
-            </a:r>
-            <a:r>
-              <a:rPr lang="es-CR" dirty="0" smtClean="0">
-                <a:latin typeface="Calibri" charset="0"/>
-              </a:rPr>
-              <a:t>carga el archivo </a:t>
-            </a:r>
-            <a:r>
-              <a:rPr lang="es-CR" dirty="0" smtClean="0">
-                <a:latin typeface="Calibri" charset="0"/>
-              </a:rPr>
-              <a:t>únicamente una vez, sin importar si tenemos la misma instrucción más de 2 veces</a:t>
+              <a:t>carga el archivo únicamente una vez, sin importar si tenemos la misma instrucción más de 2 veces</a:t>
             </a:r>
             <a:endParaRPr lang="es-CR" dirty="0">
               <a:latin typeface="Calibri" charset="0"/>
@@ -10608,13 +12867,7 @@
               <a:rPr lang="es-CR" dirty="0" smtClean="0">
                 <a:latin typeface="Calibri" charset="0"/>
               </a:rPr>
-              <a:t>Lee el archivo cada vez que se utiliza la l</a:t>
-            </a:r>
-            <a:r>
-              <a:rPr lang="es-CR" dirty="0" smtClean="0">
-                <a:latin typeface="Calibri" charset="0"/>
-              </a:rPr>
-              <a:t>ínea de carga</a:t>
+              <a:t>Lee el archivo cada vez que se utiliza la línea de carga</a:t>
             </a:r>
             <a:endParaRPr lang="es-CR" dirty="0">
               <a:latin typeface="Calibri" charset="0"/>
@@ -10642,7 +12895,7 @@
 </p:sld>
 </file>
 
-<file path=ppt/slides/slide32.xml><?xml version="1.0" encoding="utf-8"?>
+<file path=ppt/slides/slide35.xml><?xml version="1.0" encoding="utf-8"?>
 <p:sld xmlns:a="http://schemas.openxmlformats.org/drawingml/2006/main" xmlns:r="http://schemas.openxmlformats.org/officeDocument/2006/relationships" xmlns:p="http://schemas.openxmlformats.org/presentationml/2006/main">
   <p:cSld>
     <p:spTree>
@@ -10695,7 +12948,13 @@
               <a:rPr lang="es-ES" dirty="0" smtClean="0">
                 <a:latin typeface="Calibri" charset="0"/>
               </a:rPr>
-              <a:t>:Modulos</a:t>
+              <a:t>: </a:t>
+            </a:r>
+            <a:r>
+              <a:rPr lang="es-ES" dirty="0" err="1" smtClean="0">
+                <a:latin typeface="Calibri" charset="0"/>
+              </a:rPr>
+              <a:t>Modulos</a:t>
             </a:r>
             <a:endParaRPr lang="en-US" dirty="0">
               <a:latin typeface="Calibri" charset="0"/>
@@ -10723,10 +12982,441 @@
           <a:bodyPr/>
           <a:lstStyle/>
           <a:p>
-            <a:pPr marL="0" indent="0">
-              <a:buNone/>
-            </a:pPr>
-            <a:endParaRPr lang="en-US" sz="2800" dirty="0">
+            <a:r>
+              <a:rPr lang="en-US" sz="2800" dirty="0" err="1" smtClean="0">
+                <a:latin typeface="Calibri" charset="0"/>
+              </a:rPr>
+              <a:t>Crear</a:t>
+            </a:r>
+            <a:r>
+              <a:rPr lang="en-US" sz="2800" dirty="0" smtClean="0">
+                <a:latin typeface="Calibri" charset="0"/>
+              </a:rPr>
+              <a:t> </a:t>
+            </a:r>
+            <a:r>
+              <a:rPr lang="en-US" sz="2800" dirty="0" err="1" smtClean="0">
+                <a:latin typeface="Calibri" charset="0"/>
+              </a:rPr>
+              <a:t>una</a:t>
+            </a:r>
+            <a:r>
+              <a:rPr lang="en-US" sz="2800" dirty="0" smtClean="0">
+                <a:latin typeface="Calibri" charset="0"/>
+              </a:rPr>
+              <a:t> </a:t>
+            </a:r>
+            <a:r>
+              <a:rPr lang="en-US" sz="2800" dirty="0" err="1" smtClean="0">
+                <a:latin typeface="Calibri" charset="0"/>
+              </a:rPr>
+              <a:t>clase</a:t>
+            </a:r>
+            <a:r>
+              <a:rPr lang="en-US" sz="2800" dirty="0" smtClean="0">
+                <a:latin typeface="Calibri" charset="0"/>
+              </a:rPr>
+              <a:t> “</a:t>
+            </a:r>
+            <a:r>
+              <a:rPr lang="en-US" sz="2800" dirty="0" err="1" smtClean="0">
+                <a:latin typeface="Calibri" charset="0"/>
+              </a:rPr>
+              <a:t>MiNumero</a:t>
+            </a:r>
+            <a:r>
+              <a:rPr lang="en-US" sz="2800" dirty="0" smtClean="0">
+                <a:latin typeface="Calibri" charset="0"/>
+              </a:rPr>
+              <a:t>”</a:t>
+            </a:r>
+            <a:r>
+              <a:rPr lang="en-US" sz="2800" dirty="0" smtClean="0">
+                <a:latin typeface="Calibri" charset="0"/>
+              </a:rPr>
+              <a:t> </a:t>
+            </a:r>
+            <a:r>
+              <a:rPr lang="en-US" sz="2800" dirty="0" err="1" smtClean="0">
+                <a:latin typeface="Calibri" charset="0"/>
+              </a:rPr>
+              <a:t>que</a:t>
+            </a:r>
+            <a:r>
+              <a:rPr lang="en-US" sz="2800" dirty="0" smtClean="0">
+                <a:latin typeface="Calibri" charset="0"/>
+              </a:rPr>
+              <a:t> </a:t>
+            </a:r>
+            <a:r>
+              <a:rPr lang="en-US" sz="2800" dirty="0" err="1" smtClean="0">
+                <a:latin typeface="Calibri" charset="0"/>
+              </a:rPr>
+              <a:t>incluya</a:t>
+            </a:r>
+            <a:r>
+              <a:rPr lang="en-US" sz="2800" dirty="0" smtClean="0">
+                <a:latin typeface="Calibri" charset="0"/>
+              </a:rPr>
+              <a:t> los </a:t>
+            </a:r>
+            <a:r>
+              <a:rPr lang="en-US" sz="2800" dirty="0" err="1" smtClean="0">
+                <a:latin typeface="Calibri" charset="0"/>
+              </a:rPr>
+              <a:t>métodos</a:t>
+            </a:r>
+            <a:r>
+              <a:rPr lang="en-US" sz="2800" dirty="0" smtClean="0">
+                <a:latin typeface="Calibri" charset="0"/>
+              </a:rPr>
+              <a:t> de los </a:t>
+            </a:r>
+            <a:r>
+              <a:rPr lang="en-US" sz="2800" dirty="0" err="1" smtClean="0">
+                <a:latin typeface="Calibri" charset="0"/>
+              </a:rPr>
+              <a:t>módulos</a:t>
+            </a:r>
+            <a:r>
+              <a:rPr lang="en-US" sz="2800" dirty="0" smtClean="0">
+                <a:latin typeface="Calibri" charset="0"/>
+              </a:rPr>
+              <a:t> “</a:t>
+            </a:r>
+            <a:r>
+              <a:rPr lang="en-US" sz="2800" dirty="0" err="1" smtClean="0">
+                <a:latin typeface="Calibri" charset="0"/>
+              </a:rPr>
+              <a:t>suma</a:t>
+            </a:r>
+            <a:r>
+              <a:rPr lang="en-US" sz="2800" dirty="0" smtClean="0">
+                <a:latin typeface="Calibri" charset="0"/>
+              </a:rPr>
+              <a:t>” y “</a:t>
+            </a:r>
+            <a:r>
+              <a:rPr lang="en-US" sz="2800" dirty="0" err="1" smtClean="0">
+                <a:latin typeface="Calibri" charset="0"/>
+              </a:rPr>
+              <a:t>resta</a:t>
+            </a:r>
+            <a:r>
+              <a:rPr lang="en-US" sz="2800" dirty="0" smtClean="0">
+                <a:latin typeface="Calibri" charset="0"/>
+              </a:rPr>
+              <a:t>” (</a:t>
+            </a:r>
+            <a:r>
+              <a:rPr lang="en-US" sz="2800" dirty="0" err="1" smtClean="0">
+                <a:latin typeface="Calibri" charset="0"/>
+              </a:rPr>
+              <a:t>como</a:t>
+            </a:r>
+            <a:r>
+              <a:rPr lang="en-US" sz="2800" dirty="0" smtClean="0">
+                <a:latin typeface="Calibri" charset="0"/>
+              </a:rPr>
+              <a:t> </a:t>
+            </a:r>
+            <a:r>
+              <a:rPr lang="en-US" sz="2800" dirty="0" err="1" smtClean="0">
+                <a:latin typeface="Calibri" charset="0"/>
+              </a:rPr>
+              <a:t>método</a:t>
+            </a:r>
+            <a:r>
+              <a:rPr lang="en-US" sz="2800" dirty="0" smtClean="0">
+                <a:latin typeface="Calibri" charset="0"/>
+              </a:rPr>
+              <a:t> de </a:t>
+            </a:r>
+            <a:r>
+              <a:rPr lang="en-US" sz="2800" dirty="0" err="1" smtClean="0">
+                <a:latin typeface="Calibri" charset="0"/>
+              </a:rPr>
+              <a:t>instancia</a:t>
+            </a:r>
+            <a:r>
+              <a:rPr lang="en-US" sz="2800" dirty="0" smtClean="0">
+                <a:latin typeface="Calibri" charset="0"/>
+              </a:rPr>
+              <a:t>). </a:t>
+            </a:r>
+            <a:r>
+              <a:rPr lang="en-US" sz="2800" dirty="0" err="1" smtClean="0">
+                <a:latin typeface="Calibri" charset="0"/>
+              </a:rPr>
+              <a:t>Además</a:t>
+            </a:r>
+            <a:r>
+              <a:rPr lang="en-US" sz="2800" dirty="0" smtClean="0">
+                <a:latin typeface="Calibri" charset="0"/>
+              </a:rPr>
+              <a:t>, </a:t>
+            </a:r>
+            <a:r>
+              <a:rPr lang="en-US" sz="2800" dirty="0" err="1" smtClean="0">
+                <a:latin typeface="Calibri" charset="0"/>
+              </a:rPr>
+              <a:t>agregar</a:t>
+            </a:r>
+            <a:r>
+              <a:rPr lang="en-US" sz="2800" dirty="0" smtClean="0">
+                <a:latin typeface="Calibri" charset="0"/>
+              </a:rPr>
+              <a:t> un </a:t>
+            </a:r>
+            <a:r>
+              <a:rPr lang="en-US" sz="2800" dirty="0" err="1" smtClean="0">
+                <a:latin typeface="Calibri" charset="0"/>
+              </a:rPr>
+              <a:t>módulo</a:t>
+            </a:r>
+            <a:r>
+              <a:rPr lang="en-US" sz="2800" dirty="0" smtClean="0">
+                <a:latin typeface="Calibri" charset="0"/>
+              </a:rPr>
+              <a:t> “</a:t>
+            </a:r>
+            <a:r>
+              <a:rPr lang="en-US" sz="2800" dirty="0" err="1" smtClean="0">
+                <a:latin typeface="Calibri" charset="0"/>
+              </a:rPr>
+              <a:t>multiplicacion</a:t>
+            </a:r>
+            <a:r>
+              <a:rPr lang="en-US" sz="2800" dirty="0" smtClean="0">
+                <a:latin typeface="Calibri" charset="0"/>
+              </a:rPr>
+              <a:t>” </a:t>
+            </a:r>
+            <a:r>
+              <a:rPr lang="en-US" sz="2800" dirty="0" err="1" smtClean="0">
+                <a:latin typeface="Calibri" charset="0"/>
+              </a:rPr>
+              <a:t>cuyos</a:t>
+            </a:r>
+            <a:r>
+              <a:rPr lang="en-US" sz="2800" dirty="0" smtClean="0">
+                <a:latin typeface="Calibri" charset="0"/>
+              </a:rPr>
+              <a:t> </a:t>
+            </a:r>
+            <a:r>
+              <a:rPr lang="en-US" sz="2800" dirty="0" err="1" smtClean="0">
+                <a:latin typeface="Calibri" charset="0"/>
+              </a:rPr>
+              <a:t>métodos</a:t>
+            </a:r>
+            <a:r>
+              <a:rPr lang="en-US" sz="2800" dirty="0" smtClean="0">
+                <a:latin typeface="Calibri" charset="0"/>
+              </a:rPr>
+              <a:t> </a:t>
+            </a:r>
+            <a:r>
+              <a:rPr lang="en-US" sz="2800" dirty="0" err="1" smtClean="0">
+                <a:latin typeface="Calibri" charset="0"/>
+              </a:rPr>
+              <a:t>serán</a:t>
+            </a:r>
+            <a:r>
+              <a:rPr lang="en-US" sz="2800" dirty="0" smtClean="0">
+                <a:latin typeface="Calibri" charset="0"/>
+              </a:rPr>
+              <a:t> de </a:t>
+            </a:r>
+            <a:r>
+              <a:rPr lang="en-US" sz="2800" dirty="0" err="1" smtClean="0">
+                <a:latin typeface="Calibri" charset="0"/>
+              </a:rPr>
+              <a:t>clase</a:t>
+            </a:r>
+            <a:r>
+              <a:rPr lang="en-US" sz="2800" dirty="0" smtClean="0">
+                <a:latin typeface="Calibri" charset="0"/>
+              </a:rPr>
+              <a:t>.</a:t>
+            </a:r>
+          </a:p>
+          <a:p>
+            <a:pPr lvl="1"/>
+            <a:r>
+              <a:rPr lang="en-US" sz="2400" dirty="0" err="1" smtClean="0">
+                <a:latin typeface="Calibri" charset="0"/>
+              </a:rPr>
+              <a:t>Una</a:t>
+            </a:r>
+            <a:r>
+              <a:rPr lang="en-US" sz="2400" dirty="0" smtClean="0">
+                <a:latin typeface="Calibri" charset="0"/>
+              </a:rPr>
+              <a:t> </a:t>
+            </a:r>
+            <a:r>
+              <a:rPr lang="en-US" sz="2400" dirty="0" err="1" smtClean="0">
+                <a:latin typeface="Calibri" charset="0"/>
+              </a:rPr>
+              <a:t>interacción</a:t>
+            </a:r>
+            <a:r>
+              <a:rPr lang="en-US" sz="2400" dirty="0" smtClean="0">
+                <a:latin typeface="Calibri" charset="0"/>
+              </a:rPr>
+              <a:t> </a:t>
+            </a:r>
+            <a:r>
+              <a:rPr lang="en-US" sz="2400" dirty="0" err="1" smtClean="0">
+                <a:latin typeface="Calibri" charset="0"/>
+              </a:rPr>
+              <a:t>correcta</a:t>
+            </a:r>
+            <a:r>
+              <a:rPr lang="en-US" sz="2400" dirty="0" smtClean="0">
+                <a:latin typeface="Calibri" charset="0"/>
+              </a:rPr>
+              <a:t> con la </a:t>
+            </a:r>
+            <a:r>
+              <a:rPr lang="en-US" sz="2400" dirty="0" err="1" smtClean="0">
+                <a:latin typeface="Calibri" charset="0"/>
+              </a:rPr>
+              <a:t>clase</a:t>
+            </a:r>
+            <a:r>
+              <a:rPr lang="en-US" sz="2400" dirty="0" smtClean="0">
+                <a:latin typeface="Calibri" charset="0"/>
+              </a:rPr>
+              <a:t> </a:t>
+            </a:r>
+            <a:r>
+              <a:rPr lang="en-US" sz="2400" dirty="0" err="1" smtClean="0">
+                <a:latin typeface="Calibri" charset="0"/>
+              </a:rPr>
+              <a:t>matemática</a:t>
+            </a:r>
+            <a:r>
+              <a:rPr lang="en-US" sz="2400" dirty="0" smtClean="0">
+                <a:latin typeface="Calibri" charset="0"/>
+              </a:rPr>
+              <a:t> </a:t>
+            </a:r>
+            <a:r>
+              <a:rPr lang="en-US" sz="2400" dirty="0" err="1" smtClean="0">
+                <a:latin typeface="Calibri" charset="0"/>
+              </a:rPr>
+              <a:t>es</a:t>
+            </a:r>
+            <a:r>
+              <a:rPr lang="en-US" sz="2400" dirty="0" smtClean="0">
+                <a:latin typeface="Calibri" charset="0"/>
+              </a:rPr>
+              <a:t>:</a:t>
+            </a:r>
+          </a:p>
+          <a:p>
+            <a:pPr lvl="2"/>
+            <a:r>
+              <a:rPr lang="en-US" sz="2000" dirty="0">
+                <a:latin typeface="Calibri" charset="0"/>
+              </a:rPr>
+              <a:t>m</a:t>
+            </a:r>
+            <a:r>
+              <a:rPr lang="en-US" sz="2000" dirty="0" smtClean="0">
+                <a:latin typeface="Calibri" charset="0"/>
+              </a:rPr>
+              <a:t>ate = </a:t>
+            </a:r>
+            <a:r>
+              <a:rPr lang="en-US" sz="2000" dirty="0" err="1" smtClean="0">
+                <a:latin typeface="Calibri" charset="0"/>
+              </a:rPr>
+              <a:t>MiNumero.new</a:t>
+            </a:r>
+            <a:r>
+              <a:rPr lang="en-US" sz="2000" dirty="0" smtClean="0">
+                <a:latin typeface="Calibri" charset="0"/>
+              </a:rPr>
+              <a:t>(15)</a:t>
+            </a:r>
+          </a:p>
+          <a:p>
+            <a:pPr lvl="2"/>
+            <a:r>
+              <a:rPr lang="en-US" sz="2000" dirty="0" err="1" smtClean="0">
+                <a:latin typeface="Calibri" charset="0"/>
+              </a:rPr>
+              <a:t>m</a:t>
+            </a:r>
+            <a:r>
+              <a:rPr lang="en-US" sz="2000" dirty="0" err="1" smtClean="0">
+                <a:latin typeface="Calibri" charset="0"/>
+              </a:rPr>
+              <a:t>ate.sumar</a:t>
+            </a:r>
+            <a:r>
+              <a:rPr lang="en-US" sz="2000" dirty="0" smtClean="0">
+                <a:latin typeface="Calibri" charset="0"/>
+              </a:rPr>
+              <a:t>(15)    		</a:t>
+            </a:r>
+            <a:r>
+              <a:rPr lang="en-US" sz="2000" dirty="0" smtClean="0">
+                <a:latin typeface="Calibri" charset="0"/>
+                <a:sym typeface="Wingdings"/>
+              </a:rPr>
+              <a:t> 30</a:t>
+            </a:r>
+          </a:p>
+          <a:p>
+            <a:pPr lvl="2"/>
+            <a:r>
+              <a:rPr lang="en-US" sz="2000" dirty="0" err="1">
+                <a:latin typeface="Calibri" charset="0"/>
+                <a:sym typeface="Wingdings"/>
+              </a:rPr>
+              <a:t>m</a:t>
+            </a:r>
+            <a:r>
+              <a:rPr lang="en-US" sz="2000" dirty="0" err="1" smtClean="0">
+                <a:latin typeface="Calibri" charset="0"/>
+                <a:sym typeface="Wingdings"/>
+              </a:rPr>
+              <a:t>ate.restar</a:t>
+            </a:r>
+            <a:r>
+              <a:rPr lang="en-US" sz="2000" dirty="0" smtClean="0">
+                <a:latin typeface="Calibri" charset="0"/>
+                <a:sym typeface="Wingdings"/>
+              </a:rPr>
+              <a:t>(4)       		 11</a:t>
+            </a:r>
+          </a:p>
+          <a:p>
+            <a:pPr lvl="2"/>
+            <a:r>
+              <a:rPr lang="en-US" sz="2000" dirty="0" err="1" smtClean="0">
+                <a:latin typeface="Calibri" charset="0"/>
+              </a:rPr>
+              <a:t>MiNumero.multiplicar</a:t>
+            </a:r>
+            <a:r>
+              <a:rPr lang="en-US" sz="2000" dirty="0" smtClean="0">
+                <a:latin typeface="Calibri" charset="0"/>
+              </a:rPr>
+              <a:t>(4,6) 	</a:t>
+            </a:r>
+            <a:r>
+              <a:rPr lang="en-US" sz="2000" dirty="0" smtClean="0">
+                <a:latin typeface="Calibri" charset="0"/>
+                <a:sym typeface="Wingdings"/>
+              </a:rPr>
+              <a:t> 24</a:t>
+            </a:r>
+            <a:endParaRPr lang="en-US" sz="2000" dirty="0">
               <a:latin typeface="Calibri" charset="0"/>
             </a:endParaRPr>
           </a:p>
@@ -10745,7 +13435,7 @@
 </p:sld>
 </file>
 
-<file path=ppt/slides/slide33.xml><?xml version="1.0" encoding="utf-8"?>
+<file path=ppt/slides/slide36.xml><?xml version="1.0" encoding="utf-8"?>
 <p:sld xmlns:a="http://schemas.openxmlformats.org/drawingml/2006/main" xmlns:r="http://schemas.openxmlformats.org/officeDocument/2006/relationships" xmlns:p="http://schemas.openxmlformats.org/presentationml/2006/main">
   <p:cSld>
     <p:spTree>
@@ -10846,7 +13536,7 @@
 </p:sld>
 </file>
 
-<file path=ppt/slides/slide34.xml><?xml version="1.0" encoding="utf-8"?>
+<file path=ppt/slides/slide37.xml><?xml version="1.0" encoding="utf-8"?>
 <p:sld xmlns:a="http://schemas.openxmlformats.org/drawingml/2006/main" xmlns:r="http://schemas.openxmlformats.org/officeDocument/2006/relationships" xmlns:p="http://schemas.openxmlformats.org/presentationml/2006/main">
   <p:cSld>
     <p:spTree>
@@ -10887,13 +13577,7 @@
               <a:rPr lang="es-ES" dirty="0" smtClean="0">
                 <a:latin typeface="Calibri" charset="0"/>
               </a:rPr>
-              <a:t>Trabajo </a:t>
-            </a:r>
-            <a:r>
-              <a:rPr lang="es-ES" dirty="0" smtClean="0">
-                <a:latin typeface="Calibri" charset="0"/>
-              </a:rPr>
-              <a:t>6: Archivos</a:t>
+              <a:t>Trabajo 6: Archivos</a:t>
             </a:r>
             <a:endParaRPr lang="en-US" dirty="0">
               <a:latin typeface="Calibri" charset="0"/>
@@ -10943,7 +13627,7 @@
 </p:sld>
 </file>
 
-<file path=ppt/slides/slide35.xml><?xml version="1.0" encoding="utf-8"?>
+<file path=ppt/slides/slide38.xml><?xml version="1.0" encoding="utf-8"?>
 <p:sld xmlns:a="http://schemas.openxmlformats.org/drawingml/2006/main" xmlns:r="http://schemas.openxmlformats.org/officeDocument/2006/relationships" xmlns:p="http://schemas.openxmlformats.org/presentationml/2006/main">
   <p:cSld>
     <p:spTree>
@@ -11043,7 +13727,7 @@
 </p:sld>
 </file>
 
-<file path=ppt/slides/slide36.xml><?xml version="1.0" encoding="utf-8"?>
+<file path=ppt/slides/slide39.xml><?xml version="1.0" encoding="utf-8"?>
 <p:sld xmlns:a="http://schemas.openxmlformats.org/drawingml/2006/main" xmlns:r="http://schemas.openxmlformats.org/officeDocument/2006/relationships" xmlns:p="http://schemas.openxmlformats.org/presentationml/2006/main">
   <p:cSld>
     <p:spTree>
@@ -11119,26 +13803,62 @@
           <a:lstStyle/>
           <a:p>
             <a:r>
+              <a:rPr lang="es-CR" dirty="0" smtClean="0">
+                <a:latin typeface="Calibri" charset="0"/>
+              </a:rPr>
+              <a:t>Toda excepci</a:t>
+            </a:r>
+            <a:r>
+              <a:rPr lang="es-CR" dirty="0" smtClean="0">
+                <a:latin typeface="Calibri" charset="0"/>
+              </a:rPr>
+              <a:t>ón hereda de una clase común de Excepción</a:t>
+            </a:r>
+          </a:p>
+          <a:p>
+            <a:r>
+              <a:rPr lang="es-CR" dirty="0" smtClean="0">
+                <a:latin typeface="Calibri" charset="0"/>
+              </a:rPr>
+              <a:t>Para levantar una excepción, se utiliza </a:t>
+            </a:r>
+            <a:r>
+              <a:rPr lang="es-CR" dirty="0" smtClean="0">
+                <a:latin typeface="Calibri" charset="0"/>
+              </a:rPr>
+              <a:t>“</a:t>
+            </a:r>
+            <a:r>
               <a:rPr lang="es-CR" dirty="0">
                 <a:latin typeface="Calibri" charset="0"/>
               </a:rPr>
-              <a:t>Every exception inherit from a common Exception class</a:t>
-            </a:r>
-          </a:p>
-          <a:p>
+              <a:t>raise”</a:t>
+            </a:r>
+          </a:p>
+          <a:p>
+            <a:r>
+              <a:rPr lang="es-CR" dirty="0" smtClean="0">
+                <a:latin typeface="Calibri" charset="0"/>
+              </a:rPr>
+              <a:t>Una de las excepciones m</a:t>
+            </a:r>
+            <a:r>
+              <a:rPr lang="es-CR" dirty="0" smtClean="0">
+                <a:latin typeface="Calibri" charset="0"/>
+              </a:rPr>
+              <a:t>ás comunes en ruby es </a:t>
+            </a:r>
+            <a:r>
+              <a:rPr lang="es-CR" dirty="0" smtClean="0">
+                <a:latin typeface="Calibri" charset="0"/>
+              </a:rPr>
+              <a:t>“</a:t>
+            </a:r>
             <a:r>
               <a:rPr lang="es-CR" dirty="0">
                 <a:latin typeface="Calibri" charset="0"/>
               </a:rPr>
-              <a:t>Throwing exceptions in ruby can be done by using “raise”</a:t>
-            </a:r>
-          </a:p>
-          <a:p>
-            <a:r>
-              <a:rPr lang="es-CR" dirty="0">
-                <a:latin typeface="Calibri" charset="0"/>
-              </a:rPr>
-              <a:t>The default exception in Ruby is “Runtime Exception”</a:t>
+              <a:t>Runtime Exception”</a:t>
             </a:r>
           </a:p>
         </p:txBody>
@@ -11154,7 +13874,7 @@
         <p:spPr bwMode="auto">
           <a:xfrm>
             <a:off x="5219700" y="1824038"/>
-            <a:ext cx="3686175" cy="3970337"/>
+            <a:ext cx="3495218" cy="3970318"/>
           </a:xfrm>
           <a:prstGeom prst="rect">
             <a:avLst/>
@@ -11297,98 +14017,126 @@
           <a:p>
             <a:pPr eaLnBrk="1" hangingPunct="1"/>
             <a:r>
-              <a:rPr lang="es-CR"/>
+              <a:rPr lang="es-CR" dirty="0"/>
               <a:t>f = File.open("testfile") </a:t>
             </a:r>
           </a:p>
           <a:p>
             <a:pPr eaLnBrk="1" hangingPunct="1"/>
             <a:r>
-              <a:rPr lang="es-CR"/>
+              <a:rPr lang="es-CR" dirty="0"/>
               <a:t>begin   </a:t>
             </a:r>
           </a:p>
           <a:p>
             <a:pPr eaLnBrk="1" hangingPunct="1"/>
             <a:r>
-              <a:rPr lang="es-CR"/>
-              <a:t>  # .. process </a:t>
-            </a:r>
+              <a:rPr lang="es-CR" dirty="0"/>
+              <a:t>  # .. </a:t>
+            </a:r>
+            <a:r>
+              <a:rPr lang="es-CR" dirty="0" smtClean="0"/>
+              <a:t>proceso</a:t>
+            </a:r>
+            <a:endParaRPr lang="es-CR" dirty="0"/>
           </a:p>
           <a:p>
             <a:pPr eaLnBrk="1" hangingPunct="1"/>
             <a:r>
-              <a:rPr lang="es-CR"/>
+              <a:rPr lang="es-CR" dirty="0"/>
               <a:t>  raise Exception, “FAIL here!!”</a:t>
             </a:r>
           </a:p>
           <a:p>
             <a:pPr eaLnBrk="1" hangingPunct="1"/>
             <a:r>
-              <a:rPr lang="es-CR"/>
+              <a:rPr lang="es-CR" dirty="0"/>
               <a:t>rescue OneTypeOfException</a:t>
             </a:r>
           </a:p>
           <a:p>
             <a:pPr eaLnBrk="1" hangingPunct="1"/>
             <a:r>
-              <a:rPr lang="es-CR"/>
-              <a:t>  # Handle one Exception</a:t>
-            </a:r>
+              <a:rPr lang="es-CR" dirty="0"/>
+              <a:t>  # </a:t>
+            </a:r>
+            <a:r>
+              <a:rPr lang="es-CR" dirty="0" smtClean="0"/>
+              <a:t>Manejar un tipo de excepci</a:t>
+            </a:r>
+            <a:r>
+              <a:rPr lang="es-CR" dirty="0" smtClean="0"/>
+              <a:t>ó</a:t>
+            </a:r>
+            <a:r>
+              <a:rPr lang="es-CR" dirty="0" smtClean="0"/>
+              <a:t>n</a:t>
+            </a:r>
+            <a:endParaRPr lang="es-CR" dirty="0"/>
           </a:p>
           <a:p>
             <a:pPr eaLnBrk="1" hangingPunct="1"/>
             <a:r>
-              <a:rPr lang="es-CR"/>
+              <a:rPr lang="es-CR" dirty="0"/>
               <a:t>rescue AnotherTypeOfException   </a:t>
             </a:r>
           </a:p>
           <a:p>
             <a:pPr eaLnBrk="1" hangingPunct="1"/>
             <a:r>
-              <a:rPr lang="es-CR"/>
+              <a:rPr lang="es-CR" dirty="0"/>
               <a:t>  retry</a:t>
             </a:r>
           </a:p>
           <a:p>
             <a:pPr eaLnBrk="1" hangingPunct="1"/>
             <a:r>
-              <a:rPr lang="es-CR"/>
+              <a:rPr lang="es-CR" dirty="0"/>
               <a:t>else</a:t>
             </a:r>
           </a:p>
           <a:p>
             <a:pPr eaLnBrk="1" hangingPunct="1"/>
             <a:r>
-              <a:rPr lang="es-CR"/>
-              <a:t>  # Any other exception</a:t>
-            </a:r>
+              <a:rPr lang="es-CR" dirty="0"/>
+              <a:t>  # </a:t>
+            </a:r>
+            <a:r>
+              <a:rPr lang="es-CR" dirty="0" smtClean="0"/>
+              <a:t>cualquier otra excepcion</a:t>
+            </a:r>
+            <a:endParaRPr lang="es-CR" dirty="0"/>
           </a:p>
           <a:p>
             <a:pPr eaLnBrk="1" hangingPunct="1"/>
             <a:r>
-              <a:rPr lang="es-CR"/>
+              <a:rPr lang="es-CR" dirty="0"/>
               <a:t>ensure   </a:t>
             </a:r>
           </a:p>
           <a:p>
             <a:pPr eaLnBrk="1" hangingPunct="1"/>
             <a:r>
-              <a:rPr lang="es-CR"/>
-              <a:t>  # execute always this method</a:t>
-            </a:r>
+              <a:rPr lang="es-CR" dirty="0"/>
+              <a:t>  # </a:t>
+            </a:r>
+            <a:r>
+              <a:rPr lang="es-CR" dirty="0" smtClean="0"/>
+              <a:t>siempre ejecutelo</a:t>
+            </a:r>
+            <a:endParaRPr lang="es-CR" dirty="0"/>
           </a:p>
           <a:p>
             <a:pPr eaLnBrk="1" hangingPunct="1"/>
             <a:r>
-              <a:rPr lang="es-CR"/>
+              <a:rPr lang="es-CR" dirty="0"/>
               <a:t>  f.close unless f.nil? </a:t>
             </a:r>
           </a:p>
           <a:p>
             <a:pPr eaLnBrk="1" hangingPunct="1"/>
             <a:r>
-              <a:rPr lang="es-CR"/>
+              <a:rPr lang="es-CR" dirty="0"/>
               <a:t>end</a:t>
             </a:r>
           </a:p>
@@ -11404,271 +14152,6 @@
   <p:clrMapOvr>
     <a:masterClrMapping/>
   </p:clrMapOvr>
-</p:sld>
-</file>
-
-<file path=ppt/slides/slide37.xml><?xml version="1.0" encoding="utf-8"?>
-<p:sld xmlns:a="http://schemas.openxmlformats.org/drawingml/2006/main" xmlns:r="http://schemas.openxmlformats.org/officeDocument/2006/relationships" xmlns:p="http://schemas.openxmlformats.org/presentationml/2006/main">
-  <p:cSld>
-    <p:spTree>
-      <p:nvGrpSpPr>
-        <p:cNvPr id="1" name=""/>
-        <p:cNvGrpSpPr/>
-        <p:nvPr/>
-      </p:nvGrpSpPr>
-      <p:grpSpPr>
-        <a:xfrm>
-          <a:off x="0" y="0"/>
-          <a:ext cx="0" cy="0"/>
-          <a:chOff x="0" y="0"/>
-          <a:chExt cx="0" cy="0"/>
-        </a:xfrm>
-      </p:grpSpPr>
-      <p:sp>
-        <p:nvSpPr>
-          <p:cNvPr id="20482" name="3 Título"/>
-          <p:cNvSpPr>
-            <a:spLocks noGrp="1"/>
-          </p:cNvSpPr>
-          <p:nvPr>
-            <p:ph type="ctrTitle"/>
-          </p:nvPr>
-        </p:nvSpPr>
-        <p:spPr/>
-        <p:txBody>
-          <a:bodyPr/>
-          <a:lstStyle/>
-          <a:p>
-            <a:r>
-              <a:rPr lang="es-CR" dirty="0" smtClean="0">
-                <a:latin typeface="Calibri" charset="0"/>
-              </a:rPr>
-              <a:t>Tarea</a:t>
-            </a:r>
-            <a:endParaRPr lang="es-CR" dirty="0">
-              <a:latin typeface="Calibri" charset="0"/>
-            </a:endParaRPr>
-          </a:p>
-        </p:txBody>
-      </p:sp>
-      <p:sp>
-        <p:nvSpPr>
-          <p:cNvPr id="5" name="4 Subtítulo"/>
-          <p:cNvSpPr>
-            <a:spLocks noGrp="1"/>
-          </p:cNvSpPr>
-          <p:nvPr>
-            <p:ph type="subTitle" idx="1"/>
-          </p:nvPr>
-        </p:nvSpPr>
-        <p:spPr>
-          <a:xfrm>
-            <a:off x="1011238" y="3886200"/>
-            <a:ext cx="7016750" cy="1752600"/>
-          </a:xfrm>
-        </p:spPr>
-        <p:txBody>
-          <a:bodyPr/>
-          <a:lstStyle/>
-          <a:p>
-            <a:pPr>
-              <a:defRPr/>
-            </a:pPr>
-            <a:r>
-              <a:rPr lang="en-US" dirty="0" err="1" smtClean="0">
-                <a:ea typeface="+mn-ea"/>
-              </a:rPr>
-              <a:t>Entrega</a:t>
-            </a:r>
-            <a:r>
-              <a:rPr lang="en-US" dirty="0" smtClean="0">
-                <a:ea typeface="+mn-ea"/>
-              </a:rPr>
-              <a:t>: 27 de </a:t>
-            </a:r>
-            <a:r>
-              <a:rPr lang="en-US" dirty="0" err="1" smtClean="0">
-                <a:ea typeface="+mn-ea"/>
-              </a:rPr>
-              <a:t>abril</a:t>
-            </a:r>
-            <a:endParaRPr lang="en-US" dirty="0" smtClean="0">
-              <a:ea typeface="+mn-ea"/>
-            </a:endParaRPr>
-          </a:p>
-          <a:p>
-            <a:pPr>
-              <a:defRPr/>
-            </a:pPr>
-            <a:endParaRPr lang="en-US" dirty="0" smtClean="0">
-              <a:ea typeface="+mn-ea"/>
-            </a:endParaRPr>
-          </a:p>
-        </p:txBody>
-      </p:sp>
-    </p:spTree>
-    <p:extLst>
-      <p:ext uri="{BB962C8B-B14F-4D97-AF65-F5344CB8AC3E}">
-        <p14:creationId xmlns:p14="http://schemas.microsoft.com/office/powerpoint/2010/main" val="1396892980"/>
-      </p:ext>
-    </p:extLst>
-  </p:cSld>
-  <p:clrMapOvr>
-    <a:masterClrMapping/>
-  </p:clrMapOvr>
-  <p:timing>
-    <p:tnLst>
-      <p:par>
-        <p:cTn xmlns:p14="http://schemas.microsoft.com/office/powerpoint/2010/main" id="1" dur="indefinite" restart="never" nodeType="tmRoot"/>
-      </p:par>
-    </p:tnLst>
-  </p:timing>
-</p:sld>
-</file>
-
-<file path=ppt/slides/slide38.xml><?xml version="1.0" encoding="utf-8"?>
-<p:sld xmlns:a="http://schemas.openxmlformats.org/drawingml/2006/main" xmlns:r="http://schemas.openxmlformats.org/officeDocument/2006/relationships" xmlns:p="http://schemas.openxmlformats.org/presentationml/2006/main">
-  <p:cSld>
-    <p:spTree>
-      <p:nvGrpSpPr>
-        <p:cNvPr id="1" name=""/>
-        <p:cNvGrpSpPr/>
-        <p:nvPr/>
-      </p:nvGrpSpPr>
-      <p:grpSpPr>
-        <a:xfrm>
-          <a:off x="0" y="0"/>
-          <a:ext cx="0" cy="0"/>
-          <a:chOff x="0" y="0"/>
-          <a:chExt cx="0" cy="0"/>
-        </a:xfrm>
-      </p:grpSpPr>
-      <p:sp>
-        <p:nvSpPr>
-          <p:cNvPr id="21506" name="1 Título"/>
-          <p:cNvSpPr>
-            <a:spLocks noGrp="1"/>
-          </p:cNvSpPr>
-          <p:nvPr>
-            <p:ph type="title"/>
-          </p:nvPr>
-        </p:nvSpPr>
-        <p:spPr>
-          <a:xfrm>
-            <a:off x="457200" y="-100013"/>
-            <a:ext cx="8229600" cy="1143001"/>
-          </a:xfrm>
-        </p:spPr>
-        <p:txBody>
-          <a:bodyPr/>
-          <a:lstStyle/>
-          <a:p>
-            <a:r>
-              <a:rPr lang="es-CR" dirty="0" smtClean="0">
-                <a:latin typeface="Calibri" charset="0"/>
-              </a:rPr>
-              <a:t>Referencias Bibliogr</a:t>
-            </a:r>
-            <a:r>
-              <a:rPr lang="es-CR" dirty="0" smtClean="0">
-                <a:latin typeface="Calibri" charset="0"/>
-              </a:rPr>
-              <a:t>áficas</a:t>
-            </a:r>
-            <a:endParaRPr lang="es-CR" dirty="0">
-              <a:latin typeface="Calibri" charset="0"/>
-            </a:endParaRPr>
-          </a:p>
-        </p:txBody>
-      </p:sp>
-      <p:sp>
-        <p:nvSpPr>
-          <p:cNvPr id="21507" name="2 Marcador de contenido"/>
-          <p:cNvSpPr>
-            <a:spLocks noGrp="1"/>
-          </p:cNvSpPr>
-          <p:nvPr>
-            <p:ph idx="1"/>
-          </p:nvPr>
-        </p:nvSpPr>
-        <p:spPr/>
-        <p:txBody>
-          <a:bodyPr/>
-          <a:lstStyle/>
-          <a:p>
-            <a:r>
-              <a:rPr lang="es-CR" dirty="0">
-                <a:latin typeface="Calibri" charset="0"/>
-                <a:hlinkClick r:id="rId2"/>
-              </a:rPr>
-              <a:t>http://en.wikipedia.org/wiki/Rake_%28software%29</a:t>
-            </a:r>
-            <a:endParaRPr lang="es-CR" dirty="0">
-              <a:latin typeface="Calibri" charset="0"/>
-            </a:endParaRPr>
-          </a:p>
-          <a:p>
-            <a:r>
-              <a:rPr lang="es-CR" dirty="0">
-                <a:latin typeface="Calibri" charset="0"/>
-                <a:hlinkClick r:id="rId3"/>
-              </a:rPr>
-              <a:t>http://en.wikipedia.org/wiki/Ruby_%28programming_language%29</a:t>
-            </a:r>
-            <a:endParaRPr lang="es-CR" dirty="0">
-              <a:latin typeface="Calibri" charset="0"/>
-            </a:endParaRPr>
-          </a:p>
-          <a:p>
-            <a:r>
-              <a:rPr lang="es-CR" dirty="0">
-                <a:latin typeface="Calibri" charset="0"/>
-                <a:hlinkClick r:id="rId4"/>
-              </a:rPr>
-              <a:t>http://www.ruby-doc.org/docs/Tutorial/</a:t>
-            </a:r>
-            <a:endParaRPr lang="es-CR" dirty="0">
-              <a:latin typeface="Calibri" charset="0"/>
-            </a:endParaRPr>
-          </a:p>
-          <a:p>
-            <a:r>
-              <a:rPr lang="es-CR" dirty="0">
-                <a:latin typeface="Calibri" charset="0"/>
-                <a:hlinkClick r:id="rId5"/>
-              </a:rPr>
-              <a:t>http://rubytutorial.wikidot.com</a:t>
-            </a:r>
-            <a:r>
-              <a:rPr lang="es-CR" dirty="0" smtClean="0">
-                <a:latin typeface="Calibri" charset="0"/>
-                <a:hlinkClick r:id="rId5"/>
-              </a:rPr>
-              <a:t>/</a:t>
-            </a:r>
-            <a:endParaRPr lang="es-CR" dirty="0">
-              <a:latin typeface="Calibri" charset="0"/>
-            </a:endParaRPr>
-          </a:p>
-        </p:txBody>
-      </p:sp>
-    </p:spTree>
-    <p:extLst>
-      <p:ext uri="{BB962C8B-B14F-4D97-AF65-F5344CB8AC3E}">
-        <p14:creationId xmlns:p14="http://schemas.microsoft.com/office/powerpoint/2010/main" val="4122584895"/>
-      </p:ext>
-    </p:extLst>
-  </p:cSld>
-  <p:clrMapOvr>
-    <a:masterClrMapping/>
-  </p:clrMapOvr>
-  <p:timing>
-    <p:tnLst>
-      <p:par>
-        <p:cTn xmlns:p14="http://schemas.microsoft.com/office/powerpoint/2010/main" id="1" dur="indefinite" restart="never" nodeType="tmRoot"/>
-      </p:par>
-    </p:tnLst>
-  </p:timing>
 </p:sld>
 </file>
 
@@ -11792,6 +14275,265 @@
     <p:extLst>
       <p:ext uri="{BB962C8B-B14F-4D97-AF65-F5344CB8AC3E}">
         <p14:creationId xmlns:p14="http://schemas.microsoft.com/office/powerpoint/2010/main" val="1969834729"/>
+      </p:ext>
+    </p:extLst>
+  </p:cSld>
+  <p:clrMapOvr>
+    <a:masterClrMapping/>
+  </p:clrMapOvr>
+  <p:timing>
+    <p:tnLst>
+      <p:par>
+        <p:cTn xmlns:p14="http://schemas.microsoft.com/office/powerpoint/2010/main" id="1" dur="indefinite" restart="never" nodeType="tmRoot"/>
+      </p:par>
+    </p:tnLst>
+  </p:timing>
+</p:sld>
+</file>
+
+<file path=ppt/slides/slide40.xml><?xml version="1.0" encoding="utf-8"?>
+<p:sld xmlns:a="http://schemas.openxmlformats.org/drawingml/2006/main" xmlns:r="http://schemas.openxmlformats.org/officeDocument/2006/relationships" xmlns:p="http://schemas.openxmlformats.org/presentationml/2006/main">
+  <p:cSld>
+    <p:spTree>
+      <p:nvGrpSpPr>
+        <p:cNvPr id="1" name=""/>
+        <p:cNvGrpSpPr/>
+        <p:nvPr/>
+      </p:nvGrpSpPr>
+      <p:grpSpPr>
+        <a:xfrm>
+          <a:off x="0" y="0"/>
+          <a:ext cx="0" cy="0"/>
+          <a:chOff x="0" y="0"/>
+          <a:chExt cx="0" cy="0"/>
+        </a:xfrm>
+      </p:grpSpPr>
+      <p:sp>
+        <p:nvSpPr>
+          <p:cNvPr id="20482" name="3 Título"/>
+          <p:cNvSpPr>
+            <a:spLocks noGrp="1"/>
+          </p:cNvSpPr>
+          <p:nvPr>
+            <p:ph type="ctrTitle"/>
+          </p:nvPr>
+        </p:nvSpPr>
+        <p:spPr/>
+        <p:txBody>
+          <a:bodyPr/>
+          <a:lstStyle/>
+          <a:p>
+            <a:r>
+              <a:rPr lang="es-CR" dirty="0" smtClean="0">
+                <a:latin typeface="Calibri" charset="0"/>
+              </a:rPr>
+              <a:t>Tarea</a:t>
+            </a:r>
+            <a:endParaRPr lang="es-CR" dirty="0">
+              <a:latin typeface="Calibri" charset="0"/>
+            </a:endParaRPr>
+          </a:p>
+        </p:txBody>
+      </p:sp>
+      <p:sp>
+        <p:nvSpPr>
+          <p:cNvPr id="5" name="4 Subtítulo"/>
+          <p:cNvSpPr>
+            <a:spLocks noGrp="1"/>
+          </p:cNvSpPr>
+          <p:nvPr>
+            <p:ph type="subTitle" idx="1"/>
+          </p:nvPr>
+        </p:nvSpPr>
+        <p:spPr>
+          <a:xfrm>
+            <a:off x="1011238" y="3886200"/>
+            <a:ext cx="7016750" cy="1752600"/>
+          </a:xfrm>
+        </p:spPr>
+        <p:txBody>
+          <a:bodyPr/>
+          <a:lstStyle/>
+          <a:p>
+            <a:pPr>
+              <a:defRPr/>
+            </a:pPr>
+            <a:r>
+              <a:rPr lang="en-US" dirty="0" err="1" smtClean="0">
+                <a:ea typeface="+mn-ea"/>
+              </a:rPr>
+              <a:t>Entrega</a:t>
+            </a:r>
+            <a:r>
+              <a:rPr lang="en-US" dirty="0" smtClean="0">
+                <a:ea typeface="+mn-ea"/>
+              </a:rPr>
+              <a:t>: 27 de </a:t>
+            </a:r>
+            <a:r>
+              <a:rPr lang="en-US" dirty="0" err="1" smtClean="0">
+                <a:ea typeface="+mn-ea"/>
+              </a:rPr>
+              <a:t>abril</a:t>
+            </a:r>
+            <a:endParaRPr lang="en-US" dirty="0" smtClean="0">
+              <a:ea typeface="+mn-ea"/>
+            </a:endParaRPr>
+          </a:p>
+          <a:p>
+            <a:pPr>
+              <a:defRPr/>
+            </a:pPr>
+            <a:endParaRPr lang="en-US" dirty="0" smtClean="0">
+              <a:ea typeface="+mn-ea"/>
+            </a:endParaRPr>
+          </a:p>
+        </p:txBody>
+      </p:sp>
+    </p:spTree>
+    <p:extLst>
+      <p:ext uri="{BB962C8B-B14F-4D97-AF65-F5344CB8AC3E}">
+        <p14:creationId xmlns:p14="http://schemas.microsoft.com/office/powerpoint/2010/main" val="1396892980"/>
+      </p:ext>
+    </p:extLst>
+  </p:cSld>
+  <p:clrMapOvr>
+    <a:masterClrMapping/>
+  </p:clrMapOvr>
+  <p:timing>
+    <p:tnLst>
+      <p:par>
+        <p:cTn xmlns:p14="http://schemas.microsoft.com/office/powerpoint/2010/main" id="1" dur="indefinite" restart="never" nodeType="tmRoot"/>
+      </p:par>
+    </p:tnLst>
+  </p:timing>
+</p:sld>
+</file>
+
+<file path=ppt/slides/slide41.xml><?xml version="1.0" encoding="utf-8"?>
+<p:sld xmlns:a="http://schemas.openxmlformats.org/drawingml/2006/main" xmlns:r="http://schemas.openxmlformats.org/officeDocument/2006/relationships" xmlns:p="http://schemas.openxmlformats.org/presentationml/2006/main">
+  <p:cSld>
+    <p:spTree>
+      <p:nvGrpSpPr>
+        <p:cNvPr id="1" name=""/>
+        <p:cNvGrpSpPr/>
+        <p:nvPr/>
+      </p:nvGrpSpPr>
+      <p:grpSpPr>
+        <a:xfrm>
+          <a:off x="0" y="0"/>
+          <a:ext cx="0" cy="0"/>
+          <a:chOff x="0" y="0"/>
+          <a:chExt cx="0" cy="0"/>
+        </a:xfrm>
+      </p:grpSpPr>
+      <p:sp>
+        <p:nvSpPr>
+          <p:cNvPr id="21506" name="1 Título"/>
+          <p:cNvSpPr>
+            <a:spLocks noGrp="1"/>
+          </p:cNvSpPr>
+          <p:nvPr>
+            <p:ph type="title"/>
+          </p:nvPr>
+        </p:nvSpPr>
+        <p:spPr>
+          <a:xfrm>
+            <a:off x="457200" y="-100013"/>
+            <a:ext cx="8229600" cy="1143001"/>
+          </a:xfrm>
+        </p:spPr>
+        <p:txBody>
+          <a:bodyPr/>
+          <a:lstStyle/>
+          <a:p>
+            <a:r>
+              <a:rPr lang="es-CR" dirty="0" smtClean="0">
+                <a:latin typeface="Calibri" charset="0"/>
+              </a:rPr>
+              <a:t>Referencias Bibliográficas</a:t>
+            </a:r>
+            <a:endParaRPr lang="es-CR" dirty="0">
+              <a:latin typeface="Calibri" charset="0"/>
+            </a:endParaRPr>
+          </a:p>
+        </p:txBody>
+      </p:sp>
+      <p:sp>
+        <p:nvSpPr>
+          <p:cNvPr id="21507" name="2 Marcador de contenido"/>
+          <p:cNvSpPr>
+            <a:spLocks noGrp="1"/>
+          </p:cNvSpPr>
+          <p:nvPr>
+            <p:ph idx="1"/>
+          </p:nvPr>
+        </p:nvSpPr>
+        <p:spPr/>
+        <p:txBody>
+          <a:bodyPr/>
+          <a:lstStyle/>
+          <a:p>
+            <a:r>
+              <a:rPr lang="es-CR" dirty="0">
+                <a:latin typeface="Calibri" charset="0"/>
+                <a:hlinkClick r:id="rId2"/>
+              </a:rPr>
+              <a:t>http://en.wikipedia.org/wiki/Rake_%28software%29</a:t>
+            </a:r>
+            <a:endParaRPr lang="es-CR" dirty="0">
+              <a:latin typeface="Calibri" charset="0"/>
+            </a:endParaRPr>
+          </a:p>
+          <a:p>
+            <a:r>
+              <a:rPr lang="es-CR" dirty="0">
+                <a:latin typeface="Calibri" charset="0"/>
+                <a:hlinkClick r:id="rId3"/>
+              </a:rPr>
+              <a:t>http://en.wikipedia.org/wiki/Ruby_%28programming_language%29</a:t>
+            </a:r>
+            <a:endParaRPr lang="es-CR" dirty="0">
+              <a:latin typeface="Calibri" charset="0"/>
+            </a:endParaRPr>
+          </a:p>
+          <a:p>
+            <a:r>
+              <a:rPr lang="es-CR" dirty="0">
+                <a:latin typeface="Calibri" charset="0"/>
+                <a:hlinkClick r:id="rId4"/>
+              </a:rPr>
+              <a:t>http://www.ruby-doc.org/docs/Tutorial/</a:t>
+            </a:r>
+            <a:endParaRPr lang="es-CR" dirty="0">
+              <a:latin typeface="Calibri" charset="0"/>
+            </a:endParaRPr>
+          </a:p>
+          <a:p>
+            <a:r>
+              <a:rPr lang="es-CR" dirty="0">
+                <a:latin typeface="Calibri" charset="0"/>
+                <a:hlinkClick r:id="rId5"/>
+              </a:rPr>
+              <a:t>http://rubytutorial.wikidot.com</a:t>
+            </a:r>
+            <a:r>
+              <a:rPr lang="es-CR" dirty="0" smtClean="0">
+                <a:latin typeface="Calibri" charset="0"/>
+                <a:hlinkClick r:id="rId5"/>
+              </a:rPr>
+              <a:t>/</a:t>
+            </a:r>
+            <a:endParaRPr lang="es-CR" dirty="0">
+              <a:latin typeface="Calibri" charset="0"/>
+            </a:endParaRPr>
+          </a:p>
+        </p:txBody>
+      </p:sp>
+    </p:spTree>
+    <p:extLst>
+      <p:ext uri="{BB962C8B-B14F-4D97-AF65-F5344CB8AC3E}">
+        <p14:creationId xmlns:p14="http://schemas.microsoft.com/office/powerpoint/2010/main" val="4122584895"/>
       </p:ext>
     </p:extLst>
   </p:cSld>
@@ -12000,19 +14742,7 @@
               <a:rPr lang="es-ES" dirty="0" smtClean="0">
                 <a:latin typeface="Calibri" charset="0"/>
               </a:rPr>
-              <a:t>Trabajo </a:t>
-            </a:r>
-            <a:r>
-              <a:rPr lang="es-ES" dirty="0" smtClean="0">
-                <a:latin typeface="Calibri" charset="0"/>
-              </a:rPr>
-              <a:t>1: </a:t>
-            </a:r>
-            <a:r>
-              <a:rPr lang="es-ES" dirty="0" smtClean="0">
-                <a:latin typeface="Calibri" charset="0"/>
-              </a:rPr>
-              <a:t>Hashes</a:t>
+              <a:t>Trabajo 1: Hashes</a:t>
             </a:r>
             <a:endParaRPr lang="en-US" dirty="0">
               <a:latin typeface="Calibri" charset="0"/>

</xml_diff>

<commit_message>
Agregando unos arreglos a la presentacion y el ejercicio que hicimos en clase
</commit_message>
<xml_diff>
--- a/presentaciones/Clase 2-Introduccion a Ruby.pptx
+++ b/presentaciones/Clase 2-Introduccion a Ruby.pptx
@@ -280,7 +280,7 @@
             <a:fld id="{4267BE09-23C4-EA44-B3BC-248C48E87497}" type="datetimeFigureOut">
               <a:rPr lang="es-CR"/>
               <a:pPr/>
-              <a:t>4/12/15</a:t>
+              <a:t>4/14/15</a:t>
             </a:fld>
             <a:endParaRPr lang="es-CR"/>
           </a:p>
@@ -781,7 +781,7 @@
             <a:fld id="{70B90A40-B659-224A-80B0-5653A15AE0DA}" type="datetimeFigureOut">
               <a:rPr lang="en-US"/>
               <a:pPr/>
-              <a:t>4/12/15</a:t>
+              <a:t>4/14/15</a:t>
             </a:fld>
             <a:endParaRPr lang="en-US"/>
           </a:p>
@@ -968,7 +968,7 @@
             <a:fld id="{0D6C1D08-8629-9741-B74D-B129FFF6F82A}" type="datetimeFigureOut">
               <a:rPr lang="en-US"/>
               <a:pPr/>
-              <a:t>4/12/15</a:t>
+              <a:t>4/14/15</a:t>
             </a:fld>
             <a:endParaRPr lang="en-US"/>
           </a:p>
@@ -1165,7 +1165,7 @@
             <a:fld id="{BBD13895-6440-1846-867C-988EA1454632}" type="datetimeFigureOut">
               <a:rPr lang="en-US"/>
               <a:pPr/>
-              <a:t>4/12/15</a:t>
+              <a:t>4/14/15</a:t>
             </a:fld>
             <a:endParaRPr lang="en-US"/>
           </a:p>
@@ -1352,7 +1352,7 @@
             <a:fld id="{EFF7C72E-B1EA-224E-9FC7-96B80B148742}" type="datetimeFigureOut">
               <a:rPr lang="en-US"/>
               <a:pPr/>
-              <a:t>4/12/15</a:t>
+              <a:t>4/14/15</a:t>
             </a:fld>
             <a:endParaRPr lang="en-US"/>
           </a:p>
@@ -1615,7 +1615,7 @@
             <a:fld id="{290325A9-9FD2-BD42-A3AC-A784F47E1A9A}" type="datetimeFigureOut">
               <a:rPr lang="en-US"/>
               <a:pPr/>
-              <a:t>4/12/15</a:t>
+              <a:t>4/14/15</a:t>
             </a:fld>
             <a:endParaRPr lang="en-US"/>
           </a:p>
@@ -1920,7 +1920,7 @@
             <a:fld id="{5E882BC8-BB8B-6F43-A8B0-149CD86CC90B}" type="datetimeFigureOut">
               <a:rPr lang="en-US"/>
               <a:pPr/>
-              <a:t>4/12/15</a:t>
+              <a:t>4/14/15</a:t>
             </a:fld>
             <a:endParaRPr lang="en-US"/>
           </a:p>
@@ -2359,7 +2359,7 @@
             <a:fld id="{17862DB7-C18D-6E41-85D4-A46D04DDF788}" type="datetimeFigureOut">
               <a:rPr lang="en-US"/>
               <a:pPr/>
-              <a:t>4/12/15</a:t>
+              <a:t>4/14/15</a:t>
             </a:fld>
             <a:endParaRPr lang="en-US"/>
           </a:p>
@@ -2494,7 +2494,7 @@
             <a:fld id="{0ED5B260-A184-4E45-81B3-A707ABDAF358}" type="datetimeFigureOut">
               <a:rPr lang="en-US"/>
               <a:pPr/>
-              <a:t>4/12/15</a:t>
+              <a:t>4/14/15</a:t>
             </a:fld>
             <a:endParaRPr lang="en-US"/>
           </a:p>
@@ -2606,7 +2606,7 @@
             <a:fld id="{C39689B0-A911-D441-984C-17C806F4A6D2}" type="datetimeFigureOut">
               <a:rPr lang="en-US"/>
               <a:pPr/>
-              <a:t>4/12/15</a:t>
+              <a:t>4/14/15</a:t>
             </a:fld>
             <a:endParaRPr lang="en-US"/>
           </a:p>
@@ -2900,7 +2900,7 @@
             <a:fld id="{40C7C9B2-AF00-FE4B-9411-ABF43A20885D}" type="datetimeFigureOut">
               <a:rPr lang="en-US"/>
               <a:pPr/>
-              <a:t>4/12/15</a:t>
+              <a:t>4/14/15</a:t>
             </a:fld>
             <a:endParaRPr lang="en-US"/>
           </a:p>
@@ -3177,7 +3177,7 @@
             <a:fld id="{C929C2AB-758A-4D4B-B49A-AD6EEF4EFFF7}" type="datetimeFigureOut">
               <a:rPr lang="en-US"/>
               <a:pPr/>
-              <a:t>4/12/15</a:t>
+              <a:t>4/14/15</a:t>
             </a:fld>
             <a:endParaRPr lang="en-US"/>
           </a:p>
@@ -3472,7 +3472,7 @@
             <a:fld id="{D6B74E06-241F-9C44-93A8-AB6BF52B6421}" type="datetimeFigureOut">
               <a:rPr lang="en-US"/>
               <a:pPr/>
-              <a:t>4/12/15</a:t>
+              <a:t>4/14/15</a:t>
             </a:fld>
             <a:endParaRPr lang="en-US"/>
           </a:p>
@@ -4639,6 +4639,13 @@
   <p:clrMapOvr>
     <a:masterClrMapping/>
   </p:clrMapOvr>
+  <p:timing>
+    <p:tnLst>
+      <p:par>
+        <p:cTn xmlns:p14="http://schemas.microsoft.com/office/powerpoint/2010/main" id="1" dur="indefinite" restart="never" nodeType="tmRoot"/>
+      </p:par>
+    </p:tnLst>
+  </p:timing>
 </p:sld>
 </file>
 
@@ -4868,7 +4875,7 @@
         <p:spPr>
           <a:xfrm>
             <a:off x="1835150" y="1169988"/>
-            <a:ext cx="5188477" cy="5022915"/>
+            <a:ext cx="4882692" cy="5355314"/>
           </a:xfrm>
         </p:spPr>
         <p:txBody>
@@ -4887,6 +4894,9 @@
               </a:rPr>
               <a:t>class Dog </a:t>
             </a:r>
+            <a:endParaRPr lang="es-CR" sz="1800" dirty="0" smtClean="0">
+              <a:latin typeface="Calibri" charset="0"/>
+            </a:endParaRPr>
           </a:p>
           <a:p>
             <a:pPr>
@@ -4897,14 +4907,11 @@
               <a:rPr lang="es-CR" sz="1800" dirty="0" smtClean="0">
                 <a:latin typeface="Calibri" charset="0"/>
               </a:rPr>
-              <a:t>def </a:t>
-            </a:r>
-            <a:r>
-              <a:rPr lang="es-CR" sz="1800" dirty="0">
-                <a:latin typeface="Calibri" charset="0"/>
-              </a:rPr>
-              <a:t>initialize(breed, name) </a:t>
-            </a:r>
+              <a:t>attr_accessor :breed</a:t>
+            </a:r>
+            <a:endParaRPr lang="es-CR" sz="1800" dirty="0">
+              <a:latin typeface="Calibri" charset="0"/>
+            </a:endParaRPr>
           </a:p>
           <a:p>
             <a:pPr>
@@ -4912,10 +4919,16 @@
               <a:buNone/>
             </a:pPr>
             <a:r>
+              <a:rPr lang="es-CR" sz="1800" dirty="0" smtClean="0">
+                <a:latin typeface="Calibri" charset="0"/>
+              </a:rPr>
+              <a:t>def </a:t>
+            </a:r>
+            <a:r>
               <a:rPr lang="es-CR" sz="1800" dirty="0">
                 <a:latin typeface="Calibri" charset="0"/>
               </a:rPr>
-              <a:t>    @breed = breed </a:t>
+              <a:t>initialize(breed, name) </a:t>
             </a:r>
           </a:p>
           <a:p>
@@ -4927,7 +4940,7 @@
               <a:rPr lang="es-CR" sz="1800" dirty="0">
                 <a:latin typeface="Calibri" charset="0"/>
               </a:rPr>
-              <a:t>    @name = name</a:t>
+              <a:t>    @breed = breed </a:t>
             </a:r>
           </a:p>
           <a:p>
@@ -4939,7 +4952,7 @@
               <a:rPr lang="es-CR" sz="1800" dirty="0">
                 <a:latin typeface="Calibri" charset="0"/>
               </a:rPr>
-              <a:t>  end </a:t>
+              <a:t>    @name = name</a:t>
             </a:r>
           </a:p>
           <a:p>
@@ -4951,7 +4964,7 @@
               <a:rPr lang="es-CR" sz="1800" dirty="0">
                 <a:latin typeface="Calibri" charset="0"/>
               </a:rPr>
-              <a:t>  def bark </a:t>
+              <a:t>  end </a:t>
             </a:r>
           </a:p>
           <a:p>
@@ -4963,19 +4976,7 @@
               <a:rPr lang="es-CR" sz="1800" dirty="0">
                 <a:latin typeface="Calibri" charset="0"/>
               </a:rPr>
-              <a:t>     puts </a:t>
-            </a:r>
-            <a:r>
-              <a:rPr lang="es-CR" sz="1800" dirty="0" smtClean="0">
-                <a:latin typeface="Calibri" charset="0"/>
-              </a:rPr>
-              <a:t>‘guau! guau!</a:t>
-            </a:r>
-            <a:r>
-              <a:rPr lang="es-CR" sz="1800" dirty="0">
-                <a:latin typeface="Calibri" charset="0"/>
-              </a:rPr>
-              <a:t>' </a:t>
+              <a:t>  def bark </a:t>
             </a:r>
           </a:p>
           <a:p>
@@ -4987,7 +4988,31 @@
               <a:rPr lang="es-CR" sz="1800" dirty="0">
                 <a:latin typeface="Calibri" charset="0"/>
               </a:rPr>
-              <a:t>  end </a:t>
+              <a:t>    </a:t>
+            </a:r>
+            <a:r>
+              <a:rPr lang="es-CR" sz="1800">
+                <a:latin typeface="Calibri" charset="0"/>
+              </a:rPr>
+              <a:t> </a:t>
+            </a:r>
+            <a:r>
+              <a:rPr lang="es-CR" sz="1800" smtClean="0">
+                <a:latin typeface="Calibri" charset="0"/>
+              </a:rPr>
+              <a:t> ‘</a:t>
+            </a:r>
+            <a:r>
+              <a:rPr lang="es-CR" sz="1800" dirty="0" smtClean="0">
+                <a:latin typeface="Calibri" charset="0"/>
+              </a:rPr>
+              <a:t>guau! guau!</a:t>
+            </a:r>
+            <a:r>
+              <a:rPr lang="es-CR" sz="1800" dirty="0">
+                <a:latin typeface="Calibri" charset="0"/>
+              </a:rPr>
+              <a:t>' </a:t>
             </a:r>
           </a:p>
           <a:p>
@@ -4999,7 +5024,7 @@
               <a:rPr lang="es-CR" sz="1800" dirty="0">
                 <a:latin typeface="Calibri" charset="0"/>
               </a:rPr>
-              <a:t>  def greed </a:t>
+              <a:t>  end </a:t>
             </a:r>
           </a:p>
           <a:p>
@@ -5011,31 +5036,7 @@
               <a:rPr lang="es-CR" sz="1800" dirty="0">
                 <a:latin typeface="Calibri" charset="0"/>
               </a:rPr>
-              <a:t>  puts </a:t>
-            </a:r>
-            <a:r>
-              <a:rPr lang="es-CR" sz="1800" dirty="0" smtClean="0">
-                <a:latin typeface="Calibri" charset="0"/>
-              </a:rPr>
-              <a:t>“Soy un #</a:t>
-            </a:r>
-            <a:r>
-              <a:rPr lang="es-CR" sz="1800" dirty="0">
-                <a:latin typeface="Calibri" charset="0"/>
-              </a:rPr>
-              <a:t>{@breed</a:t>
-            </a:r>
-            <a:r>
-              <a:rPr lang="es-CR" sz="1800" dirty="0" smtClean="0">
-                <a:latin typeface="Calibri" charset="0"/>
-              </a:rPr>
-              <a:t>} y mi nombre es #</a:t>
-            </a:r>
-            <a:r>
-              <a:rPr lang="es-CR" sz="1800" dirty="0">
-                <a:latin typeface="Calibri" charset="0"/>
-              </a:rPr>
-              <a:t>{@name}" </a:t>
+              <a:t>  def greed </a:t>
             </a:r>
           </a:p>
           <a:p>
@@ -5047,7 +5048,31 @@
               <a:rPr lang="es-CR" sz="1800" dirty="0">
                 <a:latin typeface="Calibri" charset="0"/>
               </a:rPr>
-              <a:t>  end </a:t>
+              <a:t>  </a:t>
+            </a:r>
+            <a:r>
+              <a:rPr lang="es-CR" sz="1800" dirty="0" smtClean="0">
+                <a:latin typeface="Calibri" charset="0"/>
+              </a:rPr>
+              <a:t>   “Soy un #</a:t>
+            </a:r>
+            <a:r>
+              <a:rPr lang="es-CR" sz="1800" dirty="0">
+                <a:latin typeface="Calibri" charset="0"/>
+              </a:rPr>
+              <a:t>{@breed</a:t>
+            </a:r>
+            <a:r>
+              <a:rPr lang="es-CR" sz="1800" dirty="0" smtClean="0">
+                <a:latin typeface="Calibri" charset="0"/>
+              </a:rPr>
+              <a:t>} y mi nombre es #</a:t>
+            </a:r>
+            <a:r>
+              <a:rPr lang="es-CR" sz="1800" dirty="0">
+                <a:latin typeface="Calibri" charset="0"/>
+              </a:rPr>
+              <a:t>{@name}" </a:t>
             </a:r>
           </a:p>
           <a:p>
@@ -5059,7 +5084,7 @@
               <a:rPr lang="es-CR" sz="1800" dirty="0">
                 <a:latin typeface="Calibri" charset="0"/>
               </a:rPr>
-              <a:t>end </a:t>
+              <a:t>  end </a:t>
             </a:r>
           </a:p>
           <a:p>
@@ -5071,7 +5096,7 @@
               <a:rPr lang="es-CR" sz="1800" dirty="0">
                 <a:latin typeface="Calibri" charset="0"/>
               </a:rPr>
-              <a:t>d = dog.new(‘Collie', ‘Lassie') </a:t>
+              <a:t>end </a:t>
             </a:r>
           </a:p>
           <a:p>
@@ -5083,7 +5108,19 @@
               <a:rPr lang="es-CR" sz="1800" dirty="0">
                 <a:latin typeface="Calibri" charset="0"/>
               </a:rPr>
-              <a:t>puts d.greed</a:t>
+              <a:t>d = </a:t>
+            </a:r>
+            <a:r>
+              <a:rPr lang="es-CR" sz="1800" dirty="0" smtClean="0">
+                <a:latin typeface="Calibri" charset="0"/>
+              </a:rPr>
+              <a:t>Dog.new</a:t>
+            </a:r>
+            <a:r>
+              <a:rPr lang="es-CR" sz="1800" dirty="0">
+                <a:latin typeface="Calibri" charset="0"/>
+              </a:rPr>
+              <a:t>(‘Collie', ‘Lassie') </a:t>
             </a:r>
           </a:p>
           <a:p>
@@ -5095,8 +5132,38 @@
               <a:rPr lang="es-CR" sz="1800" dirty="0">
                 <a:latin typeface="Calibri" charset="0"/>
               </a:rPr>
-              <a:t>puts d.bark</a:t>
-            </a:r>
+              <a:t>p</a:t>
+            </a:r>
+            <a:r>
+              <a:rPr lang="es-CR" sz="1800" dirty="0" smtClean="0">
+                <a:latin typeface="Calibri" charset="0"/>
+              </a:rPr>
+              <a:t>uts d.greed</a:t>
+            </a:r>
+            <a:endParaRPr lang="es-CR" sz="1800" dirty="0">
+              <a:latin typeface="Calibri" charset="0"/>
+            </a:endParaRPr>
+          </a:p>
+          <a:p>
+            <a:pPr>
+              <a:buFont typeface="Arial" charset="0"/>
+              <a:buNone/>
+            </a:pPr>
+            <a:r>
+              <a:rPr lang="es-CR" sz="1800" dirty="0">
+                <a:latin typeface="Calibri" charset="0"/>
+              </a:rPr>
+              <a:t>p</a:t>
+            </a:r>
+            <a:r>
+              <a:rPr lang="es-CR" sz="1800" dirty="0" smtClean="0">
+                <a:latin typeface="Calibri" charset="0"/>
+              </a:rPr>
+              <a:t>uts d.bark</a:t>
+            </a:r>
+            <a:endParaRPr lang="es-CR" sz="1800" dirty="0">
+              <a:latin typeface="Calibri" charset="0"/>
+            </a:endParaRPr>
           </a:p>
         </p:txBody>
       </p:sp>
@@ -5374,7 +5441,19 @@
               <a:rPr lang="es-CR" dirty="0" smtClean="0">
                 <a:latin typeface="Calibri" charset="0"/>
               </a:rPr>
-              <a:t>Permiten accesar a las variables de la clase desde fuera del objeto</a:t>
+              <a:t>Permiten accesar a las variables de la </a:t>
+            </a:r>
+            <a:r>
+              <a:rPr lang="es-CR" dirty="0" smtClean="0">
+                <a:latin typeface="Calibri" charset="0"/>
+              </a:rPr>
+              <a:t>instancia desde </a:t>
+            </a:r>
+            <a:r>
+              <a:rPr lang="es-CR" dirty="0" smtClean="0">
+                <a:latin typeface="Calibri" charset="0"/>
+              </a:rPr>
+              <a:t>fuera del objeto</a:t>
             </a:r>
             <a:endParaRPr lang="es-CR" dirty="0">
               <a:latin typeface="Calibri" charset="0"/>
@@ -6617,6 +6696,13 @@
   <p:clrMapOvr>
     <a:masterClrMapping/>
   </p:clrMapOvr>
+  <p:timing>
+    <p:tnLst>
+      <p:par>
+        <p:cTn xmlns:p14="http://schemas.microsoft.com/office/powerpoint/2010/main" id="1" dur="indefinite" restart="never" nodeType="tmRoot"/>
+      </p:par>
+    </p:tnLst>
+  </p:timing>
 </p:sld>
 </file>
 
@@ -6937,37 +7023,19 @@
               <a:rPr lang="es-CR" dirty="0" smtClean="0">
                 <a:latin typeface="Calibri" charset="0"/>
               </a:rPr>
-              <a:t>En Ruby la sobrecarga no es </a:t>
+              <a:t>En Ruby la sobrecarga no es factible de hacer pues sólo se puede </a:t>
+            </a:r>
+            <a:r>
+              <a:rPr lang="es-CR" dirty="0">
+                <a:latin typeface="Calibri" charset="0"/>
+              </a:rPr>
+              <a:t>tener un método con un nombre </a:t>
             </a:r>
             <a:r>
               <a:rPr lang="es-CR" dirty="0" smtClean="0">
                 <a:latin typeface="Calibri" charset="0"/>
               </a:rPr>
-              <a:t>factible </a:t>
-            </a:r>
-            <a:r>
-              <a:rPr lang="es-CR" dirty="0" smtClean="0">
-                <a:latin typeface="Calibri" charset="0"/>
-              </a:rPr>
-              <a:t>de </a:t>
-            </a:r>
-            <a:r>
-              <a:rPr lang="es-CR" dirty="0" smtClean="0">
-                <a:latin typeface="Calibri" charset="0"/>
-              </a:rPr>
-              <a:t>hacer pues sólo se puede </a:t>
-            </a:r>
-            <a:r>
-              <a:rPr lang="es-CR" dirty="0">
-                <a:latin typeface="Calibri" charset="0"/>
-              </a:rPr>
-              <a:t>tener un método con un nombre </a:t>
-            </a:r>
-            <a:r>
-              <a:rPr lang="es-CR" dirty="0" smtClean="0">
-                <a:latin typeface="Calibri" charset="0"/>
-              </a:rPr>
-              <a:t>dado.</a:t>
+              <a:t>dado</a:t>
             </a:r>
             <a:endParaRPr lang="es-CR" dirty="0" smtClean="0">
               <a:latin typeface="Calibri" charset="0"/>
@@ -7506,13 +7574,7 @@
               <a:rPr lang="en-US" dirty="0" err="1" smtClean="0">
                 <a:latin typeface="Calibri" charset="0"/>
               </a:rPr>
-              <a:t>informaci</a:t>
-            </a:r>
-            <a:r>
-              <a:rPr lang="en-US" dirty="0" err="1" smtClean="0">
-                <a:latin typeface="Calibri" charset="0"/>
-              </a:rPr>
-              <a:t>ón</a:t>
+              <a:t>información</a:t>
             </a:r>
             <a:endParaRPr lang="en-US" dirty="0" smtClean="0">
               <a:latin typeface="Calibri" charset="0"/>
@@ -7571,95 +7633,86 @@
               <a:rPr lang="en-US" dirty="0" err="1" smtClean="0">
                 <a:latin typeface="Calibri" charset="0"/>
               </a:rPr>
-              <a:t>m</a:t>
+              <a:t>método</a:t>
+            </a:r>
+            <a:r>
+              <a:rPr lang="en-US" dirty="0" smtClean="0">
+                <a:latin typeface="Calibri" charset="0"/>
+              </a:rPr>
+              <a:t> “parse”, el </a:t>
             </a:r>
             <a:r>
               <a:rPr lang="en-US" dirty="0" err="1" smtClean="0">
                 <a:latin typeface="Calibri" charset="0"/>
               </a:rPr>
-              <a:t>étodo</a:t>
+              <a:t>cual</a:t>
             </a:r>
             <a:r>
               <a:rPr lang="en-US" dirty="0" smtClean="0">
                 <a:latin typeface="Calibri" charset="0"/>
               </a:rPr>
-              <a:t> “parse”, el </a:t>
+              <a:t> </a:t>
             </a:r>
             <a:r>
               <a:rPr lang="en-US" dirty="0" err="1" smtClean="0">
                 <a:latin typeface="Calibri" charset="0"/>
               </a:rPr>
-              <a:t>cual</a:t>
+              <a:t>convierte</a:t>
             </a:r>
             <a:r>
               <a:rPr lang="en-US" dirty="0" smtClean="0">
                 <a:latin typeface="Calibri" charset="0"/>
               </a:rPr>
-              <a:t> </a:t>
+              <a:t> un </a:t>
             </a:r>
             <a:r>
               <a:rPr lang="en-US" dirty="0" err="1" smtClean="0">
                 <a:latin typeface="Calibri" charset="0"/>
               </a:rPr>
-              <a:t>convierte</a:t>
+              <a:t>texto</a:t>
             </a:r>
             <a:r>
               <a:rPr lang="en-US" dirty="0" smtClean="0">
                 <a:latin typeface="Calibri" charset="0"/>
               </a:rPr>
-              <a:t> un </a:t>
+              <a:t> en un </a:t>
             </a:r>
             <a:r>
               <a:rPr lang="en-US" dirty="0" err="1" smtClean="0">
                 <a:latin typeface="Calibri" charset="0"/>
               </a:rPr>
-              <a:t>texto</a:t>
+              <a:t>elemento</a:t>
             </a:r>
             <a:r>
               <a:rPr lang="en-US" dirty="0" smtClean="0">
                 <a:latin typeface="Calibri" charset="0"/>
               </a:rPr>
-              <a:t> en un </a:t>
+              <a:t> de </a:t>
             </a:r>
             <a:r>
               <a:rPr lang="en-US" dirty="0" err="1" smtClean="0">
                 <a:latin typeface="Calibri" charset="0"/>
               </a:rPr>
-              <a:t>elemento</a:t>
+              <a:t>tipo</a:t>
             </a:r>
             <a:r>
               <a:rPr lang="en-US" dirty="0" smtClean="0">
                 <a:latin typeface="Calibri" charset="0"/>
               </a:rPr>
-              <a:t> de </a:t>
+              <a:t> </a:t>
             </a:r>
             <a:r>
               <a:rPr lang="en-US" dirty="0" err="1" smtClean="0">
                 <a:latin typeface="Calibri" charset="0"/>
               </a:rPr>
-              <a:t>tipo</a:t>
+              <a:t>fecha</a:t>
             </a:r>
             <a:r>
               <a:rPr lang="en-US" dirty="0" smtClean="0">
                 <a:latin typeface="Calibri" charset="0"/>
               </a:rPr>
-              <a:t> </a:t>
-            </a:r>
-            <a:r>
-              <a:rPr lang="en-US" dirty="0" err="1" smtClean="0">
-                <a:latin typeface="Calibri" charset="0"/>
-              </a:rPr>
-              <a:t>fecha</a:t>
-            </a:r>
-            <a:r>
-              <a:rPr lang="en-US" dirty="0" smtClean="0">
-                <a:latin typeface="Calibri" charset="0"/>
-              </a:rPr>
               <a:t>.</a:t>
             </a:r>
-            <a:endParaRPr lang="en-US" dirty="0" smtClean="0">
-              <a:latin typeface="Calibri" charset="0"/>
-            </a:endParaRPr>
           </a:p>
         </p:txBody>
       </p:sp>
@@ -7841,11 +7894,7 @@
             </a:r>
             <a:r>
               <a:rPr lang="es-ES_tradnl" dirty="0" err="1" smtClean="0"/>
-              <a:t>excepci</a:t>
-            </a:r>
-            <a:r>
-              <a:rPr lang="es-ES_tradnl" dirty="0" err="1" smtClean="0"/>
-              <a:t>on</a:t>
+              <a:t>excepcion</a:t>
             </a:r>
             <a:r>
               <a:rPr lang="es-ES_tradnl" dirty="0" smtClean="0"/>
@@ -8473,11 +8522,7 @@
           <a:p>
             <a:r>
               <a:rPr lang="es-ES_tradnl" dirty="0" smtClean="0"/>
-              <a:t>Se utiliza el m</a:t>
-            </a:r>
-            <a:r>
-              <a:rPr lang="es-ES_tradnl" dirty="0" smtClean="0"/>
-              <a:t>étodo “</a:t>
+              <a:t>Se utiliza el método “</a:t>
             </a:r>
             <a:r>
               <a:rPr lang="es-ES_tradnl" dirty="0" err="1" smtClean="0"/>
@@ -8547,6 +8592,13 @@
   <p:clrMapOvr>
     <a:masterClrMapping/>
   </p:clrMapOvr>
+  <p:timing>
+    <p:tnLst>
+      <p:par>
+        <p:cTn xmlns:p14="http://schemas.microsoft.com/office/powerpoint/2010/main" id="1" dur="indefinite" restart="never" nodeType="tmRoot"/>
+      </p:par>
+    </p:tnLst>
+  </p:timing>
 </p:sld>
 </file>
 
@@ -9192,10 +9244,6 @@
               </a:rPr>
               <a:t>  </a:t>
             </a:r>
-            <a:endParaRPr lang="es-ES_tradnl" sz="2400" dirty="0">
-              <a:latin typeface="Calibri"/>
-              <a:cs typeface="Calibri"/>
-            </a:endParaRPr>
           </a:p>
         </p:txBody>
       </p:sp>
@@ -9359,7 +9407,6 @@
               <a:rPr lang="es-ES_tradnl" sz="2400" dirty="0"/>
               <a:t>)</a:t>
             </a:r>
-            <a:endParaRPr lang="es-ES_tradnl" sz="2400" dirty="0"/>
           </a:p>
         </p:txBody>
       </p:sp>
@@ -9373,6 +9420,13 @@
   <p:clrMapOvr>
     <a:masterClrMapping/>
   </p:clrMapOvr>
+  <p:timing>
+    <p:tnLst>
+      <p:par>
+        <p:cTn xmlns:p14="http://schemas.microsoft.com/office/powerpoint/2010/main" id="1" dur="indefinite" restart="never" nodeType="tmRoot"/>
+      </p:par>
+    </p:tnLst>
+  </p:timing>
 </p:sld>
 </file>
 
@@ -9918,6 +9972,13 @@
   <p:clrMapOvr>
     <a:masterClrMapping/>
   </p:clrMapOvr>
+  <p:timing>
+    <p:tnLst>
+      <p:par>
+        <p:cTn xmlns:p14="http://schemas.microsoft.com/office/powerpoint/2010/main" id="1" dur="indefinite" restart="never" nodeType="tmRoot"/>
+      </p:par>
+    </p:tnLst>
+  </p:timing>
 </p:sld>
 </file>
 
@@ -10796,6 +10857,13 @@
   <p:clrMapOvr>
     <a:masterClrMapping/>
   </p:clrMapOvr>
+  <p:timing>
+    <p:tnLst>
+      <p:par>
+        <p:cTn xmlns:p14="http://schemas.microsoft.com/office/powerpoint/2010/main" id="1" dur="indefinite" restart="never" nodeType="tmRoot"/>
+      </p:par>
+    </p:tnLst>
+  </p:timing>
 </p:sld>
 </file>
 
@@ -11134,6 +11202,13 @@
   <p:clrMapOvr>
     <a:masterClrMapping/>
   </p:clrMapOvr>
+  <p:timing>
+    <p:tnLst>
+      <p:par>
+        <p:cTn xmlns:p14="http://schemas.microsoft.com/office/powerpoint/2010/main" id="1" dur="indefinite" restart="never" nodeType="tmRoot"/>
+      </p:par>
+    </p:tnLst>
+  </p:timing>
 </p:sld>
 </file>
 
@@ -11287,6 +11362,13 @@
   <p:clrMapOvr>
     <a:masterClrMapping/>
   </p:clrMapOvr>
+  <p:timing>
+    <p:tnLst>
+      <p:par>
+        <p:cTn xmlns:p14="http://schemas.microsoft.com/office/powerpoint/2010/main" id="1" dur="indefinite" restart="never" nodeType="tmRoot"/>
+      </p:par>
+    </p:tnLst>
+  </p:timing>
 </p:sld>
 </file>
 
@@ -11998,6 +12080,13 @@
   <p:clrMapOvr>
     <a:masterClrMapping/>
   </p:clrMapOvr>
+  <p:timing>
+    <p:tnLst>
+      <p:par>
+        <p:cTn xmlns:p14="http://schemas.microsoft.com/office/powerpoint/2010/main" id="1" dur="indefinite" restart="never" nodeType="tmRoot"/>
+      </p:par>
+    </p:tnLst>
+  </p:timing>
 </p:sld>
 </file>
 
@@ -12096,14 +12185,37 @@
                 <a:latin typeface="Calibri"/>
                 <a:cs typeface="Calibri"/>
               </a:rPr>
-              <a:t># obtener informaci</a:t>
+              <a:t># obtener información de una sección del tiempo</a:t>
+            </a:r>
+          </a:p>
+          <a:p>
+            <a:r>
+              <a:rPr lang="es-ES_tradnl" sz="2000" dirty="0" err="1">
+                <a:latin typeface="Calibri"/>
+                <a:cs typeface="Calibri"/>
+              </a:rPr>
+              <a:t>p</a:t>
+            </a:r>
+            <a:r>
+              <a:rPr lang="es-ES_tradnl" sz="2000" dirty="0" err="1" smtClean="0">
+                <a:latin typeface="Calibri"/>
+                <a:cs typeface="Calibri"/>
+              </a:rPr>
+              <a:t>uts</a:t>
             </a:r>
             <a:r>
               <a:rPr lang="es-ES_tradnl" sz="2000" dirty="0" smtClean="0">
                 <a:latin typeface="Calibri"/>
                 <a:cs typeface="Calibri"/>
               </a:rPr>
-              <a:t>ón de una sección del tiempo</a:t>
+              <a:t> </a:t>
+            </a:r>
+            <a:r>
+              <a:rPr lang="es-ES_tradnl" sz="2000" dirty="0" err="1" smtClean="0">
+                <a:latin typeface="Calibri"/>
+                <a:cs typeface="Calibri"/>
+              </a:rPr>
+              <a:t>t.sec</a:t>
             </a:r>
             <a:endParaRPr lang="es-ES_tradnl" sz="2000" dirty="0" smtClean="0">
               <a:latin typeface="Calibri"/>
@@ -12112,18 +12224,11 @@
           </a:p>
           <a:p>
             <a:r>
-              <a:rPr lang="es-ES_tradnl" sz="2000" dirty="0" err="1">
-                <a:latin typeface="Calibri"/>
-                <a:cs typeface="Calibri"/>
-              </a:rPr>
-              <a:t>p</a:t>
-            </a:r>
-            <a:r>
               <a:rPr lang="es-ES_tradnl" sz="2000" dirty="0" err="1" smtClean="0">
                 <a:latin typeface="Calibri"/>
                 <a:cs typeface="Calibri"/>
               </a:rPr>
-              <a:t>uts</a:t>
+              <a:t>puts</a:t>
             </a:r>
             <a:r>
               <a:rPr lang="es-ES_tradnl" sz="2000" dirty="0" smtClean="0">
@@ -12137,7 +12242,7 @@
                 <a:latin typeface="Calibri"/>
                 <a:cs typeface="Calibri"/>
               </a:rPr>
-              <a:t>t.sec</a:t>
+              <a:t>t.wday</a:t>
             </a:r>
             <a:endParaRPr lang="es-ES_tradnl" sz="2000" dirty="0" smtClean="0">
               <a:latin typeface="Calibri"/>
@@ -12153,7 +12258,7 @@
               <a:t>puts</a:t>
             </a:r>
             <a:r>
-              <a:rPr lang="es-ES_tradnl" sz="2000" dirty="0" smtClean="0">
+              <a:rPr lang="es-ES_tradnl" sz="2000" dirty="0">
                 <a:latin typeface="Calibri"/>
                 <a:cs typeface="Calibri"/>
               </a:rPr>
@@ -12164,7 +12269,7 @@
                 <a:latin typeface="Calibri"/>
                 <a:cs typeface="Calibri"/>
               </a:rPr>
-              <a:t>t.wday</a:t>
+              <a:t>t.utc</a:t>
             </a:r>
             <a:endParaRPr lang="es-ES_tradnl" sz="2000" dirty="0" smtClean="0">
               <a:latin typeface="Calibri"/>
@@ -12172,33 +12277,53 @@
             </a:endParaRPr>
           </a:p>
           <a:p>
-            <a:r>
-              <a:rPr lang="es-ES_tradnl" sz="2000" dirty="0" err="1" smtClean="0">
-                <a:latin typeface="Calibri"/>
-                <a:cs typeface="Calibri"/>
-              </a:rPr>
-              <a:t>puts</a:t>
-            </a:r>
-            <a:r>
-              <a:rPr lang="es-ES_tradnl" sz="2000" dirty="0">
-                <a:latin typeface="Calibri"/>
-                <a:cs typeface="Calibri"/>
-              </a:rPr>
-              <a:t> </a:t>
-            </a:r>
-            <a:r>
-              <a:rPr lang="es-ES_tradnl" sz="2000" dirty="0" err="1" smtClean="0">
-                <a:latin typeface="Calibri"/>
-                <a:cs typeface="Calibri"/>
-              </a:rPr>
-              <a:t>t.utc</a:t>
-            </a:r>
             <a:endParaRPr lang="es-ES_tradnl" sz="2000" dirty="0" smtClean="0">
               <a:latin typeface="Calibri"/>
               <a:cs typeface="Calibri"/>
             </a:endParaRPr>
           </a:p>
           <a:p>
+            <a:r>
+              <a:rPr lang="es-ES_tradnl" sz="2000" dirty="0" smtClean="0">
+                <a:latin typeface="Calibri"/>
+                <a:cs typeface="Calibri"/>
+              </a:rPr>
+              <a:t># Algunos cálculos</a:t>
+            </a:r>
+          </a:p>
+          <a:p>
+            <a:r>
+              <a:rPr lang="es-ES_tradnl" sz="2000" dirty="0" err="1" smtClean="0">
+                <a:latin typeface="Calibri"/>
+                <a:cs typeface="Calibri"/>
+              </a:rPr>
+              <a:t>puts</a:t>
+            </a:r>
+            <a:r>
+              <a:rPr lang="es-ES_tradnl" sz="2000" dirty="0" smtClean="0">
+                <a:latin typeface="Calibri"/>
+                <a:cs typeface="Calibri"/>
+              </a:rPr>
+              <a:t> t + 10.hours</a:t>
+            </a:r>
+          </a:p>
+          <a:p>
+            <a:r>
+              <a:rPr lang="es-ES_tradnl" sz="2000" dirty="0" err="1" smtClean="0">
+                <a:latin typeface="Calibri"/>
+                <a:cs typeface="Calibri"/>
+              </a:rPr>
+              <a:t>puts</a:t>
+            </a:r>
+            <a:r>
+              <a:rPr lang="es-ES_tradnl" sz="2000" dirty="0" smtClean="0">
+                <a:latin typeface="Calibri"/>
+                <a:cs typeface="Calibri"/>
+              </a:rPr>
+              <a:t> t – 5.minutes</a:t>
+            </a:r>
+          </a:p>
+          <a:p>
             <a:endParaRPr lang="es-ES_tradnl" sz="2000" dirty="0" smtClean="0">
               <a:latin typeface="Calibri"/>
               <a:cs typeface="Calibri"/>
@@ -12210,64 +12335,6 @@
                 <a:latin typeface="Calibri"/>
                 <a:cs typeface="Calibri"/>
               </a:rPr>
-              <a:t># Algunos c</a:t>
-            </a:r>
-            <a:r>
-              <a:rPr lang="es-ES_tradnl" sz="2000" dirty="0" smtClean="0">
-                <a:latin typeface="Calibri"/>
-                <a:cs typeface="Calibri"/>
-              </a:rPr>
-              <a:t>álculos</a:t>
-            </a:r>
-            <a:endParaRPr lang="es-ES_tradnl" sz="2000" dirty="0" smtClean="0">
-              <a:latin typeface="Calibri"/>
-              <a:cs typeface="Calibri"/>
-            </a:endParaRPr>
-          </a:p>
-          <a:p>
-            <a:r>
-              <a:rPr lang="es-ES_tradnl" sz="2000" dirty="0" err="1" smtClean="0">
-                <a:latin typeface="Calibri"/>
-                <a:cs typeface="Calibri"/>
-              </a:rPr>
-              <a:t>puts</a:t>
-            </a:r>
-            <a:r>
-              <a:rPr lang="es-ES_tradnl" sz="2000" dirty="0" smtClean="0">
-                <a:latin typeface="Calibri"/>
-                <a:cs typeface="Calibri"/>
-              </a:rPr>
-              <a:t> t + 10.hours</a:t>
-            </a:r>
-          </a:p>
-          <a:p>
-            <a:r>
-              <a:rPr lang="es-ES_tradnl" sz="2000" dirty="0" err="1" smtClean="0">
-                <a:latin typeface="Calibri"/>
-                <a:cs typeface="Calibri"/>
-              </a:rPr>
-              <a:t>puts</a:t>
-            </a:r>
-            <a:r>
-              <a:rPr lang="es-ES_tradnl" sz="2000" dirty="0" smtClean="0">
-                <a:latin typeface="Calibri"/>
-                <a:cs typeface="Calibri"/>
-              </a:rPr>
-              <a:t> t – 5.minutes</a:t>
-            </a:r>
-          </a:p>
-          <a:p>
-            <a:endParaRPr lang="es-ES_tradnl" sz="2000" dirty="0" smtClean="0">
-              <a:latin typeface="Calibri"/>
-              <a:cs typeface="Calibri"/>
-            </a:endParaRPr>
-          </a:p>
-          <a:p>
-            <a:r>
-              <a:rPr lang="es-ES_tradnl" sz="2000" dirty="0" smtClean="0">
-                <a:latin typeface="Calibri"/>
-                <a:cs typeface="Calibri"/>
-              </a:rPr>
               <a:t># dar formato al texto</a:t>
             </a:r>
           </a:p>
@@ -12419,10 +12486,6 @@
               </a:rPr>
               <a:t>("%d/%m/%Y %H:%M:%S")</a:t>
             </a:r>
-            <a:endParaRPr lang="es-ES_tradnl" sz="2000" dirty="0">
-              <a:latin typeface="Calibri"/>
-              <a:cs typeface="Calibri"/>
-            </a:endParaRPr>
           </a:p>
         </p:txBody>
       </p:sp>
@@ -15543,13 +15606,7 @@
               <a:rPr lang="en-US" dirty="0" err="1" smtClean="0">
                 <a:latin typeface="Calibri" charset="0"/>
               </a:rPr>
-              <a:t>m</a:t>
-            </a:r>
-            <a:r>
-              <a:rPr lang="en-US" dirty="0" err="1" smtClean="0">
-                <a:latin typeface="Calibri" charset="0"/>
-              </a:rPr>
-              <a:t>étodos</a:t>
+              <a:t>métodos</a:t>
             </a:r>
             <a:r>
               <a:rPr lang="en-US" dirty="0" smtClean="0">
@@ -15741,10 +15798,16 @@
           <a:p>
             <a:pPr lvl="2"/>
             <a:r>
+              <a:rPr lang="ro-RO" dirty="0" smtClean="0">
+                <a:latin typeface="Calibri" charset="0"/>
+              </a:rPr>
+              <a:t>DateTime.strptime</a:t>
+            </a:r>
+            <a:r>
               <a:rPr lang="ro-RO" dirty="0">
                 <a:latin typeface="Calibri" charset="0"/>
               </a:rPr>
-              <a:t>Date.strptime("{ 2009, 4, 15 }", "{ %Y, %m, %d }"</a:t>
+              <a:t>("{ 2009, 4, 15 }", "{ %Y, %m, %d }"</a:t>
             </a:r>
             <a:r>
               <a:rPr lang="ro-RO" dirty="0" smtClean="0">
@@ -16127,25 +16190,7 @@
               <a:rPr lang="es-ES" dirty="0" smtClean="0">
                 <a:latin typeface="Calibri" charset="0"/>
               </a:rPr>
-              <a:t>: </a:t>
-            </a:r>
-            <a:r>
-              <a:rPr lang="es-ES" dirty="0" smtClean="0">
-                <a:latin typeface="Calibri" charset="0"/>
-              </a:rPr>
-              <a:t>M</a:t>
-            </a:r>
-            <a:r>
-              <a:rPr lang="es-ES" dirty="0" smtClean="0">
-                <a:latin typeface="Calibri" charset="0"/>
-              </a:rPr>
-              <a:t>ó</a:t>
-            </a:r>
-            <a:r>
-              <a:rPr lang="es-ES" dirty="0" smtClean="0">
-                <a:latin typeface="Calibri" charset="0"/>
-              </a:rPr>
-              <a:t>dulos</a:t>
+              <a:t>: Módulos</a:t>
             </a:r>
             <a:endParaRPr lang="en-US" dirty="0">
               <a:latin typeface="Calibri" charset="0"/>
@@ -16441,36 +16486,24 @@
               <a:rPr lang="en-US" sz="2800" dirty="0" err="1" smtClean="0">
                 <a:latin typeface="Calibri" charset="0"/>
               </a:rPr>
-              <a:t>m</a:t>
+              <a:t>métodos</a:t>
+            </a:r>
+            <a:r>
+              <a:rPr lang="en-US" sz="2800" dirty="0" smtClean="0">
+                <a:latin typeface="Calibri" charset="0"/>
+              </a:rPr>
+              <a:t> de </a:t>
             </a:r>
             <a:r>
               <a:rPr lang="en-US" sz="2800" dirty="0" err="1" smtClean="0">
                 <a:latin typeface="Calibri" charset="0"/>
               </a:rPr>
-              <a:t>étodos</a:t>
+              <a:t>clase</a:t>
             </a:r>
             <a:r>
               <a:rPr lang="en-US" sz="2800" dirty="0" smtClean="0">
                 <a:latin typeface="Calibri" charset="0"/>
               </a:rPr>
-              <a:t> </a:t>
-            </a:r>
-            <a:r>
-              <a:rPr lang="en-US" sz="2800" dirty="0" smtClean="0">
-                <a:latin typeface="Calibri" charset="0"/>
-              </a:rPr>
-              <a:t>de </a:t>
-            </a:r>
-            <a:r>
-              <a:rPr lang="en-US" sz="2800" dirty="0" err="1" smtClean="0">
-                <a:latin typeface="Calibri" charset="0"/>
-              </a:rPr>
-              <a:t>clase</a:t>
-            </a:r>
-            <a:r>
-              <a:rPr lang="en-US" sz="2800" dirty="0" smtClean="0">
-                <a:latin typeface="Calibri" charset="0"/>
-              </a:rPr>
               <a:t>.</a:t>
             </a:r>
           </a:p>
@@ -16486,13 +16519,19 @@
               <a:rPr lang="en-US" sz="2400" dirty="0" err="1" smtClean="0">
                 <a:latin typeface="Calibri" charset="0"/>
               </a:rPr>
-              <a:t>c</a:t>
+              <a:t>código</a:t>
+            </a:r>
+            <a:r>
+              <a:rPr lang="en-US" sz="2400" dirty="0" smtClean="0">
+                <a:latin typeface="Calibri" charset="0"/>
+              </a:rPr>
+              <a:t> </a:t>
             </a:r>
             <a:r>
               <a:rPr lang="en-US" sz="2400" dirty="0" err="1" smtClean="0">
                 <a:latin typeface="Calibri" charset="0"/>
               </a:rPr>
-              <a:t>ódigo</a:t>
+              <a:t>generado</a:t>
             </a:r>
             <a:r>
               <a:rPr lang="en-US" sz="2400" dirty="0" smtClean="0">
@@ -16504,77 +16543,62 @@
               <a:rPr lang="en-US" sz="2400" dirty="0" err="1" smtClean="0">
                 <a:latin typeface="Calibri" charset="0"/>
               </a:rPr>
-              <a:t>generado</a:t>
+              <a:t>debe</a:t>
             </a:r>
             <a:r>
               <a:rPr lang="en-US" sz="2400" dirty="0" smtClean="0">
                 <a:latin typeface="Calibri" charset="0"/>
               </a:rPr>
-              <a:t> </a:t>
+              <a:t> de </a:t>
             </a:r>
             <a:r>
               <a:rPr lang="en-US" sz="2400" dirty="0" err="1" smtClean="0">
                 <a:latin typeface="Calibri" charset="0"/>
               </a:rPr>
-              <a:t>debe</a:t>
+              <a:t>poder</a:t>
             </a:r>
             <a:r>
               <a:rPr lang="en-US" sz="2400" dirty="0" smtClean="0">
                 <a:latin typeface="Calibri" charset="0"/>
               </a:rPr>
-              <a:t> de </a:t>
+              <a:t> </a:t>
             </a:r>
             <a:r>
               <a:rPr lang="en-US" sz="2400" dirty="0" err="1" smtClean="0">
                 <a:latin typeface="Calibri" charset="0"/>
               </a:rPr>
-              <a:t>poder</a:t>
+              <a:t>funcionar</a:t>
             </a:r>
             <a:r>
               <a:rPr lang="en-US" sz="2400" dirty="0" smtClean="0">
                 <a:latin typeface="Calibri" charset="0"/>
               </a:rPr>
-              <a:t> </a:t>
+              <a:t> con </a:t>
             </a:r>
             <a:r>
               <a:rPr lang="en-US" sz="2400" dirty="0" err="1" smtClean="0">
                 <a:latin typeface="Calibri" charset="0"/>
               </a:rPr>
-              <a:t>funcionar</a:t>
+              <a:t>esta</a:t>
             </a:r>
             <a:r>
               <a:rPr lang="en-US" sz="2400" dirty="0" smtClean="0">
                 <a:latin typeface="Calibri" charset="0"/>
               </a:rPr>
-              <a:t> con </a:t>
+              <a:t> </a:t>
             </a:r>
             <a:r>
               <a:rPr lang="en-US" sz="2400" dirty="0" err="1" smtClean="0">
                 <a:latin typeface="Calibri" charset="0"/>
               </a:rPr>
-              <a:t>esta</a:t>
+              <a:t>prueba</a:t>
             </a:r>
             <a:r>
               <a:rPr lang="en-US" sz="2400" dirty="0" smtClean="0">
                 <a:latin typeface="Calibri" charset="0"/>
               </a:rPr>
-              <a:t> </a:t>
-            </a:r>
-            <a:r>
-              <a:rPr lang="en-US" sz="2400" dirty="0" err="1" smtClean="0">
-                <a:latin typeface="Calibri" charset="0"/>
-              </a:rPr>
-              <a:t>prueba</a:t>
-            </a:r>
-            <a:r>
-              <a:rPr lang="en-US" sz="2400" dirty="0" smtClean="0">
-                <a:latin typeface="Calibri" charset="0"/>
-              </a:rPr>
               <a:t>:</a:t>
             </a:r>
-            <a:endParaRPr lang="en-US" sz="2400" dirty="0" smtClean="0">
-              <a:latin typeface="Calibri" charset="0"/>
-            </a:endParaRPr>
           </a:p>
           <a:p>
             <a:pPr lvl="2"/>
@@ -16736,13 +16760,7 @@
               <a:rPr lang="es-CR" sz="2000" dirty="0" smtClean="0">
                 <a:latin typeface="Calibri" charset="0"/>
               </a:rPr>
-              <a:t>(1</a:t>
-            </a:r>
-            <a:r>
-              <a:rPr lang="es-CR" sz="2000" dirty="0" smtClean="0">
-                <a:latin typeface="Calibri" charset="0"/>
-              </a:rPr>
-              <a:t>/2)</a:t>
+              <a:t>(1/2)</a:t>
             </a:r>
             <a:endParaRPr lang="es-CR" dirty="0">
               <a:latin typeface="Calibri" charset="0"/>
@@ -16782,13 +16800,7 @@
               <a:rPr lang="es-CR" dirty="0" smtClean="0">
                 <a:latin typeface="Calibri" charset="0"/>
               </a:rPr>
-              <a:t>Al heredar de IO, comparten muchos de los m</a:t>
-            </a:r>
-            <a:r>
-              <a:rPr lang="es-CR" dirty="0" smtClean="0">
-                <a:latin typeface="Calibri" charset="0"/>
-              </a:rPr>
-              <a:t>étodos pues la mayoría se declaran en IO.</a:t>
+              <a:t>Al heredar de IO, comparten muchos de los métodos pues la mayoría se declaran en IO.</a:t>
             </a:r>
           </a:p>
           <a:p>
@@ -17268,13 +17280,19 @@
               <a:rPr lang="en-US" sz="2800" dirty="0" err="1" smtClean="0">
                 <a:latin typeface="Calibri" charset="0"/>
               </a:rPr>
-              <a:t>m</a:t>
+              <a:t>método</a:t>
+            </a:r>
+            <a:r>
+              <a:rPr lang="en-US" sz="2800" dirty="0" smtClean="0">
+                <a:latin typeface="Calibri" charset="0"/>
+              </a:rPr>
+              <a:t> </a:t>
             </a:r>
             <a:r>
               <a:rPr lang="en-US" sz="2800" dirty="0" err="1" smtClean="0">
                 <a:latin typeface="Calibri" charset="0"/>
               </a:rPr>
-              <a:t>étodo</a:t>
+              <a:t>que</a:t>
             </a:r>
             <a:r>
               <a:rPr lang="en-US" sz="2800" dirty="0" smtClean="0">
@@ -17286,6 +17304,96 @@
               <a:rPr lang="en-US" sz="2800" dirty="0" err="1" smtClean="0">
                 <a:latin typeface="Calibri" charset="0"/>
               </a:rPr>
+              <a:t>cargue</a:t>
+            </a:r>
+            <a:r>
+              <a:rPr lang="en-US" sz="2800" dirty="0" smtClean="0">
+                <a:latin typeface="Calibri" charset="0"/>
+              </a:rPr>
+              <a:t> la </a:t>
+            </a:r>
+            <a:r>
+              <a:rPr lang="en-US" sz="2800" dirty="0" err="1" smtClean="0">
+                <a:latin typeface="Calibri" charset="0"/>
+              </a:rPr>
+              <a:t>información</a:t>
+            </a:r>
+            <a:r>
+              <a:rPr lang="en-US" sz="2800" dirty="0" smtClean="0">
+                <a:latin typeface="Calibri" charset="0"/>
+              </a:rPr>
+              <a:t> de </a:t>
+            </a:r>
+            <a:r>
+              <a:rPr lang="en-US" sz="2800" dirty="0" err="1" smtClean="0">
+                <a:latin typeface="Calibri" charset="0"/>
+              </a:rPr>
+              <a:t>ese</a:t>
+            </a:r>
+            <a:r>
+              <a:rPr lang="en-US" sz="2800" dirty="0" smtClean="0">
+                <a:latin typeface="Calibri" charset="0"/>
+              </a:rPr>
+              <a:t> </a:t>
+            </a:r>
+            <a:r>
+              <a:rPr lang="en-US" sz="2800" dirty="0" err="1" smtClean="0">
+                <a:latin typeface="Calibri" charset="0"/>
+              </a:rPr>
+              <a:t>archivo</a:t>
+            </a:r>
+            <a:r>
+              <a:rPr lang="en-US" sz="2800" dirty="0">
+                <a:latin typeface="Calibri" charset="0"/>
+              </a:rPr>
+              <a:t> </a:t>
+            </a:r>
+            <a:r>
+              <a:rPr lang="en-US" sz="2800" dirty="0" smtClean="0">
+                <a:latin typeface="Calibri" charset="0"/>
+              </a:rPr>
+              <a:t>y </a:t>
+            </a:r>
+            <a:r>
+              <a:rPr lang="en-US" sz="2800" dirty="0" err="1" smtClean="0">
+                <a:latin typeface="Calibri" charset="0"/>
+              </a:rPr>
+              <a:t>genere</a:t>
+            </a:r>
+            <a:r>
+              <a:rPr lang="en-US" sz="2800" dirty="0" smtClean="0">
+                <a:latin typeface="Calibri" charset="0"/>
+              </a:rPr>
+              <a:t> un </a:t>
+            </a:r>
+            <a:r>
+              <a:rPr lang="en-US" sz="2800" dirty="0" err="1" smtClean="0">
+                <a:latin typeface="Calibri" charset="0"/>
+              </a:rPr>
+              <a:t>archivo</a:t>
+            </a:r>
+            <a:r>
+              <a:rPr lang="en-US" sz="2800" dirty="0" smtClean="0">
+                <a:latin typeface="Calibri" charset="0"/>
+              </a:rPr>
+              <a:t> </a:t>
+            </a:r>
+            <a:r>
+              <a:rPr lang="en-US" sz="2800" dirty="0" err="1" smtClean="0">
+                <a:latin typeface="Calibri" charset="0"/>
+              </a:rPr>
+              <a:t>nuevo</a:t>
+            </a:r>
+            <a:r>
+              <a:rPr lang="en-US" sz="2800" dirty="0" smtClean="0">
+                <a:latin typeface="Calibri" charset="0"/>
+              </a:rPr>
+              <a:t> </a:t>
+            </a:r>
+            <a:r>
+              <a:rPr lang="en-US" sz="2800" dirty="0" err="1" smtClean="0">
+                <a:latin typeface="Calibri" charset="0"/>
+              </a:rPr>
               <a:t>que</a:t>
             </a:r>
             <a:r>
@@ -17298,148 +17406,106 @@
               <a:rPr lang="en-US" sz="2800" dirty="0" err="1" smtClean="0">
                 <a:latin typeface="Calibri" charset="0"/>
               </a:rPr>
-              <a:t>cargue</a:t>
+              <a:t>contenga</a:t>
             </a:r>
             <a:r>
               <a:rPr lang="en-US" sz="2800" dirty="0" smtClean="0">
                 <a:latin typeface="Calibri" charset="0"/>
               </a:rPr>
-              <a:t> la </a:t>
+              <a:t> </a:t>
             </a:r>
             <a:r>
               <a:rPr lang="en-US" sz="2800" dirty="0" err="1" smtClean="0">
                 <a:latin typeface="Calibri" charset="0"/>
               </a:rPr>
-              <a:t>información</a:t>
+              <a:t>únicamente</a:t>
             </a:r>
             <a:r>
               <a:rPr lang="en-US" sz="2800" dirty="0" smtClean="0">
                 <a:latin typeface="Calibri" charset="0"/>
               </a:rPr>
-              <a:t> de </a:t>
-            </a:r>
-            <a:r>
-              <a:rPr lang="en-US" sz="2800" dirty="0" err="1" smtClean="0">
+              <a:t>:</a:t>
+            </a:r>
+          </a:p>
+          <a:p>
+            <a:pPr lvl="1"/>
+            <a:r>
+              <a:rPr lang="en-US" sz="2400" dirty="0" err="1" smtClean="0">
+                <a:latin typeface="Calibri" charset="0"/>
+              </a:rPr>
+              <a:t>Día</a:t>
+            </a:r>
+            <a:r>
+              <a:rPr lang="en-US" sz="2400" dirty="0" smtClean="0">
+                <a:latin typeface="Calibri" charset="0"/>
+              </a:rPr>
+              <a:t> (</a:t>
+            </a:r>
+            <a:r>
+              <a:rPr lang="en-US" sz="2400" dirty="0" err="1" smtClean="0">
+                <a:latin typeface="Calibri" charset="0"/>
+              </a:rPr>
+              <a:t>ignoramos</a:t>
+            </a:r>
+            <a:r>
+              <a:rPr lang="en-US" sz="2400" dirty="0" smtClean="0">
+                <a:latin typeface="Calibri" charset="0"/>
+              </a:rPr>
+              <a:t> </a:t>
+            </a:r>
+            <a:r>
+              <a:rPr lang="en-US" sz="2400" dirty="0" err="1" smtClean="0">
+                <a:latin typeface="Calibri" charset="0"/>
+              </a:rPr>
+              <a:t>hora</a:t>
+            </a:r>
+            <a:r>
+              <a:rPr lang="en-US" sz="2400" dirty="0" smtClean="0">
+                <a:latin typeface="Calibri" charset="0"/>
+              </a:rPr>
+              <a:t>), Distrito, “Total </a:t>
+            </a:r>
+            <a:r>
+              <a:rPr lang="en-US" sz="2400" dirty="0" err="1" smtClean="0">
+                <a:latin typeface="Calibri" charset="0"/>
+              </a:rPr>
+              <a:t>delitos</a:t>
+            </a:r>
+            <a:r>
+              <a:rPr lang="en-US" sz="2400" dirty="0" smtClean="0">
+                <a:latin typeface="Calibri" charset="0"/>
+              </a:rPr>
+              <a:t> en </a:t>
+            </a:r>
+            <a:r>
+              <a:rPr lang="en-US" sz="2400" dirty="0" err="1" smtClean="0">
                 <a:latin typeface="Calibri" charset="0"/>
               </a:rPr>
               <a:t>ese</a:t>
             </a:r>
             <a:r>
-              <a:rPr lang="en-US" sz="2800" dirty="0" smtClean="0">
-                <a:latin typeface="Calibri" charset="0"/>
-              </a:rPr>
-              <a:t> </a:t>
-            </a:r>
-            <a:r>
-              <a:rPr lang="en-US" sz="2800" dirty="0" err="1" smtClean="0">
-                <a:latin typeface="Calibri" charset="0"/>
-              </a:rPr>
-              <a:t>archivo</a:t>
-            </a:r>
-            <a:r>
-              <a:rPr lang="en-US" sz="2800" dirty="0">
-                <a:latin typeface="Calibri" charset="0"/>
-              </a:rPr>
-              <a:t> </a:t>
-            </a:r>
-            <a:r>
-              <a:rPr lang="en-US" sz="2800" dirty="0" smtClean="0">
-                <a:latin typeface="Calibri" charset="0"/>
-              </a:rPr>
-              <a:t>y </a:t>
-            </a:r>
-            <a:r>
-              <a:rPr lang="en-US" sz="2800" dirty="0" err="1" smtClean="0">
-                <a:latin typeface="Calibri" charset="0"/>
-              </a:rPr>
-              <a:t>genere</a:t>
-            </a:r>
-            <a:r>
-              <a:rPr lang="en-US" sz="2800" dirty="0" smtClean="0">
-                <a:latin typeface="Calibri" charset="0"/>
-              </a:rPr>
-              <a:t> un </a:t>
-            </a:r>
-            <a:r>
-              <a:rPr lang="en-US" sz="2800" dirty="0" err="1" smtClean="0">
-                <a:latin typeface="Calibri" charset="0"/>
-              </a:rPr>
-              <a:t>archivo</a:t>
-            </a:r>
-            <a:r>
-              <a:rPr lang="en-US" sz="2800" dirty="0" smtClean="0">
-                <a:latin typeface="Calibri" charset="0"/>
-              </a:rPr>
-              <a:t> </a:t>
-            </a:r>
-            <a:r>
-              <a:rPr lang="en-US" sz="2800" dirty="0" err="1" smtClean="0">
-                <a:latin typeface="Calibri" charset="0"/>
-              </a:rPr>
-              <a:t>nuevo</a:t>
-            </a:r>
-            <a:r>
-              <a:rPr lang="en-US" sz="2800" dirty="0" smtClean="0">
-                <a:latin typeface="Calibri" charset="0"/>
-              </a:rPr>
-              <a:t> </a:t>
-            </a:r>
-            <a:r>
-              <a:rPr lang="en-US" sz="2800" dirty="0" err="1" smtClean="0">
-                <a:latin typeface="Calibri" charset="0"/>
-              </a:rPr>
-              <a:t>que</a:t>
-            </a:r>
-            <a:r>
-              <a:rPr lang="en-US" sz="2800" dirty="0" smtClean="0">
-                <a:latin typeface="Calibri" charset="0"/>
-              </a:rPr>
-              <a:t> </a:t>
-            </a:r>
-            <a:r>
-              <a:rPr lang="en-US" sz="2800" dirty="0" err="1" smtClean="0">
-                <a:latin typeface="Calibri" charset="0"/>
-              </a:rPr>
-              <a:t>contenga</a:t>
-            </a:r>
-            <a:r>
-              <a:rPr lang="en-US" sz="2800" dirty="0" smtClean="0">
-                <a:latin typeface="Calibri" charset="0"/>
-              </a:rPr>
-              <a:t> </a:t>
-            </a:r>
-            <a:r>
-              <a:rPr lang="en-US" sz="2800" dirty="0" err="1" smtClean="0">
-                <a:latin typeface="Calibri" charset="0"/>
-              </a:rPr>
-              <a:t>únicamente</a:t>
-            </a:r>
-            <a:r>
-              <a:rPr lang="en-US" sz="2800" dirty="0" smtClean="0">
-                <a:latin typeface="Calibri" charset="0"/>
-              </a:rPr>
-              <a:t>:</a:t>
-            </a:r>
-          </a:p>
-          <a:p>
-            <a:pPr lvl="1"/>
+              <a:rPr lang="en-US" sz="2400" dirty="0" smtClean="0">
+                <a:latin typeface="Calibri" charset="0"/>
+              </a:rPr>
+              <a:t> </a:t>
+            </a:r>
             <a:r>
               <a:rPr lang="en-US" sz="2400" dirty="0" err="1" smtClean="0">
                 <a:latin typeface="Calibri" charset="0"/>
               </a:rPr>
-              <a:t>Día</a:t>
+              <a:t>día</a:t>
             </a:r>
             <a:r>
               <a:rPr lang="en-US" sz="2400" dirty="0" smtClean="0">
                 <a:latin typeface="Calibri" charset="0"/>
               </a:rPr>
-              <a:t> (</a:t>
+              <a:t> en </a:t>
             </a:r>
             <a:r>
               <a:rPr lang="en-US" sz="2400" dirty="0" err="1" smtClean="0">
                 <a:latin typeface="Calibri" charset="0"/>
               </a:rPr>
-              <a:t>ignoramos</a:t>
+              <a:t>ese</a:t>
             </a:r>
             <a:r>
               <a:rPr lang="en-US" sz="2400" dirty="0" smtClean="0">
@@ -17451,77 +17517,14 @@
               <a:rPr lang="en-US" sz="2400" dirty="0" err="1" smtClean="0">
                 <a:latin typeface="Calibri" charset="0"/>
               </a:rPr>
-              <a:t>hora</a:t>
+              <a:t>distrito</a:t>
             </a:r>
             <a:r>
               <a:rPr lang="en-US" sz="2400" dirty="0" smtClean="0">
                 <a:latin typeface="Calibri" charset="0"/>
               </a:rPr>
-              <a:t>), Distrito, “Total </a:t>
-            </a:r>
-            <a:r>
-              <a:rPr lang="en-US" sz="2400" dirty="0" err="1" smtClean="0">
-                <a:latin typeface="Calibri" charset="0"/>
-              </a:rPr>
-              <a:t>delitos</a:t>
-            </a:r>
-            <a:r>
-              <a:rPr lang="en-US" sz="2400" dirty="0" smtClean="0">
-                <a:latin typeface="Calibri" charset="0"/>
-              </a:rPr>
-              <a:t> en </a:t>
-            </a:r>
-            <a:r>
-              <a:rPr lang="en-US" sz="2400" dirty="0" err="1" smtClean="0">
-                <a:latin typeface="Calibri" charset="0"/>
-              </a:rPr>
-              <a:t>ese</a:t>
-            </a:r>
-            <a:r>
-              <a:rPr lang="en-US" sz="2400" dirty="0" smtClean="0">
-                <a:latin typeface="Calibri" charset="0"/>
-              </a:rPr>
-              <a:t> </a:t>
-            </a:r>
-            <a:r>
-              <a:rPr lang="en-US" sz="2400" dirty="0" err="1" smtClean="0">
-                <a:latin typeface="Calibri" charset="0"/>
-              </a:rPr>
-              <a:t>día</a:t>
-            </a:r>
-            <a:r>
-              <a:rPr lang="en-US" sz="2400" dirty="0" smtClean="0">
-                <a:latin typeface="Calibri" charset="0"/>
-              </a:rPr>
-              <a:t> en </a:t>
-            </a:r>
-            <a:r>
-              <a:rPr lang="en-US" sz="2400" dirty="0" err="1" smtClean="0">
-                <a:latin typeface="Calibri" charset="0"/>
-              </a:rPr>
-              <a:t>ese</a:t>
-            </a:r>
-            <a:r>
-              <a:rPr lang="en-US" sz="2400" dirty="0" smtClean="0">
-                <a:latin typeface="Calibri" charset="0"/>
-              </a:rPr>
-              <a:t> </a:t>
-            </a:r>
-            <a:r>
-              <a:rPr lang="en-US" sz="2400" dirty="0" err="1" smtClean="0">
-                <a:latin typeface="Calibri" charset="0"/>
-              </a:rPr>
-              <a:t>distrito</a:t>
-            </a:r>
-            <a:r>
-              <a:rPr lang="en-US" sz="2400" dirty="0" smtClean="0">
-                <a:latin typeface="Calibri" charset="0"/>
-              </a:rPr>
               <a:t>”</a:t>
             </a:r>
-            <a:endParaRPr lang="en-US" sz="2400" dirty="0" smtClean="0">
-              <a:latin typeface="Calibri" charset="0"/>
-            </a:endParaRPr>
           </a:p>
         </p:txBody>
       </p:sp>
@@ -18254,11 +18257,7 @@
           <a:p>
             <a:r>
               <a:rPr lang="es-ES_tradnl" dirty="0" smtClean="0"/>
-              <a:t>Crear un m</a:t>
-            </a:r>
-            <a:r>
-              <a:rPr lang="es-ES_tradnl" dirty="0" smtClean="0"/>
-              <a:t>étodo que reciba una fecha con formato: “31/05/2015 19:20:00”, convertir el texto a fecha y hacer la siguiente verificación:</a:t>
+              <a:t>Crear un método que reciba una fecha con formato: “31/05/2015 19:20:00”, convertir el texto a fecha y hacer la siguiente verificación:</a:t>
             </a:r>
           </a:p>
           <a:p>
@@ -18294,6 +18293,13 @@
   <p:clrMapOvr>
     <a:masterClrMapping/>
   </p:clrMapOvr>
+  <p:timing>
+    <p:tnLst>
+      <p:par>
+        <p:cTn xmlns:p14="http://schemas.microsoft.com/office/powerpoint/2010/main" id="1" dur="indefinite" restart="never" nodeType="tmRoot"/>
+      </p:par>
+    </p:tnLst>
+  </p:timing>
 </p:sld>
 </file>
 

</xml_diff>